<commit_message>
Update Clash of Cos Team Pitch.pptx
</commit_message>
<xml_diff>
--- a/Shared Documentation/Luke's Documents/Clash of Cos Team Pitch.pptx
+++ b/Shared Documentation/Luke's Documents/Clash of Cos Team Pitch.pptx
@@ -16,31 +16,32 @@
     <p:sldId id="261" r:id="rId10"/>
     <p:sldId id="262" r:id="rId11"/>
     <p:sldId id="263" r:id="rId12"/>
-    <p:sldId id="284" r:id="rId13"/>
-    <p:sldId id="289" r:id="rId14"/>
-    <p:sldId id="294" r:id="rId15"/>
-    <p:sldId id="295" r:id="rId16"/>
-    <p:sldId id="290" r:id="rId17"/>
-    <p:sldId id="264" r:id="rId18"/>
-    <p:sldId id="265" r:id="rId19"/>
-    <p:sldId id="267" r:id="rId20"/>
-    <p:sldId id="268" r:id="rId21"/>
-    <p:sldId id="269" r:id="rId22"/>
-    <p:sldId id="270" r:id="rId23"/>
-    <p:sldId id="271" r:id="rId24"/>
-    <p:sldId id="272" r:id="rId25"/>
-    <p:sldId id="273" r:id="rId26"/>
-    <p:sldId id="274" r:id="rId27"/>
-    <p:sldId id="275" r:id="rId28"/>
-    <p:sldId id="277" r:id="rId29"/>
-    <p:sldId id="276" r:id="rId30"/>
-    <p:sldId id="279" r:id="rId31"/>
-    <p:sldId id="278" r:id="rId32"/>
-    <p:sldId id="282" r:id="rId33"/>
-    <p:sldId id="281" r:id="rId34"/>
-    <p:sldId id="283" r:id="rId35"/>
-    <p:sldId id="285" r:id="rId36"/>
-    <p:sldId id="286" r:id="rId37"/>
+    <p:sldId id="296" r:id="rId13"/>
+    <p:sldId id="284" r:id="rId14"/>
+    <p:sldId id="289" r:id="rId15"/>
+    <p:sldId id="294" r:id="rId16"/>
+    <p:sldId id="295" r:id="rId17"/>
+    <p:sldId id="290" r:id="rId18"/>
+    <p:sldId id="264" r:id="rId19"/>
+    <p:sldId id="265" r:id="rId20"/>
+    <p:sldId id="267" r:id="rId21"/>
+    <p:sldId id="268" r:id="rId22"/>
+    <p:sldId id="269" r:id="rId23"/>
+    <p:sldId id="270" r:id="rId24"/>
+    <p:sldId id="271" r:id="rId25"/>
+    <p:sldId id="272" r:id="rId26"/>
+    <p:sldId id="273" r:id="rId27"/>
+    <p:sldId id="274" r:id="rId28"/>
+    <p:sldId id="275" r:id="rId29"/>
+    <p:sldId id="277" r:id="rId30"/>
+    <p:sldId id="276" r:id="rId31"/>
+    <p:sldId id="279" r:id="rId32"/>
+    <p:sldId id="278" r:id="rId33"/>
+    <p:sldId id="282" r:id="rId34"/>
+    <p:sldId id="281" r:id="rId35"/>
+    <p:sldId id="283" r:id="rId36"/>
+    <p:sldId id="285" r:id="rId37"/>
+    <p:sldId id="286" r:id="rId38"/>
   </p:sldIdLst>
   <p:sldSz cx="12192000" cy="6858000"/>
   <p:notesSz cx="6858000" cy="9144000"/>
@@ -1176,7 +1177,7 @@
           <a:p>
             <a:fld id="{846CE7D5-CF57-46EF-B807-FDD0502418D4}" type="datetimeFigureOut">
               <a:rPr lang="en-US" smtClean="0"/>
-              <a:t>10/16/2023</a:t>
+              <a:t>10/17/2023</a:t>
             </a:fld>
             <a:endParaRPr lang="en-US"/>
           </a:p>
@@ -1346,7 +1347,7 @@
           <a:p>
             <a:fld id="{846CE7D5-CF57-46EF-B807-FDD0502418D4}" type="datetimeFigureOut">
               <a:rPr lang="en-US" smtClean="0"/>
-              <a:t>10/16/2023</a:t>
+              <a:t>10/17/2023</a:t>
             </a:fld>
             <a:endParaRPr lang="en-US"/>
           </a:p>
@@ -1526,7 +1527,7 @@
           <a:p>
             <a:fld id="{846CE7D5-CF57-46EF-B807-FDD0502418D4}" type="datetimeFigureOut">
               <a:rPr lang="en-US" smtClean="0"/>
-              <a:t>10/16/2023</a:t>
+              <a:t>10/17/2023</a:t>
             </a:fld>
             <a:endParaRPr lang="en-US"/>
           </a:p>
@@ -1696,7 +1697,7 @@
           <a:p>
             <a:fld id="{846CE7D5-CF57-46EF-B807-FDD0502418D4}" type="datetimeFigureOut">
               <a:rPr lang="en-US" smtClean="0"/>
-              <a:t>10/16/2023</a:t>
+              <a:t>10/17/2023</a:t>
             </a:fld>
             <a:endParaRPr lang="en-US"/>
           </a:p>
@@ -1942,7 +1943,7 @@
           <a:p>
             <a:fld id="{846CE7D5-CF57-46EF-B807-FDD0502418D4}" type="datetimeFigureOut">
               <a:rPr lang="en-US" smtClean="0"/>
-              <a:t>10/16/2023</a:t>
+              <a:t>10/17/2023</a:t>
             </a:fld>
             <a:endParaRPr lang="en-US"/>
           </a:p>
@@ -2174,7 +2175,7 @@
           <a:p>
             <a:fld id="{846CE7D5-CF57-46EF-B807-FDD0502418D4}" type="datetimeFigureOut">
               <a:rPr lang="en-US" smtClean="0"/>
-              <a:t>10/16/2023</a:t>
+              <a:t>10/17/2023</a:t>
             </a:fld>
             <a:endParaRPr lang="en-US"/>
           </a:p>
@@ -2541,7 +2542,7 @@
           <a:p>
             <a:fld id="{846CE7D5-CF57-46EF-B807-FDD0502418D4}" type="datetimeFigureOut">
               <a:rPr lang="en-US" smtClean="0"/>
-              <a:t>10/16/2023</a:t>
+              <a:t>10/17/2023</a:t>
             </a:fld>
             <a:endParaRPr lang="en-US"/>
           </a:p>
@@ -2659,7 +2660,7 @@
           <a:p>
             <a:fld id="{846CE7D5-CF57-46EF-B807-FDD0502418D4}" type="datetimeFigureOut">
               <a:rPr lang="en-US" smtClean="0"/>
-              <a:t>10/16/2023</a:t>
+              <a:t>10/17/2023</a:t>
             </a:fld>
             <a:endParaRPr lang="en-US"/>
           </a:p>
@@ -2754,7 +2755,7 @@
           <a:p>
             <a:fld id="{846CE7D5-CF57-46EF-B807-FDD0502418D4}" type="datetimeFigureOut">
               <a:rPr lang="en-US" smtClean="0"/>
-              <a:t>10/16/2023</a:t>
+              <a:t>10/17/2023</a:t>
             </a:fld>
             <a:endParaRPr lang="en-US"/>
           </a:p>
@@ -3031,7 +3032,7 @@
           <a:p>
             <a:fld id="{846CE7D5-CF57-46EF-B807-FDD0502418D4}" type="datetimeFigureOut">
               <a:rPr lang="en-US" smtClean="0"/>
-              <a:t>10/16/2023</a:t>
+              <a:t>10/17/2023</a:t>
             </a:fld>
             <a:endParaRPr lang="en-US"/>
           </a:p>
@@ -3288,7 +3289,7 @@
           <a:p>
             <a:fld id="{846CE7D5-CF57-46EF-B807-FDD0502418D4}" type="datetimeFigureOut">
               <a:rPr lang="en-US" smtClean="0"/>
-              <a:t>10/16/2023</a:t>
+              <a:t>10/17/2023</a:t>
             </a:fld>
             <a:endParaRPr lang="en-US"/>
           </a:p>
@@ -3513,7 +3514,7 @@
           <a:p>
             <a:fld id="{846CE7D5-CF57-46EF-B807-FDD0502418D4}" type="datetimeFigureOut">
               <a:rPr lang="en-US" smtClean="0"/>
-              <a:t>10/16/2023</a:t>
+              <a:t>10/17/2023</a:t>
             </a:fld>
             <a:endParaRPr lang="en-US"/>
           </a:p>
@@ -6212,6 +6213,41 @@
           </a:extLst>
         </p:spPr>
       </p:pic>
+      <p:sp>
+        <p:nvSpPr>
+          <p:cNvPr id="3" name="TextBox 2">
+            <a:extLst>
+              <a:ext uri="{FF2B5EF4-FFF2-40B4-BE49-F238E27FC236}">
+                <a16:creationId xmlns:a16="http://schemas.microsoft.com/office/drawing/2014/main" id="{A5D5FF03-11D7-4E32-6C31-4F77B45817AD}"/>
+              </a:ext>
+            </a:extLst>
+          </p:cNvPr>
+          <p:cNvSpPr txBox="1"/>
+          <p:nvPr/>
+        </p:nvSpPr>
+        <p:spPr>
+          <a:xfrm>
+            <a:off x="2830048" y="5855858"/>
+            <a:ext cx="7640244" cy="923330"/>
+          </a:xfrm>
+          <a:prstGeom prst="rect">
+            <a:avLst/>
+          </a:prstGeom>
+          <a:noFill/>
+        </p:spPr>
+        <p:txBody>
+          <a:bodyPr wrap="square" rtlCol="0">
+            <a:spAutoFit/>
+          </a:bodyPr>
+          <a:lstStyle/>
+          <a:p>
+            <a:r>
+              <a:rPr lang="en-GB" dirty="0"/>
+              <a:t>This game hopes to combine that with high speeds and the corresponding dynamic decision-making. Hopefully resulting in wacky game with the most unexpectedly high technical skill ceiling</a:t>
+            </a:r>
+          </a:p>
+        </p:txBody>
+      </p:sp>
     </p:spTree>
     <p:extLst>
       <p:ext uri="{BB962C8B-B14F-4D97-AF65-F5344CB8AC3E}">
@@ -6226,6 +6262,214 @@
 </file>
 
 <file path=ppt/slides/slide12.xml><?xml version="1.0" encoding="utf-8"?>
+<p:sld xmlns:a="http://schemas.openxmlformats.org/drawingml/2006/main" xmlns:r="http://schemas.openxmlformats.org/officeDocument/2006/relationships" xmlns:p="http://schemas.openxmlformats.org/presentationml/2006/main">
+  <p:cSld>
+    <p:spTree>
+      <p:nvGrpSpPr>
+        <p:cNvPr id="1" name=""/>
+        <p:cNvGrpSpPr/>
+        <p:nvPr/>
+      </p:nvGrpSpPr>
+      <p:grpSpPr>
+        <a:xfrm>
+          <a:off x="0" y="0"/>
+          <a:ext cx="0" cy="0"/>
+          <a:chOff x="0" y="0"/>
+          <a:chExt cx="0" cy="0"/>
+        </a:xfrm>
+      </p:grpSpPr>
+      <p:sp>
+        <p:nvSpPr>
+          <p:cNvPr id="2" name="Title 1">
+            <a:extLst>
+              <a:ext uri="{FF2B5EF4-FFF2-40B4-BE49-F238E27FC236}">
+                <a16:creationId xmlns:a16="http://schemas.microsoft.com/office/drawing/2014/main" id="{5C4132F1-9311-30FF-7FD5-6039FF1A4A1C}"/>
+              </a:ext>
+            </a:extLst>
+          </p:cNvPr>
+          <p:cNvSpPr>
+            <a:spLocks noGrp="1"/>
+          </p:cNvSpPr>
+          <p:nvPr>
+            <p:ph type="title"/>
+          </p:nvPr>
+        </p:nvSpPr>
+        <p:spPr/>
+        <p:txBody>
+          <a:bodyPr/>
+          <a:lstStyle/>
+          <a:p>
+            <a:r>
+              <a:rPr lang="en-GB" dirty="0"/>
+              <a:t>Core Gameplay Inspiration</a:t>
+            </a:r>
+          </a:p>
+        </p:txBody>
+      </p:sp>
+      <p:pic>
+        <p:nvPicPr>
+          <p:cNvPr id="4" name="Picture 2" descr="Image result for gang beasts punch force mod">
+            <a:extLst>
+              <a:ext uri="{FF2B5EF4-FFF2-40B4-BE49-F238E27FC236}">
+                <a16:creationId xmlns:a16="http://schemas.microsoft.com/office/drawing/2014/main" id="{350C4873-1747-F449-B241-13AED5B2450E}"/>
+              </a:ext>
+            </a:extLst>
+          </p:cNvPr>
+          <p:cNvPicPr>
+            <a:picLocks noChangeAspect="1" noChangeArrowheads="1"/>
+          </p:cNvPicPr>
+          <p:nvPr/>
+        </p:nvPicPr>
+        <p:blipFill rotWithShape="1">
+          <a:blip r:embed="rId2">
+            <a:extLst>
+              <a:ext uri="{28A0092B-C50C-407E-A947-70E740481C1C}">
+                <a14:useLocalDpi xmlns:a14="http://schemas.microsoft.com/office/drawing/2010/main" val="0"/>
+              </a:ext>
+            </a:extLst>
+          </a:blip>
+          <a:srcRect r="23112" b="21217"/>
+          <a:stretch/>
+        </p:blipFill>
+        <p:spPr bwMode="auto">
+          <a:xfrm>
+            <a:off x="227121" y="2564743"/>
+            <a:ext cx="2571059" cy="1559854"/>
+          </a:xfrm>
+          <a:prstGeom prst="rect">
+            <a:avLst/>
+          </a:prstGeom>
+          <a:noFill/>
+          <a:extLst>
+            <a:ext uri="{909E8E84-426E-40DD-AFC4-6F175D3DCCD1}">
+              <a14:hiddenFill xmlns:a14="http://schemas.microsoft.com/office/drawing/2010/main">
+                <a:solidFill>
+                  <a:srgbClr val="FFFFFF"/>
+                </a:solidFill>
+              </a14:hiddenFill>
+            </a:ext>
+          </a:extLst>
+        </p:spPr>
+      </p:pic>
+      <p:sp>
+        <p:nvSpPr>
+          <p:cNvPr id="5" name="TextBox 4">
+            <a:extLst>
+              <a:ext uri="{FF2B5EF4-FFF2-40B4-BE49-F238E27FC236}">
+                <a16:creationId xmlns:a16="http://schemas.microsoft.com/office/drawing/2014/main" id="{B064BEE8-BC07-75E8-2F93-A0F9A109A6E5}"/>
+              </a:ext>
+            </a:extLst>
+          </p:cNvPr>
+          <p:cNvSpPr txBox="1"/>
+          <p:nvPr/>
+        </p:nvSpPr>
+        <p:spPr>
+          <a:xfrm>
+            <a:off x="155643" y="1877438"/>
+            <a:ext cx="2714017" cy="646331"/>
+          </a:xfrm>
+          <a:prstGeom prst="rect">
+            <a:avLst/>
+          </a:prstGeom>
+          <a:noFill/>
+        </p:spPr>
+        <p:txBody>
+          <a:bodyPr wrap="square" rtlCol="0">
+            <a:spAutoFit/>
+          </a:bodyPr>
+          <a:lstStyle/>
+          <a:p>
+            <a:r>
+              <a:rPr lang="en-GB" dirty="0"/>
+              <a:t>We modelled our attacks and dodges on Gang beast</a:t>
+            </a:r>
+          </a:p>
+        </p:txBody>
+      </p:sp>
+      <p:sp>
+        <p:nvSpPr>
+          <p:cNvPr id="6" name="TextBox 5">
+            <a:extLst>
+              <a:ext uri="{FF2B5EF4-FFF2-40B4-BE49-F238E27FC236}">
+                <a16:creationId xmlns:a16="http://schemas.microsoft.com/office/drawing/2014/main" id="{D853958E-3261-981B-8D4F-973C9C4F0918}"/>
+              </a:ext>
+            </a:extLst>
+          </p:cNvPr>
+          <p:cNvSpPr txBox="1"/>
+          <p:nvPr/>
+        </p:nvSpPr>
+        <p:spPr>
+          <a:xfrm>
+            <a:off x="2798180" y="2606006"/>
+            <a:ext cx="2714017" cy="1477328"/>
+          </a:xfrm>
+          <a:prstGeom prst="rect">
+            <a:avLst/>
+          </a:prstGeom>
+          <a:noFill/>
+        </p:spPr>
+        <p:txBody>
+          <a:bodyPr wrap="square" rtlCol="0">
+            <a:spAutoFit/>
+          </a:bodyPr>
+          <a:lstStyle/>
+          <a:p>
+            <a:r>
+              <a:rPr lang="en-GB" dirty="0"/>
+              <a:t>Physics can be surprisingly technical, dodging then using that momentum to attack. That is what we wanted for ourselves.</a:t>
+            </a:r>
+          </a:p>
+        </p:txBody>
+      </p:sp>
+      <p:sp>
+        <p:nvSpPr>
+          <p:cNvPr id="7" name="TextBox 6">
+            <a:extLst>
+              <a:ext uri="{FF2B5EF4-FFF2-40B4-BE49-F238E27FC236}">
+                <a16:creationId xmlns:a16="http://schemas.microsoft.com/office/drawing/2014/main" id="{27F7B866-F21B-6157-B97D-A81E19114312}"/>
+              </a:ext>
+            </a:extLst>
+          </p:cNvPr>
+          <p:cNvSpPr txBox="1"/>
+          <p:nvPr/>
+        </p:nvSpPr>
+        <p:spPr>
+          <a:xfrm>
+            <a:off x="3381983" y="5140537"/>
+            <a:ext cx="4320395" cy="1477328"/>
+          </a:xfrm>
+          <a:prstGeom prst="rect">
+            <a:avLst/>
+          </a:prstGeom>
+          <a:noFill/>
+        </p:spPr>
+        <p:txBody>
+          <a:bodyPr wrap="square" rtlCol="0">
+            <a:spAutoFit/>
+          </a:bodyPr>
+          <a:lstStyle/>
+          <a:p>
+            <a:r>
+              <a:rPr lang="en-GB" dirty="0"/>
+              <a:t>This game hopes to combine that with high speeds and the corresponding dynamic decision-making. Hopefully resulting in wacky game with the most unexpectedly high technical skill ceiling</a:t>
+            </a:r>
+          </a:p>
+        </p:txBody>
+      </p:sp>
+    </p:spTree>
+    <p:extLst>
+      <p:ext uri="{BB962C8B-B14F-4D97-AF65-F5344CB8AC3E}">
+        <p14:creationId xmlns:p14="http://schemas.microsoft.com/office/powerpoint/2010/main" val="2874293980"/>
+      </p:ext>
+    </p:extLst>
+  </p:cSld>
+  <p:clrMapOvr>
+    <a:masterClrMapping/>
+  </p:clrMapOvr>
+</p:sld>
+</file>
+
+<file path=ppt/slides/slide13.xml><?xml version="1.0" encoding="utf-8"?>
 <p:sld xmlns:a="http://schemas.openxmlformats.org/drawingml/2006/main" xmlns:r="http://schemas.openxmlformats.org/officeDocument/2006/relationships" xmlns:p="http://schemas.openxmlformats.org/presentationml/2006/main">
   <p:cSld>
     <p:spTree>
@@ -6330,7 +6574,7 @@
 </p:sld>
 </file>
 
-<file path=ppt/slides/slide13.xml><?xml version="1.0" encoding="utf-8"?>
+<file path=ppt/slides/slide14.xml><?xml version="1.0" encoding="utf-8"?>
 <p:sld xmlns:a="http://schemas.openxmlformats.org/drawingml/2006/main" xmlns:r="http://schemas.openxmlformats.org/officeDocument/2006/relationships" xmlns:p="http://schemas.openxmlformats.org/presentationml/2006/main">
   <p:cSld>
     <p:bg>
@@ -6415,147 +6659,6 @@
     <p:extLst>
       <p:ext uri="{BB962C8B-B14F-4D97-AF65-F5344CB8AC3E}">
         <p14:creationId xmlns:p14="http://schemas.microsoft.com/office/powerpoint/2010/main" val="2198181579"/>
-      </p:ext>
-    </p:extLst>
-  </p:cSld>
-  <p:clrMapOvr>
-    <a:masterClrMapping/>
-  </p:clrMapOvr>
-</p:sld>
-</file>
-
-<file path=ppt/slides/slide14.xml><?xml version="1.0" encoding="utf-8"?>
-<p:sld xmlns:a="http://schemas.openxmlformats.org/drawingml/2006/main" xmlns:r="http://schemas.openxmlformats.org/officeDocument/2006/relationships" xmlns:p="http://schemas.openxmlformats.org/presentationml/2006/main">
-  <p:cSld>
-    <p:spTree>
-      <p:nvGrpSpPr>
-        <p:cNvPr id="1" name=""/>
-        <p:cNvGrpSpPr/>
-        <p:nvPr/>
-      </p:nvGrpSpPr>
-      <p:grpSpPr>
-        <a:xfrm>
-          <a:off x="0" y="0"/>
-          <a:ext cx="0" cy="0"/>
-          <a:chOff x="0" y="0"/>
-          <a:chExt cx="0" cy="0"/>
-        </a:xfrm>
-      </p:grpSpPr>
-      <p:sp>
-        <p:nvSpPr>
-          <p:cNvPr id="2" name="Title 1">
-            <a:extLst>
-              <a:ext uri="{FF2B5EF4-FFF2-40B4-BE49-F238E27FC236}">
-                <a16:creationId xmlns:a16="http://schemas.microsoft.com/office/drawing/2014/main" id="{739CC088-5730-6A40-542B-19A924F066DA}"/>
-              </a:ext>
-            </a:extLst>
-          </p:cNvPr>
-          <p:cNvSpPr>
-            <a:spLocks noGrp="1"/>
-          </p:cNvSpPr>
-          <p:nvPr>
-            <p:ph type="title"/>
-          </p:nvPr>
-        </p:nvSpPr>
-        <p:spPr/>
-        <p:txBody>
-          <a:bodyPr/>
-          <a:lstStyle/>
-          <a:p>
-            <a:r>
-              <a:rPr lang="en-US" dirty="0">
-                <a:cs typeface="Calibri Light"/>
-              </a:rPr>
-              <a:t>Area Claiming</a:t>
-            </a:r>
-          </a:p>
-        </p:txBody>
-      </p:sp>
-      <p:sp>
-        <p:nvSpPr>
-          <p:cNvPr id="3" name="Content Placeholder 2">
-            <a:extLst>
-              <a:ext uri="{FF2B5EF4-FFF2-40B4-BE49-F238E27FC236}">
-                <a16:creationId xmlns:a16="http://schemas.microsoft.com/office/drawing/2014/main" id="{2FF61C8D-E54D-EC4C-219F-08FD66290642}"/>
-              </a:ext>
-            </a:extLst>
-          </p:cNvPr>
-          <p:cNvSpPr>
-            <a:spLocks noGrp="1"/>
-          </p:cNvSpPr>
-          <p:nvPr>
-            <p:ph idx="1"/>
-          </p:nvPr>
-        </p:nvSpPr>
-        <p:spPr/>
-        <p:txBody>
-          <a:bodyPr vert="horz" lIns="91440" tIns="45720" rIns="91440" bIns="45720" rtlCol="0" anchor="t">
-            <a:normAutofit/>
-          </a:bodyPr>
-          <a:lstStyle/>
-          <a:p>
-            <a:r>
-              <a:rPr lang="en-US" dirty="0">
-                <a:cs typeface="Calibri"/>
-              </a:rPr>
-              <a:t>Story wise the player is a new contestant fighting veteran contestants that were given their own areas, it stands to reason the player should get their own as well.</a:t>
-            </a:r>
-          </a:p>
-          <a:p>
-            <a:r>
-              <a:rPr lang="en-US" dirty="0">
-                <a:cs typeface="Calibri"/>
-              </a:rPr>
-              <a:t>Two ways I see it working (maybe do both) allows players to either make a level for other players to challenge, or let each stage be used as communal areas after completion that the players can use as hubs to talk to NPC's with</a:t>
-            </a:r>
-          </a:p>
-        </p:txBody>
-      </p:sp>
-      <p:sp>
-        <p:nvSpPr>
-          <p:cNvPr id="4" name="TextBox 3">
-            <a:extLst>
-              <a:ext uri="{FF2B5EF4-FFF2-40B4-BE49-F238E27FC236}">
-                <a16:creationId xmlns:a16="http://schemas.microsoft.com/office/drawing/2014/main" id="{5B3DEFA4-046C-B6CB-9A08-ED07BFEC8068}"/>
-              </a:ext>
-            </a:extLst>
-          </p:cNvPr>
-          <p:cNvSpPr txBox="1"/>
-          <p:nvPr/>
-        </p:nvSpPr>
-        <p:spPr>
-          <a:xfrm>
-            <a:off x="1726162" y="5295122"/>
-            <a:ext cx="4237653" cy="646331"/>
-          </a:xfrm>
-          <a:prstGeom prst="rect">
-            <a:avLst/>
-          </a:prstGeom>
-          <a:noFill/>
-        </p:spPr>
-        <p:txBody>
-          <a:bodyPr rot="0" spcFirstLastPara="0" vertOverflow="overflow" horzOverflow="overflow" vert="horz" wrap="square" lIns="91440" tIns="45720" rIns="91440" bIns="45720" numCol="1" spcCol="0" rtlCol="0" fromWordArt="0" anchor="t" anchorCtr="0" forceAA="0" compatLnSpc="1">
-            <a:prstTxWarp prst="textNoShape">
-              <a:avLst/>
-            </a:prstTxWarp>
-            <a:spAutoFit/>
-          </a:bodyPr>
-          <a:lstStyle/>
-          <a:p>
-            <a:r>
-              <a:rPr lang="en-US" dirty="0">
-                <a:cs typeface="Calibri"/>
-              </a:rPr>
-              <a:t>Note – page too wordy, Summaries this page &amp; add images</a:t>
-            </a:r>
-            <a:endParaRPr lang="en-US" dirty="0"/>
-          </a:p>
-        </p:txBody>
-      </p:sp>
-    </p:spTree>
-    <p:extLst>
-      <p:ext uri="{BB962C8B-B14F-4D97-AF65-F5344CB8AC3E}">
-        <p14:creationId xmlns:p14="http://schemas.microsoft.com/office/powerpoint/2010/main" val="3248092553"/>
       </p:ext>
     </p:extLst>
   </p:cSld>
@@ -6607,9 +6710,8 @@
               <a:rPr lang="en-US" dirty="0">
                 <a:cs typeface="Calibri Light"/>
               </a:rPr>
-              <a:t>Costumes</a:t>
-            </a:r>
-            <a:endParaRPr lang="en-US" dirty="0"/>
+              <a:t>Area Claiming</a:t>
+            </a:r>
           </a:p>
         </p:txBody>
       </p:sp>
@@ -6640,7 +6742,7 @@
               <a:rPr lang="en-US" dirty="0">
                 <a:cs typeface="Calibri"/>
               </a:rPr>
-              <a:t>The enemies are in costume, why not the player too (the only reason is lack of time and resources)</a:t>
+              <a:t>Story wise the player is a new contestant fighting veteran contestants that were given their own areas, it stands to reason the player should get their own as well.</a:t>
             </a:r>
           </a:p>
           <a:p>
@@ -6648,15 +6750,56 @@
               <a:rPr lang="en-US" dirty="0">
                 <a:cs typeface="Calibri"/>
               </a:rPr>
-              <a:t>Could even unlock costume pieces from enemies the player defeats</a:t>
-            </a:r>
+              <a:t>Two ways I see it working (maybe do both) allows players to either make a level for other players to challenge, or let each stage be used as communal areas after completion that the players can use as hubs to talk to NPC's with</a:t>
+            </a:r>
+          </a:p>
+        </p:txBody>
+      </p:sp>
+      <p:sp>
+        <p:nvSpPr>
+          <p:cNvPr id="4" name="TextBox 3">
+            <a:extLst>
+              <a:ext uri="{FF2B5EF4-FFF2-40B4-BE49-F238E27FC236}">
+                <a16:creationId xmlns:a16="http://schemas.microsoft.com/office/drawing/2014/main" id="{5B3DEFA4-046C-B6CB-9A08-ED07BFEC8068}"/>
+              </a:ext>
+            </a:extLst>
+          </p:cNvPr>
+          <p:cNvSpPr txBox="1"/>
+          <p:nvPr/>
+        </p:nvSpPr>
+        <p:spPr>
+          <a:xfrm>
+            <a:off x="1726162" y="5295122"/>
+            <a:ext cx="4237653" cy="646331"/>
+          </a:xfrm>
+          <a:prstGeom prst="rect">
+            <a:avLst/>
+          </a:prstGeom>
+          <a:noFill/>
+        </p:spPr>
+        <p:txBody>
+          <a:bodyPr rot="0" spcFirstLastPara="0" vertOverflow="overflow" horzOverflow="overflow" vert="horz" wrap="square" lIns="91440" tIns="45720" rIns="91440" bIns="45720" numCol="1" spcCol="0" rtlCol="0" fromWordArt="0" anchor="t" anchorCtr="0" forceAA="0" compatLnSpc="1">
+            <a:prstTxWarp prst="textNoShape">
+              <a:avLst/>
+            </a:prstTxWarp>
+            <a:spAutoFit/>
+          </a:bodyPr>
+          <a:lstStyle/>
+          <a:p>
+            <a:r>
+              <a:rPr lang="en-US" dirty="0">
+                <a:cs typeface="Calibri"/>
+              </a:rPr>
+              <a:t>Note – page too wordy, Summaries this page &amp; add images</a:t>
+            </a:r>
+            <a:endParaRPr lang="en-US" dirty="0"/>
           </a:p>
         </p:txBody>
       </p:sp>
     </p:spTree>
     <p:extLst>
       <p:ext uri="{BB962C8B-B14F-4D97-AF65-F5344CB8AC3E}">
-        <p14:creationId xmlns:p14="http://schemas.microsoft.com/office/powerpoint/2010/main" val="2923504476"/>
+        <p14:creationId xmlns:p14="http://schemas.microsoft.com/office/powerpoint/2010/main" val="3248092553"/>
       </p:ext>
     </p:extLst>
   </p:cSld>
@@ -6708,7 +6851,7 @@
               <a:rPr lang="en-US" dirty="0">
                 <a:cs typeface="Calibri Light"/>
               </a:rPr>
-              <a:t>Implementation that requires Polish</a:t>
+              <a:t>Costumes</a:t>
             </a:r>
             <a:endParaRPr lang="en-US" dirty="0"/>
           </a:p>
@@ -6741,7 +6884,15 @@
               <a:rPr lang="en-US" dirty="0">
                 <a:cs typeface="Calibri"/>
               </a:rPr>
-              <a:t>These are in game, but could use refining to meet our intention</a:t>
+              <a:t>The enemies are in costume, why not the player too (the only reason is lack of time and resources)</a:t>
+            </a:r>
+          </a:p>
+          <a:p>
+            <a:r>
+              <a:rPr lang="en-US" dirty="0">
+                <a:cs typeface="Calibri"/>
+              </a:rPr>
+              <a:t>Could even unlock costume pieces from enemies the player defeats</a:t>
             </a:r>
           </a:p>
         </p:txBody>
@@ -6749,7 +6900,7 @@
     </p:spTree>
     <p:extLst>
       <p:ext uri="{BB962C8B-B14F-4D97-AF65-F5344CB8AC3E}">
-        <p14:creationId xmlns:p14="http://schemas.microsoft.com/office/powerpoint/2010/main" val="1322337264"/>
+        <p14:creationId xmlns:p14="http://schemas.microsoft.com/office/powerpoint/2010/main" val="2923504476"/>
       </p:ext>
     </p:extLst>
   </p:cSld>
@@ -6781,7 +6932,7 @@
           <p:cNvPr id="2" name="Title 1">
             <a:extLst>
               <a:ext uri="{FF2B5EF4-FFF2-40B4-BE49-F238E27FC236}">
-                <a16:creationId xmlns:a16="http://schemas.microsoft.com/office/drawing/2014/main" id="{F74824CB-C71E-86C0-6E64-408ECAB51A0F}"/>
+                <a16:creationId xmlns:a16="http://schemas.microsoft.com/office/drawing/2014/main" id="{739CC088-5730-6A40-542B-19A924F066DA}"/>
               </a:ext>
             </a:extLst>
           </p:cNvPr>
@@ -6799,10 +6950,9 @@
           <a:p>
             <a:r>
               <a:rPr lang="en-US" dirty="0">
-                <a:ea typeface="Calibri Light"/>
                 <a:cs typeface="Calibri Light"/>
               </a:rPr>
-              <a:t>Interaction</a:t>
+              <a:t>Implementation that requires Polish</a:t>
             </a:r>
             <a:endParaRPr lang="en-US" dirty="0"/>
           </a:p>
@@ -6813,7 +6963,7 @@
           <p:cNvPr id="3" name="Content Placeholder 2">
             <a:extLst>
               <a:ext uri="{FF2B5EF4-FFF2-40B4-BE49-F238E27FC236}">
-                <a16:creationId xmlns:a16="http://schemas.microsoft.com/office/drawing/2014/main" id="{72DEA321-32E2-440C-635F-BBC9E0E1A05F}"/>
+                <a16:creationId xmlns:a16="http://schemas.microsoft.com/office/drawing/2014/main" id="{2FF61C8D-E54D-EC4C-219F-08FD66290642}"/>
               </a:ext>
             </a:extLst>
           </p:cNvPr>
@@ -6833,19 +6983,17 @@
           <a:p>
             <a:r>
               <a:rPr lang="en-US" dirty="0">
-                <a:ea typeface="Calibri"/>
                 <a:cs typeface="Calibri"/>
               </a:rPr>
-              <a:t>[Controls layout]</a:t>
-            </a:r>
-            <a:endParaRPr lang="en-US" dirty="0"/>
+              <a:t>These are in game, but could use refining to meet our intention</a:t>
+            </a:r>
           </a:p>
         </p:txBody>
       </p:sp>
     </p:spTree>
     <p:extLst>
       <p:ext uri="{BB962C8B-B14F-4D97-AF65-F5344CB8AC3E}">
-        <p14:creationId xmlns:p14="http://schemas.microsoft.com/office/powerpoint/2010/main" val="1229603757"/>
+        <p14:creationId xmlns:p14="http://schemas.microsoft.com/office/powerpoint/2010/main" val="1322337264"/>
       </p:ext>
     </p:extLst>
   </p:cSld>
@@ -6877,7 +7025,7 @@
           <p:cNvPr id="2" name="Title 1">
             <a:extLst>
               <a:ext uri="{FF2B5EF4-FFF2-40B4-BE49-F238E27FC236}">
-                <a16:creationId xmlns:a16="http://schemas.microsoft.com/office/drawing/2014/main" id="{5062687C-677B-942A-9161-3269826DDD4E}"/>
+                <a16:creationId xmlns:a16="http://schemas.microsoft.com/office/drawing/2014/main" id="{F74824CB-C71E-86C0-6E64-408ECAB51A0F}"/>
               </a:ext>
             </a:extLst>
           </p:cNvPr>
@@ -6898,7 +7046,7 @@
                 <a:ea typeface="Calibri Light"/>
                 <a:cs typeface="Calibri Light"/>
               </a:rPr>
-              <a:t>Equipment</a:t>
+              <a:t>Interaction</a:t>
             </a:r>
             <a:endParaRPr lang="en-US" dirty="0"/>
           </a:p>
@@ -6909,7 +7057,7 @@
           <p:cNvPr id="3" name="Content Placeholder 2">
             <a:extLst>
               <a:ext uri="{FF2B5EF4-FFF2-40B4-BE49-F238E27FC236}">
-                <a16:creationId xmlns:a16="http://schemas.microsoft.com/office/drawing/2014/main" id="{13076D57-4FD0-3765-E109-74F461A8F626}"/>
+                <a16:creationId xmlns:a16="http://schemas.microsoft.com/office/drawing/2014/main" id="{72DEA321-32E2-440C-635F-BBC9E0E1A05F}"/>
               </a:ext>
             </a:extLst>
           </p:cNvPr>
@@ -6922,20 +7070,26 @@
         </p:nvSpPr>
         <p:spPr/>
         <p:txBody>
-          <a:bodyPr/>
+          <a:bodyPr vert="horz" lIns="91440" tIns="45720" rIns="91440" bIns="45720" rtlCol="0" anchor="t">
+            <a:normAutofit/>
+          </a:bodyPr>
           <a:lstStyle/>
           <a:p>
             <a:r>
-              <a:rPr lang="en-US" dirty="0"/>
-              <a:t>We don’t need many buttons, so we could bind each equip key to corelating socket</a:t>
-            </a:r>
+              <a:rPr lang="en-US" dirty="0">
+                <a:ea typeface="Calibri"/>
+                <a:cs typeface="Calibri"/>
+              </a:rPr>
+              <a:t>[Controls layout]</a:t>
+            </a:r>
+            <a:endParaRPr lang="en-US" dirty="0"/>
           </a:p>
         </p:txBody>
       </p:sp>
     </p:spTree>
     <p:extLst>
       <p:ext uri="{BB962C8B-B14F-4D97-AF65-F5344CB8AC3E}">
-        <p14:creationId xmlns:p14="http://schemas.microsoft.com/office/powerpoint/2010/main" val="3340763177"/>
+        <p14:creationId xmlns:p14="http://schemas.microsoft.com/office/powerpoint/2010/main" val="1229603757"/>
       </p:ext>
     </p:extLst>
   </p:cSld>
@@ -6948,14 +7102,6 @@
 <file path=ppt/slides/slide19.xml><?xml version="1.0" encoding="utf-8"?>
 <p:sld xmlns:a="http://schemas.openxmlformats.org/drawingml/2006/main" xmlns:r="http://schemas.openxmlformats.org/officeDocument/2006/relationships" xmlns:p="http://schemas.openxmlformats.org/presentationml/2006/main">
   <p:cSld>
-    <p:bg>
-      <p:bgPr>
-        <a:solidFill>
-          <a:srgbClr val="AB0C3F"/>
-        </a:solidFill>
-        <a:effectLst/>
-      </p:bgPr>
-    </p:bg>
     <p:spTree>
       <p:nvGrpSpPr>
         <p:cNvPr id="1" name=""/>
@@ -6975,7 +7121,7 @@
           <p:cNvPr id="2" name="Title 1">
             <a:extLst>
               <a:ext uri="{FF2B5EF4-FFF2-40B4-BE49-F238E27FC236}">
-                <a16:creationId xmlns:a16="http://schemas.microsoft.com/office/drawing/2014/main" id="{33853892-B666-D0E8-53B5-3E3EA21A93B5}"/>
+                <a16:creationId xmlns:a16="http://schemas.microsoft.com/office/drawing/2014/main" id="{5062687C-677B-942A-9161-3269826DDD4E}"/>
               </a:ext>
             </a:extLst>
           </p:cNvPr>
@@ -6996,7 +7142,7 @@
                 <a:ea typeface="Calibri Light"/>
                 <a:cs typeface="Calibri Light"/>
               </a:rPr>
-              <a:t>Items</a:t>
+              <a:t>Equipment</a:t>
             </a:r>
             <a:endParaRPr lang="en-US" dirty="0"/>
           </a:p>
@@ -7004,10 +7150,10 @@
       </p:sp>
       <p:sp>
         <p:nvSpPr>
-          <p:cNvPr id="3" name="Text Placeholder 2">
-            <a:extLst>
-              <a:ext uri="{FF2B5EF4-FFF2-40B4-BE49-F238E27FC236}">
-                <a16:creationId xmlns:a16="http://schemas.microsoft.com/office/drawing/2014/main" id="{AA040531-FDB5-F587-FDD8-F50D03731BA7}"/>
+          <p:cNvPr id="3" name="Content Placeholder 2">
+            <a:extLst>
+              <a:ext uri="{FF2B5EF4-FFF2-40B4-BE49-F238E27FC236}">
+                <a16:creationId xmlns:a16="http://schemas.microsoft.com/office/drawing/2014/main" id="{13076D57-4FD0-3765-E109-74F461A8F626}"/>
               </a:ext>
             </a:extLst>
           </p:cNvPr>
@@ -7015,7 +7161,7 @@
             <a:spLocks noGrp="1"/>
           </p:cNvSpPr>
           <p:nvPr>
-            <p:ph type="body" idx="1"/>
+            <p:ph idx="1"/>
           </p:nvPr>
         </p:nvSpPr>
         <p:spPr/>
@@ -7023,14 +7169,17 @@
           <a:bodyPr/>
           <a:lstStyle/>
           <a:p>
-            <a:endParaRPr lang="en-US"/>
+            <a:r>
+              <a:rPr lang="en-US" dirty="0"/>
+              <a:t>We don’t need many buttons, so we could bind each equip key to corelating socket</a:t>
+            </a:r>
           </a:p>
         </p:txBody>
       </p:sp>
     </p:spTree>
     <p:extLst>
       <p:ext uri="{BB962C8B-B14F-4D97-AF65-F5344CB8AC3E}">
-        <p14:creationId xmlns:p14="http://schemas.microsoft.com/office/powerpoint/2010/main" val="4155801880"/>
+        <p14:creationId xmlns:p14="http://schemas.microsoft.com/office/powerpoint/2010/main" val="3340763177"/>
       </p:ext>
     </p:extLst>
   </p:cSld>
@@ -7847,10 +7996,10 @@
               <a:buChar char="•"/>
             </a:pPr>
             <a:r>
-              <a:rPr lang="en-US" sz="2800">
+              <a:rPr lang="en-US" sz="2800" dirty="0">
                 <a:cs typeface="Arial"/>
               </a:rPr>
-              <a:t>[I need to add images and a style/theme to slides]​</a:t>
+              <a:t>[I need to add images to slides]​</a:t>
             </a:r>
           </a:p>
         </p:txBody>
@@ -7869,93 +8018,6 @@
 </file>
 
 <file path=ppt/slides/slide20.xml><?xml version="1.0" encoding="utf-8"?>
-<p:sld xmlns:a="http://schemas.openxmlformats.org/drawingml/2006/main" xmlns:r="http://schemas.openxmlformats.org/officeDocument/2006/relationships" xmlns:p="http://schemas.openxmlformats.org/presentationml/2006/main">
-  <p:cSld>
-    <p:spTree>
-      <p:nvGrpSpPr>
-        <p:cNvPr id="1" name=""/>
-        <p:cNvGrpSpPr/>
-        <p:nvPr/>
-      </p:nvGrpSpPr>
-      <p:grpSpPr>
-        <a:xfrm>
-          <a:off x="0" y="0"/>
-          <a:ext cx="0" cy="0"/>
-          <a:chOff x="0" y="0"/>
-          <a:chExt cx="0" cy="0"/>
-        </a:xfrm>
-      </p:grpSpPr>
-      <p:sp>
-        <p:nvSpPr>
-          <p:cNvPr id="2" name="Title 1">
-            <a:extLst>
-              <a:ext uri="{FF2B5EF4-FFF2-40B4-BE49-F238E27FC236}">
-                <a16:creationId xmlns:a16="http://schemas.microsoft.com/office/drawing/2014/main" id="{C7C39EA6-9679-3FF5-4D31-191BA74CF9BC}"/>
-              </a:ext>
-            </a:extLst>
-          </p:cNvPr>
-          <p:cNvSpPr>
-            <a:spLocks noGrp="1"/>
-          </p:cNvSpPr>
-          <p:nvPr>
-            <p:ph type="title"/>
-          </p:nvPr>
-        </p:nvSpPr>
-        <p:spPr/>
-        <p:txBody>
-          <a:bodyPr/>
-          <a:lstStyle/>
-          <a:p>
-            <a:r>
-              <a:rPr lang="en-US" dirty="0">
-                <a:ea typeface="Calibri Light"/>
-                <a:cs typeface="Calibri Light"/>
-              </a:rPr>
-              <a:t>[Item-Category] Trolley</a:t>
-            </a:r>
-            <a:endParaRPr lang="en-US" dirty="0"/>
-          </a:p>
-        </p:txBody>
-      </p:sp>
-      <p:sp>
-        <p:nvSpPr>
-          <p:cNvPr id="3" name="Content Placeholder 2">
-            <a:extLst>
-              <a:ext uri="{FF2B5EF4-FFF2-40B4-BE49-F238E27FC236}">
-                <a16:creationId xmlns:a16="http://schemas.microsoft.com/office/drawing/2014/main" id="{34E60BDF-A173-9646-2EFB-CE447E9404EB}"/>
-              </a:ext>
-            </a:extLst>
-          </p:cNvPr>
-          <p:cNvSpPr>
-            <a:spLocks noGrp="1"/>
-          </p:cNvSpPr>
-          <p:nvPr>
-            <p:ph idx="1"/>
-          </p:nvPr>
-        </p:nvSpPr>
-        <p:spPr/>
-        <p:txBody>
-          <a:bodyPr/>
-          <a:lstStyle/>
-          <a:p>
-            <a:endParaRPr lang="en-US"/>
-          </a:p>
-        </p:txBody>
-      </p:sp>
-    </p:spTree>
-    <p:extLst>
-      <p:ext uri="{BB962C8B-B14F-4D97-AF65-F5344CB8AC3E}">
-        <p14:creationId xmlns:p14="http://schemas.microsoft.com/office/powerpoint/2010/main" val="1365072798"/>
-      </p:ext>
-    </p:extLst>
-  </p:cSld>
-  <p:clrMapOvr>
-    <a:masterClrMapping/>
-  </p:clrMapOvr>
-</p:sld>
-</file>
-
-<file path=ppt/slides/slide21.xml><?xml version="1.0" encoding="utf-8"?>
 <p:sld xmlns:a="http://schemas.openxmlformats.org/drawingml/2006/main" xmlns:r="http://schemas.openxmlformats.org/officeDocument/2006/relationships" xmlns:p="http://schemas.openxmlformats.org/presentationml/2006/main">
   <p:cSld>
     <p:bg>
@@ -7985,7 +8047,7 @@
           <p:cNvPr id="2" name="Title 1">
             <a:extLst>
               <a:ext uri="{FF2B5EF4-FFF2-40B4-BE49-F238E27FC236}">
-                <a16:creationId xmlns:a16="http://schemas.microsoft.com/office/drawing/2014/main" id="{6A730196-82C8-47C9-FBD8-ADD6F0339FB3}"/>
+                <a16:creationId xmlns:a16="http://schemas.microsoft.com/office/drawing/2014/main" id="{33853892-B666-D0E8-53B5-3E3EA21A93B5}"/>
               </a:ext>
             </a:extLst>
           </p:cNvPr>
@@ -8006,7 +8068,7 @@
                 <a:ea typeface="Calibri Light"/>
                 <a:cs typeface="Calibri Light"/>
               </a:rPr>
-              <a:t>Threats</a:t>
+              <a:t>Items</a:t>
             </a:r>
             <a:endParaRPr lang="en-US" dirty="0"/>
           </a:p>
@@ -8017,7 +8079,7 @@
           <p:cNvPr id="3" name="Text Placeholder 2">
             <a:extLst>
               <a:ext uri="{FF2B5EF4-FFF2-40B4-BE49-F238E27FC236}">
-                <a16:creationId xmlns:a16="http://schemas.microsoft.com/office/drawing/2014/main" id="{CF1F9F19-D725-1852-1C0D-7F7F4E190204}"/>
+                <a16:creationId xmlns:a16="http://schemas.microsoft.com/office/drawing/2014/main" id="{AA040531-FDB5-F587-FDD8-F50D03731BA7}"/>
               </a:ext>
             </a:extLst>
           </p:cNvPr>
@@ -8040,7 +8102,7 @@
     </p:spTree>
     <p:extLst>
       <p:ext uri="{BB962C8B-B14F-4D97-AF65-F5344CB8AC3E}">
-        <p14:creationId xmlns:p14="http://schemas.microsoft.com/office/powerpoint/2010/main" val="1475552678"/>
+        <p14:creationId xmlns:p14="http://schemas.microsoft.com/office/powerpoint/2010/main" val="4155801880"/>
       </p:ext>
     </p:extLst>
   </p:cSld>
@@ -8050,7 +8112,7 @@
 </p:sld>
 </file>
 
-<file path=ppt/slides/slide22.xml><?xml version="1.0" encoding="utf-8"?>
+<file path=ppt/slides/slide21.xml><?xml version="1.0" encoding="utf-8"?>
 <p:sld xmlns:a="http://schemas.openxmlformats.org/drawingml/2006/main" xmlns:r="http://schemas.openxmlformats.org/officeDocument/2006/relationships" xmlns:p="http://schemas.openxmlformats.org/presentationml/2006/main">
   <p:cSld>
     <p:spTree>
@@ -8072,7 +8134,7 @@
           <p:cNvPr id="2" name="Title 1">
             <a:extLst>
               <a:ext uri="{FF2B5EF4-FFF2-40B4-BE49-F238E27FC236}">
-                <a16:creationId xmlns:a16="http://schemas.microsoft.com/office/drawing/2014/main" id="{2F510B3C-B5D3-672A-E50D-68FC8DEC6E94}"/>
+                <a16:creationId xmlns:a16="http://schemas.microsoft.com/office/drawing/2014/main" id="{C7C39EA6-9679-3FF5-4D31-191BA74CF9BC}"/>
               </a:ext>
             </a:extLst>
           </p:cNvPr>
@@ -8093,7 +8155,7 @@
                 <a:ea typeface="Calibri Light"/>
                 <a:cs typeface="Calibri Light"/>
               </a:rPr>
-              <a:t>Basic Thug</a:t>
+              <a:t>[Item-Category] Trolley</a:t>
             </a:r>
             <a:endParaRPr lang="en-US" dirty="0"/>
           </a:p>
@@ -8104,7 +8166,7 @@
           <p:cNvPr id="3" name="Content Placeholder 2">
             <a:extLst>
               <a:ext uri="{FF2B5EF4-FFF2-40B4-BE49-F238E27FC236}">
-                <a16:creationId xmlns:a16="http://schemas.microsoft.com/office/drawing/2014/main" id="{34213A9F-A72E-C85A-E6F3-A17B97972F15}"/>
+                <a16:creationId xmlns:a16="http://schemas.microsoft.com/office/drawing/2014/main" id="{34E60BDF-A173-9646-2EFB-CE447E9404EB}"/>
               </a:ext>
             </a:extLst>
           </p:cNvPr>
@@ -8117,84 +8179,112 @@
         </p:nvSpPr>
         <p:spPr/>
         <p:txBody>
-          <a:bodyPr vert="horz" lIns="91440" tIns="45720" rIns="91440" bIns="45720" rtlCol="0" anchor="t">
-            <a:normAutofit/>
-          </a:bodyPr>
+          <a:bodyPr/>
           <a:lstStyle/>
           <a:p>
-            <a:r>
-              <a:rPr lang="en-US" dirty="0">
-                <a:ea typeface="Calibri"/>
-                <a:cs typeface="Calibri"/>
-              </a:rPr>
-              <a:t>We can add enemy variety with different weapons/equipment</a:t>
-            </a:r>
-          </a:p>
-          <a:p>
-            <a:r>
-              <a:rPr lang="en-US" dirty="0">
-                <a:ea typeface="Calibri"/>
-                <a:cs typeface="Calibri"/>
-              </a:rPr>
-              <a:t>Bosses could also add variety (if we </a:t>
-            </a:r>
-            <a:r>
-              <a:rPr lang="en-US" err="1">
-                <a:ea typeface="Calibri"/>
-                <a:cs typeface="Calibri"/>
-              </a:rPr>
-              <a:t>perscribe</a:t>
-            </a:r>
-            <a:r>
-              <a:rPr lang="en-US" dirty="0">
-                <a:ea typeface="Calibri"/>
-                <a:cs typeface="Calibri"/>
-              </a:rPr>
-              <a:t> sufficient time)</a:t>
-            </a:r>
-          </a:p>
-          <a:p>
-            <a:r>
-              <a:rPr lang="en-US" dirty="0">
-                <a:ea typeface="Calibri"/>
-                <a:cs typeface="Calibri"/>
-              </a:rPr>
-              <a:t>No weapons (so little damage)</a:t>
-            </a:r>
-          </a:p>
-          <a:p>
-            <a:r>
-              <a:rPr lang="en-US" dirty="0">
-                <a:ea typeface="Calibri"/>
-                <a:cs typeface="Calibri"/>
-              </a:rPr>
-              <a:t>Only option is to attack player with melee</a:t>
-            </a:r>
-          </a:p>
-          <a:p>
-            <a:r>
-              <a:rPr lang="en-US" dirty="0">
-                <a:ea typeface="Calibri"/>
-                <a:cs typeface="Calibri"/>
-              </a:rPr>
-              <a:t>{maybe we allow friendly fire – helps with the repetitive nature of melee enemies ganging up on the player, and also entertaining}</a:t>
-            </a:r>
-          </a:p>
-          <a:p>
-            <a:r>
-              <a:rPr lang="en-US" dirty="0">
-                <a:ea typeface="Calibri"/>
-                <a:cs typeface="Calibri"/>
-              </a:rPr>
-              <a:t>[each enemy weapon type we use will have it's own slide to allow for more detail]</a:t>
-            </a:r>
+            <a:endParaRPr lang="en-US"/>
           </a:p>
         </p:txBody>
       </p:sp>
     </p:spTree>
     <p:extLst>
       <p:ext uri="{BB962C8B-B14F-4D97-AF65-F5344CB8AC3E}">
-        <p14:creationId xmlns:p14="http://schemas.microsoft.com/office/powerpoint/2010/main" val="1839603197"/>
+        <p14:creationId xmlns:p14="http://schemas.microsoft.com/office/powerpoint/2010/main" val="1365072798"/>
+      </p:ext>
+    </p:extLst>
+  </p:cSld>
+  <p:clrMapOvr>
+    <a:masterClrMapping/>
+  </p:clrMapOvr>
+</p:sld>
+</file>
+
+<file path=ppt/slides/slide22.xml><?xml version="1.0" encoding="utf-8"?>
+<p:sld xmlns:a="http://schemas.openxmlformats.org/drawingml/2006/main" xmlns:r="http://schemas.openxmlformats.org/officeDocument/2006/relationships" xmlns:p="http://schemas.openxmlformats.org/presentationml/2006/main">
+  <p:cSld>
+    <p:bg>
+      <p:bgPr>
+        <a:solidFill>
+          <a:srgbClr val="AB0C3F"/>
+        </a:solidFill>
+        <a:effectLst/>
+      </p:bgPr>
+    </p:bg>
+    <p:spTree>
+      <p:nvGrpSpPr>
+        <p:cNvPr id="1" name=""/>
+        <p:cNvGrpSpPr/>
+        <p:nvPr/>
+      </p:nvGrpSpPr>
+      <p:grpSpPr>
+        <a:xfrm>
+          <a:off x="0" y="0"/>
+          <a:ext cx="0" cy="0"/>
+          <a:chOff x="0" y="0"/>
+          <a:chExt cx="0" cy="0"/>
+        </a:xfrm>
+      </p:grpSpPr>
+      <p:sp>
+        <p:nvSpPr>
+          <p:cNvPr id="2" name="Title 1">
+            <a:extLst>
+              <a:ext uri="{FF2B5EF4-FFF2-40B4-BE49-F238E27FC236}">
+                <a16:creationId xmlns:a16="http://schemas.microsoft.com/office/drawing/2014/main" id="{6A730196-82C8-47C9-FBD8-ADD6F0339FB3}"/>
+              </a:ext>
+            </a:extLst>
+          </p:cNvPr>
+          <p:cNvSpPr>
+            <a:spLocks noGrp="1"/>
+          </p:cNvSpPr>
+          <p:nvPr>
+            <p:ph type="title"/>
+          </p:nvPr>
+        </p:nvSpPr>
+        <p:spPr/>
+        <p:txBody>
+          <a:bodyPr/>
+          <a:lstStyle/>
+          <a:p>
+            <a:r>
+              <a:rPr lang="en-US" dirty="0">
+                <a:ea typeface="Calibri Light"/>
+                <a:cs typeface="Calibri Light"/>
+              </a:rPr>
+              <a:t>Threats</a:t>
+            </a:r>
+            <a:endParaRPr lang="en-US" dirty="0"/>
+          </a:p>
+        </p:txBody>
+      </p:sp>
+      <p:sp>
+        <p:nvSpPr>
+          <p:cNvPr id="3" name="Text Placeholder 2">
+            <a:extLst>
+              <a:ext uri="{FF2B5EF4-FFF2-40B4-BE49-F238E27FC236}">
+                <a16:creationId xmlns:a16="http://schemas.microsoft.com/office/drawing/2014/main" id="{CF1F9F19-D725-1852-1C0D-7F7F4E190204}"/>
+              </a:ext>
+            </a:extLst>
+          </p:cNvPr>
+          <p:cNvSpPr>
+            <a:spLocks noGrp="1"/>
+          </p:cNvSpPr>
+          <p:nvPr>
+            <p:ph type="body" idx="1"/>
+          </p:nvPr>
+        </p:nvSpPr>
+        <p:spPr/>
+        <p:txBody>
+          <a:bodyPr/>
+          <a:lstStyle/>
+          <a:p>
+            <a:endParaRPr lang="en-US"/>
+          </a:p>
+        </p:txBody>
+      </p:sp>
+    </p:spTree>
+    <p:extLst>
+      <p:ext uri="{BB962C8B-B14F-4D97-AF65-F5344CB8AC3E}">
+        <p14:creationId xmlns:p14="http://schemas.microsoft.com/office/powerpoint/2010/main" val="1475552678"/>
       </p:ext>
     </p:extLst>
   </p:cSld>
@@ -8226,6 +8316,160 @@
           <p:cNvPr id="2" name="Title 1">
             <a:extLst>
               <a:ext uri="{FF2B5EF4-FFF2-40B4-BE49-F238E27FC236}">
+                <a16:creationId xmlns:a16="http://schemas.microsoft.com/office/drawing/2014/main" id="{2F510B3C-B5D3-672A-E50D-68FC8DEC6E94}"/>
+              </a:ext>
+            </a:extLst>
+          </p:cNvPr>
+          <p:cNvSpPr>
+            <a:spLocks noGrp="1"/>
+          </p:cNvSpPr>
+          <p:nvPr>
+            <p:ph type="title"/>
+          </p:nvPr>
+        </p:nvSpPr>
+        <p:spPr/>
+        <p:txBody>
+          <a:bodyPr/>
+          <a:lstStyle/>
+          <a:p>
+            <a:r>
+              <a:rPr lang="en-US" dirty="0">
+                <a:ea typeface="Calibri Light"/>
+                <a:cs typeface="Calibri Light"/>
+              </a:rPr>
+              <a:t>Basic Thug</a:t>
+            </a:r>
+            <a:endParaRPr lang="en-US" dirty="0"/>
+          </a:p>
+        </p:txBody>
+      </p:sp>
+      <p:sp>
+        <p:nvSpPr>
+          <p:cNvPr id="3" name="Content Placeholder 2">
+            <a:extLst>
+              <a:ext uri="{FF2B5EF4-FFF2-40B4-BE49-F238E27FC236}">
+                <a16:creationId xmlns:a16="http://schemas.microsoft.com/office/drawing/2014/main" id="{34213A9F-A72E-C85A-E6F3-A17B97972F15}"/>
+              </a:ext>
+            </a:extLst>
+          </p:cNvPr>
+          <p:cNvSpPr>
+            <a:spLocks noGrp="1"/>
+          </p:cNvSpPr>
+          <p:nvPr>
+            <p:ph idx="1"/>
+          </p:nvPr>
+        </p:nvSpPr>
+        <p:spPr/>
+        <p:txBody>
+          <a:bodyPr vert="horz" lIns="91440" tIns="45720" rIns="91440" bIns="45720" rtlCol="0" anchor="t">
+            <a:normAutofit/>
+          </a:bodyPr>
+          <a:lstStyle/>
+          <a:p>
+            <a:r>
+              <a:rPr lang="en-US" dirty="0">
+                <a:ea typeface="Calibri"/>
+                <a:cs typeface="Calibri"/>
+              </a:rPr>
+              <a:t>We can add enemy variety with different weapons/equipment</a:t>
+            </a:r>
+          </a:p>
+          <a:p>
+            <a:r>
+              <a:rPr lang="en-US" dirty="0">
+                <a:ea typeface="Calibri"/>
+                <a:cs typeface="Calibri"/>
+              </a:rPr>
+              <a:t>Bosses could also add variety (if we </a:t>
+            </a:r>
+            <a:r>
+              <a:rPr lang="en-US" err="1">
+                <a:ea typeface="Calibri"/>
+                <a:cs typeface="Calibri"/>
+              </a:rPr>
+              <a:t>perscribe</a:t>
+            </a:r>
+            <a:r>
+              <a:rPr lang="en-US" dirty="0">
+                <a:ea typeface="Calibri"/>
+                <a:cs typeface="Calibri"/>
+              </a:rPr>
+              <a:t> sufficient time)</a:t>
+            </a:r>
+          </a:p>
+          <a:p>
+            <a:r>
+              <a:rPr lang="en-US" dirty="0">
+                <a:ea typeface="Calibri"/>
+                <a:cs typeface="Calibri"/>
+              </a:rPr>
+              <a:t>No weapons (so little damage)</a:t>
+            </a:r>
+          </a:p>
+          <a:p>
+            <a:r>
+              <a:rPr lang="en-US" dirty="0">
+                <a:ea typeface="Calibri"/>
+                <a:cs typeface="Calibri"/>
+              </a:rPr>
+              <a:t>Only option is to attack player with melee</a:t>
+            </a:r>
+          </a:p>
+          <a:p>
+            <a:r>
+              <a:rPr lang="en-US" dirty="0">
+                <a:ea typeface="Calibri"/>
+                <a:cs typeface="Calibri"/>
+              </a:rPr>
+              <a:t>{maybe we allow friendly fire – helps with the repetitive nature of melee enemies ganging up on the player, and also entertaining}</a:t>
+            </a:r>
+          </a:p>
+          <a:p>
+            <a:r>
+              <a:rPr lang="en-US" dirty="0">
+                <a:ea typeface="Calibri"/>
+                <a:cs typeface="Calibri"/>
+              </a:rPr>
+              <a:t>[each enemy weapon type we use will have it's own slide to allow for more detail]</a:t>
+            </a:r>
+          </a:p>
+        </p:txBody>
+      </p:sp>
+    </p:spTree>
+    <p:extLst>
+      <p:ext uri="{BB962C8B-B14F-4D97-AF65-F5344CB8AC3E}">
+        <p14:creationId xmlns:p14="http://schemas.microsoft.com/office/powerpoint/2010/main" val="1839603197"/>
+      </p:ext>
+    </p:extLst>
+  </p:cSld>
+  <p:clrMapOvr>
+    <a:masterClrMapping/>
+  </p:clrMapOvr>
+</p:sld>
+</file>
+
+<file path=ppt/slides/slide24.xml><?xml version="1.0" encoding="utf-8"?>
+<p:sld xmlns:a="http://schemas.openxmlformats.org/drawingml/2006/main" xmlns:r="http://schemas.openxmlformats.org/officeDocument/2006/relationships" xmlns:p="http://schemas.openxmlformats.org/presentationml/2006/main">
+  <p:cSld>
+    <p:spTree>
+      <p:nvGrpSpPr>
+        <p:cNvPr id="1" name=""/>
+        <p:cNvGrpSpPr/>
+        <p:nvPr/>
+      </p:nvGrpSpPr>
+      <p:grpSpPr>
+        <a:xfrm>
+          <a:off x="0" y="0"/>
+          <a:ext cx="0" cy="0"/>
+          <a:chOff x="0" y="0"/>
+          <a:chExt cx="0" cy="0"/>
+        </a:xfrm>
+      </p:grpSpPr>
+      <p:sp>
+        <p:nvSpPr>
+          <p:cNvPr id="2" name="Title 1">
+            <a:extLst>
+              <a:ext uri="{FF2B5EF4-FFF2-40B4-BE49-F238E27FC236}">
                 <a16:creationId xmlns:a16="http://schemas.microsoft.com/office/drawing/2014/main" id="{B96217FF-11F1-02A9-1262-DA7D6DEF9869}"/>
               </a:ext>
             </a:extLst>
@@ -8323,7 +8567,7 @@
 </p:sld>
 </file>
 
-<file path=ppt/slides/slide24.xml><?xml version="1.0" encoding="utf-8"?>
+<file path=ppt/slides/slide25.xml><?xml version="1.0" encoding="utf-8"?>
 <p:sld xmlns:a="http://schemas.openxmlformats.org/drawingml/2006/main" xmlns:r="http://schemas.openxmlformats.org/officeDocument/2006/relationships" xmlns:p="http://schemas.openxmlformats.org/presentationml/2006/main">
   <p:cSld>
     <p:bg>
@@ -8409,101 +8653,6 @@
     <p:extLst>
       <p:ext uri="{BB962C8B-B14F-4D97-AF65-F5344CB8AC3E}">
         <p14:creationId xmlns:p14="http://schemas.microsoft.com/office/powerpoint/2010/main" val="2226716358"/>
-      </p:ext>
-    </p:extLst>
-  </p:cSld>
-  <p:clrMapOvr>
-    <a:masterClrMapping/>
-  </p:clrMapOvr>
-</p:sld>
-</file>
-
-<file path=ppt/slides/slide25.xml><?xml version="1.0" encoding="utf-8"?>
-<p:sld xmlns:a="http://schemas.openxmlformats.org/drawingml/2006/main" xmlns:r="http://schemas.openxmlformats.org/officeDocument/2006/relationships" xmlns:p="http://schemas.openxmlformats.org/presentationml/2006/main">
-  <p:cSld>
-    <p:spTree>
-      <p:nvGrpSpPr>
-        <p:cNvPr id="1" name=""/>
-        <p:cNvGrpSpPr/>
-        <p:nvPr/>
-      </p:nvGrpSpPr>
-      <p:grpSpPr>
-        <a:xfrm>
-          <a:off x="0" y="0"/>
-          <a:ext cx="0" cy="0"/>
-          <a:chOff x="0" y="0"/>
-          <a:chExt cx="0" cy="0"/>
-        </a:xfrm>
-      </p:grpSpPr>
-      <p:sp>
-        <p:nvSpPr>
-          <p:cNvPr id="2" name="Title 1">
-            <a:extLst>
-              <a:ext uri="{FF2B5EF4-FFF2-40B4-BE49-F238E27FC236}">
-                <a16:creationId xmlns:a16="http://schemas.microsoft.com/office/drawing/2014/main" id="{672EB8FE-9BDC-99D2-20B3-823111937B3C}"/>
-              </a:ext>
-            </a:extLst>
-          </p:cNvPr>
-          <p:cNvSpPr>
-            <a:spLocks noGrp="1"/>
-          </p:cNvSpPr>
-          <p:nvPr>
-            <p:ph type="title"/>
-          </p:nvPr>
-        </p:nvSpPr>
-        <p:spPr/>
-        <p:txBody>
-          <a:bodyPr/>
-          <a:lstStyle/>
-          <a:p>
-            <a:r>
-              <a:rPr lang="en-US" dirty="0">
-                <a:ea typeface="Calibri Light"/>
-                <a:cs typeface="Calibri Light"/>
-              </a:rPr>
-              <a:t>Wall Bounce</a:t>
-            </a:r>
-            <a:endParaRPr lang="en-US" dirty="0" err="1"/>
-          </a:p>
-        </p:txBody>
-      </p:sp>
-      <p:sp>
-        <p:nvSpPr>
-          <p:cNvPr id="3" name="Content Placeholder 2">
-            <a:extLst>
-              <a:ext uri="{FF2B5EF4-FFF2-40B4-BE49-F238E27FC236}">
-                <a16:creationId xmlns:a16="http://schemas.microsoft.com/office/drawing/2014/main" id="{E06D7B82-1649-EF9C-0051-D71FCC349B43}"/>
-              </a:ext>
-            </a:extLst>
-          </p:cNvPr>
-          <p:cNvSpPr>
-            <a:spLocks noGrp="1"/>
-          </p:cNvSpPr>
-          <p:nvPr>
-            <p:ph idx="1"/>
-          </p:nvPr>
-        </p:nvSpPr>
-        <p:spPr/>
-        <p:txBody>
-          <a:bodyPr vert="horz" lIns="91440" tIns="45720" rIns="91440" bIns="45720" rtlCol="0" anchor="t">
-            <a:normAutofit/>
-          </a:bodyPr>
-          <a:lstStyle/>
-          <a:p>
-            <a:r>
-              <a:rPr lang="en-US" dirty="0">
-                <a:ea typeface="Calibri"/>
-                <a:cs typeface="Calibri"/>
-              </a:rPr>
-              <a:t>Knock back into wall deals little extra damage [additional cool thing to make combat more varied]</a:t>
-            </a:r>
-          </a:p>
-        </p:txBody>
-      </p:sp>
-    </p:spTree>
-    <p:extLst>
-      <p:ext uri="{BB962C8B-B14F-4D97-AF65-F5344CB8AC3E}">
-        <p14:creationId xmlns:p14="http://schemas.microsoft.com/office/powerpoint/2010/main" val="2820152346"/>
       </p:ext>
     </p:extLst>
   </p:cSld>
@@ -8535,7 +8684,7 @@
           <p:cNvPr id="2" name="Title 1">
             <a:extLst>
               <a:ext uri="{FF2B5EF4-FFF2-40B4-BE49-F238E27FC236}">
-                <a16:creationId xmlns:a16="http://schemas.microsoft.com/office/drawing/2014/main" id="{422205A5-894D-A436-DB8B-3D5D1AB2C1C2}"/>
+                <a16:creationId xmlns:a16="http://schemas.microsoft.com/office/drawing/2014/main" id="{672EB8FE-9BDC-99D2-20B3-823111937B3C}"/>
               </a:ext>
             </a:extLst>
           </p:cNvPr>
@@ -8556,9 +8705,9 @@
                 <a:ea typeface="Calibri Light"/>
                 <a:cs typeface="Calibri Light"/>
               </a:rPr>
-              <a:t>Conveyer Belt</a:t>
-            </a:r>
-            <a:endParaRPr lang="en-US" dirty="0"/>
+              <a:t>Wall Bounce</a:t>
+            </a:r>
+            <a:endParaRPr lang="en-US" dirty="0" err="1"/>
           </a:p>
         </p:txBody>
       </p:sp>
@@ -8567,7 +8716,7 @@
           <p:cNvPr id="3" name="Content Placeholder 2">
             <a:extLst>
               <a:ext uri="{FF2B5EF4-FFF2-40B4-BE49-F238E27FC236}">
-                <a16:creationId xmlns:a16="http://schemas.microsoft.com/office/drawing/2014/main" id="{5D4ACD69-08EC-E60A-EEA0-F8522ECB9175}"/>
+                <a16:creationId xmlns:a16="http://schemas.microsoft.com/office/drawing/2014/main" id="{E06D7B82-1649-EF9C-0051-D71FCC349B43}"/>
               </a:ext>
             </a:extLst>
           </p:cNvPr>
@@ -8590,30 +8739,15 @@
                 <a:ea typeface="Calibri"/>
                 <a:cs typeface="Calibri"/>
               </a:rPr>
-              <a:t>[Very </a:t>
-            </a:r>
-            <a:r>
-              <a:rPr lang="en-US" dirty="0" err="1">
-                <a:ea typeface="Calibri"/>
-                <a:cs typeface="Calibri"/>
-              </a:rPr>
-              <a:t>gangbeasts</a:t>
-            </a:r>
-            <a:r>
-              <a:rPr lang="en-US" dirty="0">
-                <a:ea typeface="Calibri"/>
-                <a:cs typeface="Calibri"/>
-              </a:rPr>
-              <a:t> – also additional]</a:t>
-            </a:r>
-            <a:endParaRPr lang="en-US" dirty="0"/>
+              <a:t>Knock back into wall deals little extra damage [additional cool thing to make combat more varied]</a:t>
+            </a:r>
           </a:p>
         </p:txBody>
       </p:sp>
     </p:spTree>
     <p:extLst>
       <p:ext uri="{BB962C8B-B14F-4D97-AF65-F5344CB8AC3E}">
-        <p14:creationId xmlns:p14="http://schemas.microsoft.com/office/powerpoint/2010/main" val="3072309207"/>
+        <p14:creationId xmlns:p14="http://schemas.microsoft.com/office/powerpoint/2010/main" val="2820152346"/>
       </p:ext>
     </p:extLst>
   </p:cSld>
@@ -8645,6 +8779,116 @@
           <p:cNvPr id="2" name="Title 1">
             <a:extLst>
               <a:ext uri="{FF2B5EF4-FFF2-40B4-BE49-F238E27FC236}">
+                <a16:creationId xmlns:a16="http://schemas.microsoft.com/office/drawing/2014/main" id="{422205A5-894D-A436-DB8B-3D5D1AB2C1C2}"/>
+              </a:ext>
+            </a:extLst>
+          </p:cNvPr>
+          <p:cNvSpPr>
+            <a:spLocks noGrp="1"/>
+          </p:cNvSpPr>
+          <p:nvPr>
+            <p:ph type="title"/>
+          </p:nvPr>
+        </p:nvSpPr>
+        <p:spPr/>
+        <p:txBody>
+          <a:bodyPr/>
+          <a:lstStyle/>
+          <a:p>
+            <a:r>
+              <a:rPr lang="en-US" dirty="0">
+                <a:ea typeface="Calibri Light"/>
+                <a:cs typeface="Calibri Light"/>
+              </a:rPr>
+              <a:t>Conveyer Belt</a:t>
+            </a:r>
+            <a:endParaRPr lang="en-US" dirty="0"/>
+          </a:p>
+        </p:txBody>
+      </p:sp>
+      <p:sp>
+        <p:nvSpPr>
+          <p:cNvPr id="3" name="Content Placeholder 2">
+            <a:extLst>
+              <a:ext uri="{FF2B5EF4-FFF2-40B4-BE49-F238E27FC236}">
+                <a16:creationId xmlns:a16="http://schemas.microsoft.com/office/drawing/2014/main" id="{5D4ACD69-08EC-E60A-EEA0-F8522ECB9175}"/>
+              </a:ext>
+            </a:extLst>
+          </p:cNvPr>
+          <p:cNvSpPr>
+            <a:spLocks noGrp="1"/>
+          </p:cNvSpPr>
+          <p:nvPr>
+            <p:ph idx="1"/>
+          </p:nvPr>
+        </p:nvSpPr>
+        <p:spPr/>
+        <p:txBody>
+          <a:bodyPr vert="horz" lIns="91440" tIns="45720" rIns="91440" bIns="45720" rtlCol="0" anchor="t">
+            <a:normAutofit/>
+          </a:bodyPr>
+          <a:lstStyle/>
+          <a:p>
+            <a:r>
+              <a:rPr lang="en-US" dirty="0">
+                <a:ea typeface="Calibri"/>
+                <a:cs typeface="Calibri"/>
+              </a:rPr>
+              <a:t>[Very </a:t>
+            </a:r>
+            <a:r>
+              <a:rPr lang="en-US" dirty="0" err="1">
+                <a:ea typeface="Calibri"/>
+                <a:cs typeface="Calibri"/>
+              </a:rPr>
+              <a:t>gangbeasts</a:t>
+            </a:r>
+            <a:r>
+              <a:rPr lang="en-US" dirty="0">
+                <a:ea typeface="Calibri"/>
+                <a:cs typeface="Calibri"/>
+              </a:rPr>
+              <a:t> – also additional]</a:t>
+            </a:r>
+            <a:endParaRPr lang="en-US" dirty="0"/>
+          </a:p>
+        </p:txBody>
+      </p:sp>
+    </p:spTree>
+    <p:extLst>
+      <p:ext uri="{BB962C8B-B14F-4D97-AF65-F5344CB8AC3E}">
+        <p14:creationId xmlns:p14="http://schemas.microsoft.com/office/powerpoint/2010/main" val="3072309207"/>
+      </p:ext>
+    </p:extLst>
+  </p:cSld>
+  <p:clrMapOvr>
+    <a:masterClrMapping/>
+  </p:clrMapOvr>
+</p:sld>
+</file>
+
+<file path=ppt/slides/slide28.xml><?xml version="1.0" encoding="utf-8"?>
+<p:sld xmlns:a="http://schemas.openxmlformats.org/drawingml/2006/main" xmlns:r="http://schemas.openxmlformats.org/officeDocument/2006/relationships" xmlns:p="http://schemas.openxmlformats.org/presentationml/2006/main">
+  <p:cSld>
+    <p:spTree>
+      <p:nvGrpSpPr>
+        <p:cNvPr id="1" name=""/>
+        <p:cNvGrpSpPr/>
+        <p:nvPr/>
+      </p:nvGrpSpPr>
+      <p:grpSpPr>
+        <a:xfrm>
+          <a:off x="0" y="0"/>
+          <a:ext cx="0" cy="0"/>
+          <a:chOff x="0" y="0"/>
+          <a:chExt cx="0" cy="0"/>
+        </a:xfrm>
+      </p:grpSpPr>
+      <p:sp>
+        <p:nvSpPr>
+          <p:cNvPr id="2" name="Title 1">
+            <a:extLst>
+              <a:ext uri="{FF2B5EF4-FFF2-40B4-BE49-F238E27FC236}">
                 <a16:creationId xmlns:a16="http://schemas.microsoft.com/office/drawing/2014/main" id="{78BEE34F-7820-348C-3C35-B3AB325D387F}"/>
               </a:ext>
             </a:extLst>
@@ -8719,7 +8963,7 @@
 </p:sld>
 </file>
 
-<file path=ppt/slides/slide28.xml><?xml version="1.0" encoding="utf-8"?>
+<file path=ppt/slides/slide29.xml><?xml version="1.0" encoding="utf-8"?>
 <p:sld xmlns:a="http://schemas.openxmlformats.org/drawingml/2006/main" xmlns:r="http://schemas.openxmlformats.org/officeDocument/2006/relationships" xmlns:p="http://schemas.openxmlformats.org/presentationml/2006/main">
   <p:cSld>
     <p:bg>
@@ -8805,160 +9049,6 @@
     <p:extLst>
       <p:ext uri="{BB962C8B-B14F-4D97-AF65-F5344CB8AC3E}">
         <p14:creationId xmlns:p14="http://schemas.microsoft.com/office/powerpoint/2010/main" val="1050023752"/>
-      </p:ext>
-    </p:extLst>
-  </p:cSld>
-  <p:clrMapOvr>
-    <a:masterClrMapping/>
-  </p:clrMapOvr>
-</p:sld>
-</file>
-
-<file path=ppt/slides/slide29.xml><?xml version="1.0" encoding="utf-8"?>
-<p:sld xmlns:a="http://schemas.openxmlformats.org/drawingml/2006/main" xmlns:r="http://schemas.openxmlformats.org/officeDocument/2006/relationships" xmlns:p="http://schemas.openxmlformats.org/presentationml/2006/main">
-  <p:cSld>
-    <p:spTree>
-      <p:nvGrpSpPr>
-        <p:cNvPr id="1" name=""/>
-        <p:cNvGrpSpPr/>
-        <p:nvPr/>
-      </p:nvGrpSpPr>
-      <p:grpSpPr>
-        <a:xfrm>
-          <a:off x="0" y="0"/>
-          <a:ext cx="0" cy="0"/>
-          <a:chOff x="0" y="0"/>
-          <a:chExt cx="0" cy="0"/>
-        </a:xfrm>
-      </p:grpSpPr>
-      <p:sp>
-        <p:nvSpPr>
-          <p:cNvPr id="2" name="Title 1">
-            <a:extLst>
-              <a:ext uri="{FF2B5EF4-FFF2-40B4-BE49-F238E27FC236}">
-                <a16:creationId xmlns:a16="http://schemas.microsoft.com/office/drawing/2014/main" id="{A63136AD-2458-A357-223A-99708E79B52F}"/>
-              </a:ext>
-            </a:extLst>
-          </p:cNvPr>
-          <p:cNvSpPr>
-            <a:spLocks noGrp="1"/>
-          </p:cNvSpPr>
-          <p:nvPr>
-            <p:ph type="title"/>
-          </p:nvPr>
-        </p:nvSpPr>
-        <p:spPr/>
-        <p:txBody>
-          <a:bodyPr/>
-          <a:lstStyle/>
-          <a:p>
-            <a:r>
-              <a:rPr lang="en-US" dirty="0">
-                <a:ea typeface="Calibri Light"/>
-                <a:cs typeface="Calibri Light"/>
-              </a:rPr>
-              <a:t>Announcer</a:t>
-            </a:r>
-            <a:endParaRPr lang="en-US" dirty="0"/>
-          </a:p>
-        </p:txBody>
-      </p:sp>
-      <p:sp>
-        <p:nvSpPr>
-          <p:cNvPr id="3" name="Content Placeholder 2">
-            <a:extLst>
-              <a:ext uri="{FF2B5EF4-FFF2-40B4-BE49-F238E27FC236}">
-                <a16:creationId xmlns:a16="http://schemas.microsoft.com/office/drawing/2014/main" id="{DD6D8731-A978-7BF7-5CBC-1F1B0E0C37A6}"/>
-              </a:ext>
-            </a:extLst>
-          </p:cNvPr>
-          <p:cNvSpPr>
-            <a:spLocks noGrp="1"/>
-          </p:cNvSpPr>
-          <p:nvPr>
-            <p:ph idx="1"/>
-          </p:nvPr>
-        </p:nvSpPr>
-        <p:spPr/>
-        <p:txBody>
-          <a:bodyPr vert="horz" lIns="91440" tIns="45720" rIns="91440" bIns="45720" rtlCol="0" anchor="t">
-            <a:normAutofit/>
-          </a:bodyPr>
-          <a:lstStyle/>
-          <a:p>
-            <a:r>
-              <a:rPr lang="en-US" err="1">
-                <a:ea typeface="Calibri"/>
-                <a:cs typeface="Calibri"/>
-              </a:rPr>
-              <a:t>Basicaly</a:t>
-            </a:r>
-            <a:r>
-              <a:rPr lang="en-US" dirty="0">
-                <a:ea typeface="Calibri"/>
-                <a:cs typeface="Calibri"/>
-              </a:rPr>
-              <a:t> </a:t>
-            </a:r>
-            <a:r>
-              <a:rPr lang="en-US" err="1">
-                <a:ea typeface="Calibri"/>
-                <a:cs typeface="Calibri"/>
-              </a:rPr>
-              <a:t>Narator</a:t>
-            </a:r>
-            <a:endParaRPr lang="en-US" dirty="0" err="1">
-              <a:ea typeface="Calibri"/>
-              <a:cs typeface="Calibri"/>
-            </a:endParaRPr>
-          </a:p>
-          <a:p>
-            <a:r>
-              <a:rPr lang="en-US" dirty="0">
-                <a:ea typeface="Calibri"/>
-                <a:cs typeface="Calibri"/>
-              </a:rPr>
-              <a:t>They explain things</a:t>
-            </a:r>
-          </a:p>
-          <a:p>
-            <a:r>
-              <a:rPr lang="en-US" dirty="0">
-                <a:ea typeface="Calibri"/>
-                <a:cs typeface="Calibri"/>
-              </a:rPr>
-              <a:t>Game is </a:t>
-            </a:r>
-            <a:r>
-              <a:rPr lang="en-US" dirty="0" err="1">
-                <a:ea typeface="Calibri"/>
-                <a:cs typeface="Calibri"/>
-              </a:rPr>
-              <a:t>basicaly</a:t>
-            </a:r>
-            <a:r>
-              <a:rPr lang="en-US" dirty="0">
-                <a:ea typeface="Calibri"/>
-                <a:cs typeface="Calibri"/>
-              </a:rPr>
-              <a:t> a game show that they announce [either text or voiced dialogue would work fine]</a:t>
-            </a:r>
-          </a:p>
-          <a:p>
-            <a:r>
-              <a:rPr lang="en-US" dirty="0">
-                <a:ea typeface="Calibri"/>
-                <a:cs typeface="Calibri"/>
-              </a:rPr>
-              <a:t>They are a hype man, they're dramatic, and snarky</a:t>
-            </a:r>
-          </a:p>
-        </p:txBody>
-      </p:sp>
-    </p:spTree>
-    <p:extLst>
-      <p:ext uri="{BB962C8B-B14F-4D97-AF65-F5344CB8AC3E}">
-        <p14:creationId xmlns:p14="http://schemas.microsoft.com/office/powerpoint/2010/main" val="2803468791"/>
       </p:ext>
     </p:extLst>
   </p:cSld>
@@ -9084,7 +9174,7 @@
           <p:cNvPr id="2" name="Title 1">
             <a:extLst>
               <a:ext uri="{FF2B5EF4-FFF2-40B4-BE49-F238E27FC236}">
-                <a16:creationId xmlns:a16="http://schemas.microsoft.com/office/drawing/2014/main" id="{73408831-85EB-0A22-A16F-D07147AC07AA}"/>
+                <a16:creationId xmlns:a16="http://schemas.microsoft.com/office/drawing/2014/main" id="{A63136AD-2458-A357-223A-99708E79B52F}"/>
               </a:ext>
             </a:extLst>
           </p:cNvPr>
@@ -9105,9 +9195,9 @@
                 <a:ea typeface="Calibri Light"/>
                 <a:cs typeface="Calibri Light"/>
               </a:rPr>
-              <a:t>"Zeus"</a:t>
-            </a:r>
-            <a:endParaRPr lang="en-US" dirty="0" err="1"/>
+              <a:t>Announcer</a:t>
+            </a:r>
+            <a:endParaRPr lang="en-US" dirty="0"/>
           </a:p>
         </p:txBody>
       </p:sp>
@@ -9116,7 +9206,7 @@
           <p:cNvPr id="3" name="Content Placeholder 2">
             <a:extLst>
               <a:ext uri="{FF2B5EF4-FFF2-40B4-BE49-F238E27FC236}">
-                <a16:creationId xmlns:a16="http://schemas.microsoft.com/office/drawing/2014/main" id="{A7866C89-A741-3DAF-6DA7-673A0946994C}"/>
+                <a16:creationId xmlns:a16="http://schemas.microsoft.com/office/drawing/2014/main" id="{DD6D8731-A978-7BF7-5CBC-1F1B0E0C37A6}"/>
               </a:ext>
             </a:extLst>
           </p:cNvPr>
@@ -9134,69 +9224,71 @@
           </a:bodyPr>
           <a:lstStyle/>
           <a:p>
-            <a:pPr marL="0" indent="0">
-              <a:buNone/>
-            </a:pPr>
+            <a:r>
+              <a:rPr lang="en-US" err="1">
+                <a:ea typeface="Calibri"/>
+                <a:cs typeface="Calibri"/>
+              </a:rPr>
+              <a:t>Basicaly</a:t>
+            </a:r>
             <a:r>
               <a:rPr lang="en-US" dirty="0">
                 <a:ea typeface="Calibri"/>
                 <a:cs typeface="Calibri"/>
               </a:rPr>
-              <a:t>[explanation of double Zeus entry]While they are a threat, they're presence as an NPC would be separate from Zeus the threat if we did not make the connection clear (through label and </a:t>
+              <a:t> </a:t>
+            </a:r>
+            <a:r>
+              <a:rPr lang="en-US" err="1">
+                <a:ea typeface="Calibri"/>
+                <a:cs typeface="Calibri"/>
+              </a:rPr>
+              <a:t>Narator</a:t>
+            </a:r>
+            <a:endParaRPr lang="en-US" dirty="0" err="1">
+              <a:ea typeface="Calibri"/>
+              <a:cs typeface="Calibri"/>
+            </a:endParaRPr>
+          </a:p>
+          <a:p>
+            <a:r>
+              <a:rPr lang="en-US" dirty="0">
+                <a:ea typeface="Calibri"/>
+                <a:cs typeface="Calibri"/>
+              </a:rPr>
+              <a:t>They explain things</a:t>
+            </a:r>
+          </a:p>
+          <a:p>
+            <a:r>
+              <a:rPr lang="en-US" dirty="0">
+                <a:ea typeface="Calibri"/>
+                <a:cs typeface="Calibri"/>
+              </a:rPr>
+              <a:t>Game is </a:t>
             </a:r>
             <a:r>
               <a:rPr lang="en-US" dirty="0" err="1">
                 <a:ea typeface="Calibri"/>
                 <a:cs typeface="Calibri"/>
               </a:rPr>
-              <a:t>narative</a:t>
+              <a:t>basicaly</a:t>
             </a:r>
             <a:r>
               <a:rPr lang="en-US" dirty="0">
                 <a:ea typeface="Calibri"/>
                 <a:cs typeface="Calibri"/>
               </a:rPr>
-              <a:t> context)</a:t>
-            </a:r>
-          </a:p>
-          <a:p>
-            <a:pPr marL="457200" indent="-457200"/>
+              <a:t> a game show that they announce [either text or voiced dialogue would work fine]</a:t>
+            </a:r>
+          </a:p>
+          <a:p>
             <a:r>
               <a:rPr lang="en-US" dirty="0">
                 <a:ea typeface="Calibri"/>
                 <a:cs typeface="Calibri"/>
               </a:rPr>
-              <a:t>Will talk shit</a:t>
-            </a:r>
-          </a:p>
-          <a:p>
-            <a:pPr marL="457200" indent="-457200"/>
-            <a:r>
-              <a:rPr lang="en-US" dirty="0">
-                <a:ea typeface="Calibri"/>
-                <a:cs typeface="Calibri"/>
-              </a:rPr>
-              <a:t>Talk about the good fight (even if they lost – like they're trying to save face)</a:t>
-            </a:r>
-          </a:p>
-          <a:p>
-            <a:pPr marL="457200" indent="-457200"/>
-            <a:r>
-              <a:rPr lang="en-US">
-                <a:ea typeface="Calibri"/>
-                <a:cs typeface="Calibri"/>
-              </a:rPr>
-              <a:t>Will break character eventually</a:t>
-            </a:r>
-          </a:p>
-          <a:p>
-            <a:pPr marL="457200" indent="-457200"/>
-            <a:r>
-              <a:rPr lang="en-US" dirty="0">
-                <a:ea typeface="Calibri"/>
-                <a:cs typeface="Calibri"/>
-              </a:rPr>
-              <a:t>Egotist nerd</a:t>
+              <a:t>They are a hype man, they're dramatic, and snarky</a:t>
             </a:r>
           </a:p>
         </p:txBody>
@@ -9204,7 +9296,7 @@
     </p:spTree>
     <p:extLst>
       <p:ext uri="{BB962C8B-B14F-4D97-AF65-F5344CB8AC3E}">
-        <p14:creationId xmlns:p14="http://schemas.microsoft.com/office/powerpoint/2010/main" val="3016071352"/>
+        <p14:creationId xmlns:p14="http://schemas.microsoft.com/office/powerpoint/2010/main" val="2803468791"/>
       </p:ext>
     </p:extLst>
   </p:cSld>
@@ -9236,6 +9328,158 @@
           <p:cNvPr id="2" name="Title 1">
             <a:extLst>
               <a:ext uri="{FF2B5EF4-FFF2-40B4-BE49-F238E27FC236}">
+                <a16:creationId xmlns:a16="http://schemas.microsoft.com/office/drawing/2014/main" id="{73408831-85EB-0A22-A16F-D07147AC07AA}"/>
+              </a:ext>
+            </a:extLst>
+          </p:cNvPr>
+          <p:cNvSpPr>
+            <a:spLocks noGrp="1"/>
+          </p:cNvSpPr>
+          <p:nvPr>
+            <p:ph type="title"/>
+          </p:nvPr>
+        </p:nvSpPr>
+        <p:spPr/>
+        <p:txBody>
+          <a:bodyPr/>
+          <a:lstStyle/>
+          <a:p>
+            <a:r>
+              <a:rPr lang="en-US" dirty="0">
+                <a:ea typeface="Calibri Light"/>
+                <a:cs typeface="Calibri Light"/>
+              </a:rPr>
+              <a:t>"Zeus"</a:t>
+            </a:r>
+            <a:endParaRPr lang="en-US" dirty="0" err="1"/>
+          </a:p>
+        </p:txBody>
+      </p:sp>
+      <p:sp>
+        <p:nvSpPr>
+          <p:cNvPr id="3" name="Content Placeholder 2">
+            <a:extLst>
+              <a:ext uri="{FF2B5EF4-FFF2-40B4-BE49-F238E27FC236}">
+                <a16:creationId xmlns:a16="http://schemas.microsoft.com/office/drawing/2014/main" id="{A7866C89-A741-3DAF-6DA7-673A0946994C}"/>
+              </a:ext>
+            </a:extLst>
+          </p:cNvPr>
+          <p:cNvSpPr>
+            <a:spLocks noGrp="1"/>
+          </p:cNvSpPr>
+          <p:nvPr>
+            <p:ph idx="1"/>
+          </p:nvPr>
+        </p:nvSpPr>
+        <p:spPr/>
+        <p:txBody>
+          <a:bodyPr vert="horz" lIns="91440" tIns="45720" rIns="91440" bIns="45720" rtlCol="0" anchor="t">
+            <a:normAutofit/>
+          </a:bodyPr>
+          <a:lstStyle/>
+          <a:p>
+            <a:pPr marL="0" indent="0">
+              <a:buNone/>
+            </a:pPr>
+            <a:r>
+              <a:rPr lang="en-US" dirty="0">
+                <a:ea typeface="Calibri"/>
+                <a:cs typeface="Calibri"/>
+              </a:rPr>
+              <a:t>[explanation of double Zeus entry]While they are a threat, they're presence as an NPC would be separate from Zeus the threat if we did not make the connection clear (through label and </a:t>
+            </a:r>
+            <a:r>
+              <a:rPr lang="en-US" dirty="0" err="1">
+                <a:ea typeface="Calibri"/>
+                <a:cs typeface="Calibri"/>
+              </a:rPr>
+              <a:t>narative</a:t>
+            </a:r>
+            <a:r>
+              <a:rPr lang="en-US" dirty="0">
+                <a:ea typeface="Calibri"/>
+                <a:cs typeface="Calibri"/>
+              </a:rPr>
+              <a:t> context)</a:t>
+            </a:r>
+          </a:p>
+          <a:p>
+            <a:pPr marL="457200" indent="-457200"/>
+            <a:r>
+              <a:rPr lang="en-US" dirty="0">
+                <a:ea typeface="Calibri"/>
+                <a:cs typeface="Calibri"/>
+              </a:rPr>
+              <a:t>Will talk shit</a:t>
+            </a:r>
+          </a:p>
+          <a:p>
+            <a:pPr marL="457200" indent="-457200"/>
+            <a:r>
+              <a:rPr lang="en-US" dirty="0">
+                <a:ea typeface="Calibri"/>
+                <a:cs typeface="Calibri"/>
+              </a:rPr>
+              <a:t>Talk about the good fight (even if they lost – like they're trying to save face)</a:t>
+            </a:r>
+          </a:p>
+          <a:p>
+            <a:pPr marL="457200" indent="-457200"/>
+            <a:r>
+              <a:rPr lang="en-US">
+                <a:ea typeface="Calibri"/>
+                <a:cs typeface="Calibri"/>
+              </a:rPr>
+              <a:t>Will break character eventually</a:t>
+            </a:r>
+          </a:p>
+          <a:p>
+            <a:pPr marL="457200" indent="-457200"/>
+            <a:r>
+              <a:rPr lang="en-US" dirty="0">
+                <a:ea typeface="Calibri"/>
+                <a:cs typeface="Calibri"/>
+              </a:rPr>
+              <a:t>Egotist nerd</a:t>
+            </a:r>
+          </a:p>
+        </p:txBody>
+      </p:sp>
+    </p:spTree>
+    <p:extLst>
+      <p:ext uri="{BB962C8B-B14F-4D97-AF65-F5344CB8AC3E}">
+        <p14:creationId xmlns:p14="http://schemas.microsoft.com/office/powerpoint/2010/main" val="3016071352"/>
+      </p:ext>
+    </p:extLst>
+  </p:cSld>
+  <p:clrMapOvr>
+    <a:masterClrMapping/>
+  </p:clrMapOvr>
+</p:sld>
+</file>
+
+<file path=ppt/slides/slide32.xml><?xml version="1.0" encoding="utf-8"?>
+<p:sld xmlns:a="http://schemas.openxmlformats.org/drawingml/2006/main" xmlns:r="http://schemas.openxmlformats.org/officeDocument/2006/relationships" xmlns:p="http://schemas.openxmlformats.org/presentationml/2006/main">
+  <p:cSld>
+    <p:spTree>
+      <p:nvGrpSpPr>
+        <p:cNvPr id="1" name=""/>
+        <p:cNvGrpSpPr/>
+        <p:nvPr/>
+      </p:nvGrpSpPr>
+      <p:grpSpPr>
+        <a:xfrm>
+          <a:off x="0" y="0"/>
+          <a:ext cx="0" cy="0"/>
+          <a:chOff x="0" y="0"/>
+          <a:chExt cx="0" cy="0"/>
+        </a:xfrm>
+      </p:grpSpPr>
+      <p:sp>
+        <p:nvSpPr>
+          <p:cNvPr id="2" name="Title 1">
+            <a:extLst>
+              <a:ext uri="{FF2B5EF4-FFF2-40B4-BE49-F238E27FC236}">
                 <a16:creationId xmlns:a16="http://schemas.microsoft.com/office/drawing/2014/main" id="{0EA2C688-3E4E-CD7E-94EC-2E1D4A29E39E}"/>
               </a:ext>
             </a:extLst>
@@ -9387,7 +9631,7 @@
 </p:sld>
 </file>
 
-<file path=ppt/slides/slide32.xml><?xml version="1.0" encoding="utf-8"?>
+<file path=ppt/slides/slide33.xml><?xml version="1.0" encoding="utf-8"?>
 <p:sld xmlns:a="http://schemas.openxmlformats.org/drawingml/2006/main" xmlns:r="http://schemas.openxmlformats.org/officeDocument/2006/relationships" xmlns:p="http://schemas.openxmlformats.org/presentationml/2006/main">
   <p:cSld>
     <p:bg>
@@ -9478,7 +9722,7 @@
 </p:sld>
 </file>
 
-<file path=ppt/slides/slide33.xml><?xml version="1.0" encoding="utf-8"?>
+<file path=ppt/slides/slide34.xml><?xml version="1.0" encoding="utf-8"?>
 <p:sld xmlns:a="http://schemas.openxmlformats.org/drawingml/2006/main" xmlns:r="http://schemas.openxmlformats.org/officeDocument/2006/relationships" xmlns:p="http://schemas.openxmlformats.org/presentationml/2006/main">
   <p:cSld>
     <p:spTree>
@@ -9565,7 +9809,7 @@
 </p:sld>
 </file>
 
-<file path=ppt/slides/slide34.xml><?xml version="1.0" encoding="utf-8"?>
+<file path=ppt/slides/slide35.xml><?xml version="1.0" encoding="utf-8"?>
 <p:sld xmlns:a="http://schemas.openxmlformats.org/drawingml/2006/main" xmlns:r="http://schemas.openxmlformats.org/officeDocument/2006/relationships" xmlns:p="http://schemas.openxmlformats.org/presentationml/2006/main">
   <p:cSld>
     <p:spTree>
@@ -9686,7 +9930,7 @@
 </p:sld>
 </file>
 
-<file path=ppt/slides/slide35.xml><?xml version="1.0" encoding="utf-8"?>
+<file path=ppt/slides/slide36.xml><?xml version="1.0" encoding="utf-8"?>
 <p:sld xmlns:a="http://schemas.openxmlformats.org/drawingml/2006/main" xmlns:r="http://schemas.openxmlformats.org/officeDocument/2006/relationships" xmlns:p="http://schemas.openxmlformats.org/presentationml/2006/main">
   <p:cSld>
     <p:bg>
@@ -9777,7 +10021,7 @@
 </p:sld>
 </file>
 
-<file path=ppt/slides/slide36.xml><?xml version="1.0" encoding="utf-8"?>
+<file path=ppt/slides/slide37.xml><?xml version="1.0" encoding="utf-8"?>
 <p:sld xmlns:a="http://schemas.openxmlformats.org/drawingml/2006/main" xmlns:r="http://schemas.openxmlformats.org/officeDocument/2006/relationships" xmlns:p="http://schemas.openxmlformats.org/presentationml/2006/main">
   <p:cSld>
     <p:spTree>
@@ -10027,7 +10271,7 @@
           <a:p>
             <a:r>
               <a:rPr lang="en-US" dirty="0">
-                <a:cs typeface="Calibri" panose="020F0502020204030204"/>
+                <a:cs typeface="Calibri"/>
               </a:rPr>
               <a:t>Gang beasts (the most popular of physics fighters made it the easiest to draw inspiration from)</a:t>
             </a:r>
@@ -10035,7 +10279,7 @@
           <a:p>
             <a:r>
               <a:rPr lang="en-US" dirty="0">
-                <a:cs typeface="Calibri" panose="020F0502020204030204"/>
+                <a:cs typeface="Calibri"/>
               </a:rPr>
               <a:t>While hades &amp; Isaac hang out in the backrooms of potential</a:t>
             </a:r>
@@ -10043,7 +10287,7 @@
           <a:p>
             <a:r>
               <a:rPr lang="en-US" dirty="0">
-                <a:cs typeface="Calibri" panose="020F0502020204030204"/>
+                <a:cs typeface="Calibri"/>
               </a:rPr>
               <a:t>Hades – inspired the inclusion of fake (trashy) "gods" into the narrative to appear as bosses, that due to the wacky tone of the game still give items (a combination with similarity to Isaac).</a:t>
             </a:r>
@@ -10280,7 +10524,7 @@
                 <a:ea typeface="Calibri Light"/>
                 <a:cs typeface="Calibri Light"/>
               </a:rPr>
-              <a:t>Products Summary</a:t>
+              <a:t>Summary for Clash of Cos</a:t>
             </a:r>
             <a:endParaRPr lang="en-US" dirty="0"/>
           </a:p>
@@ -10341,7 +10585,7 @@
                 <a:ea typeface="Calibri"/>
                 <a:cs typeface="Calibri"/>
               </a:rPr>
-              <a:t>[I need to add images and a style/theme to slides]</a:t>
+              <a:t>[I need to add images to slides]</a:t>
             </a:r>
           </a:p>
         </p:txBody>

</xml_diff>

<commit_message>
Imports & Pitch updates
</commit_message>
<xml_diff>
--- a/Shared Documentation/Luke's Documents/Clash of Cos Team Pitch.pptx
+++ b/Shared Documentation/Luke's Documents/Clash of Cos Team Pitch.pptx
@@ -25,17 +25,15 @@
     <p:sldId id="301" r:id="rId19"/>
     <p:sldId id="289" r:id="rId20"/>
     <p:sldId id="295" r:id="rId21"/>
-    <p:sldId id="294" r:id="rId22"/>
-    <p:sldId id="297" r:id="rId23"/>
-    <p:sldId id="290" r:id="rId24"/>
-    <p:sldId id="298" r:id="rId25"/>
-    <p:sldId id="264" r:id="rId26"/>
-    <p:sldId id="265" r:id="rId27"/>
-    <p:sldId id="268" r:id="rId28"/>
-    <p:sldId id="270" r:id="rId29"/>
-    <p:sldId id="278" r:id="rId30"/>
-    <p:sldId id="285" r:id="rId31"/>
-    <p:sldId id="286" r:id="rId32"/>
+    <p:sldId id="265" r:id="rId22"/>
+    <p:sldId id="294" r:id="rId23"/>
+    <p:sldId id="297" r:id="rId24"/>
+    <p:sldId id="290" r:id="rId25"/>
+    <p:sldId id="298" r:id="rId26"/>
+    <p:sldId id="264" r:id="rId27"/>
+    <p:sldId id="278" r:id="rId28"/>
+    <p:sldId id="285" r:id="rId29"/>
+    <p:sldId id="286" r:id="rId30"/>
   </p:sldIdLst>
   <p:sldSz cx="12192000" cy="6858000"/>
   <p:notesSz cx="6858000" cy="9144000"/>
@@ -7474,7 +7472,7 @@
         </p:blipFill>
         <p:spPr>
           <a:xfrm>
-            <a:off x="3062431" y="1520686"/>
+            <a:off x="5772675" y="1520686"/>
             <a:ext cx="5591663" cy="5267739"/>
           </a:xfrm>
           <a:prstGeom prst="rect">
@@ -7496,7 +7494,7 @@
         </p:nvSpPr>
         <p:spPr>
           <a:xfrm>
-            <a:off x="6283986" y="6488668"/>
+            <a:off x="8994230" y="6488668"/>
             <a:ext cx="2370108" cy="369332"/>
           </a:xfrm>
           <a:prstGeom prst="rect">
@@ -7541,7 +7539,7 @@
         </p:nvCxnSpPr>
         <p:spPr>
           <a:xfrm>
-            <a:off x="3140015" y="5184475"/>
+            <a:off x="5850259" y="5184475"/>
             <a:ext cx="327857" cy="0"/>
           </a:xfrm>
           <a:prstGeom prst="straightConnector1">
@@ -8586,32 +8584,261 @@
       </p:sp>
       <p:sp>
         <p:nvSpPr>
-          <p:cNvPr id="3" name="Content Placeholder 2">
-            <a:extLst>
-              <a:ext uri="{FF2B5EF4-FFF2-40B4-BE49-F238E27FC236}">
-                <a16:creationId xmlns:a16="http://schemas.microsoft.com/office/drawing/2014/main" id="{2FF61C8D-E54D-EC4C-219F-08FD66290642}"/>
-              </a:ext>
-            </a:extLst>
-          </p:cNvPr>
-          <p:cNvSpPr>
-            <a:spLocks noGrp="1"/>
+          <p:cNvPr id="4" name="Content Placeholder 2">
+            <a:extLst>
+              <a:ext uri="{FF2B5EF4-FFF2-40B4-BE49-F238E27FC236}">
+                <a16:creationId xmlns:a16="http://schemas.microsoft.com/office/drawing/2014/main" id="{8E81FAF9-E994-2176-5D54-301EEB334758}"/>
+              </a:ext>
+            </a:extLst>
+          </p:cNvPr>
+          <p:cNvSpPr txBox="1">
+            <a:spLocks/>
           </p:cNvSpPr>
-          <p:nvPr>
-            <p:ph idx="1"/>
-          </p:nvPr>
-        </p:nvSpPr>
-        <p:spPr/>
+          <p:nvPr/>
+        </p:nvSpPr>
+        <p:spPr>
+          <a:xfrm>
+            <a:off x="838200" y="1690687"/>
+            <a:ext cx="10515600" cy="4981961"/>
+          </a:xfrm>
+          <a:prstGeom prst="rect">
+            <a:avLst/>
+          </a:prstGeom>
+        </p:spPr>
         <p:txBody>
           <a:bodyPr vert="horz" lIns="91440" tIns="45720" rIns="91440" bIns="45720" rtlCol="0" anchor="t">
             <a:normAutofit/>
           </a:bodyPr>
-          <a:lstStyle/>
-          <a:p>
+          <a:lstStyle>
+            <a:lvl1pPr marL="228600" indent="-228600" algn="l" defTabSz="914400" rtl="0" eaLnBrk="1" latinLnBrk="0" hangingPunct="1">
+              <a:lnSpc>
+                <a:spcPct val="90000"/>
+              </a:lnSpc>
+              <a:spcBef>
+                <a:spcPts val="1000"/>
+              </a:spcBef>
+              <a:buFont typeface="Arial" panose="020B0604020202020204" pitchFamily="34" charset="0"/>
+              <a:buChar char="•"/>
+              <a:defRPr sz="2800" kern="1200">
+                <a:solidFill>
+                  <a:schemeClr val="tx1"/>
+                </a:solidFill>
+                <a:latin typeface="+mn-lt"/>
+                <a:ea typeface="+mn-ea"/>
+                <a:cs typeface="+mn-cs"/>
+              </a:defRPr>
+            </a:lvl1pPr>
+            <a:lvl2pPr marL="685800" indent="-228600" algn="l" defTabSz="914400" rtl="0" eaLnBrk="1" latinLnBrk="0" hangingPunct="1">
+              <a:lnSpc>
+                <a:spcPct val="90000"/>
+              </a:lnSpc>
+              <a:spcBef>
+                <a:spcPts val="500"/>
+              </a:spcBef>
+              <a:buFont typeface="Arial" panose="020B0604020202020204" pitchFamily="34" charset="0"/>
+              <a:buChar char="•"/>
+              <a:defRPr sz="2400" kern="1200">
+                <a:solidFill>
+                  <a:schemeClr val="tx1"/>
+                </a:solidFill>
+                <a:latin typeface="+mn-lt"/>
+                <a:ea typeface="+mn-ea"/>
+                <a:cs typeface="+mn-cs"/>
+              </a:defRPr>
+            </a:lvl2pPr>
+            <a:lvl3pPr marL="1143000" indent="-228600" algn="l" defTabSz="914400" rtl="0" eaLnBrk="1" latinLnBrk="0" hangingPunct="1">
+              <a:lnSpc>
+                <a:spcPct val="90000"/>
+              </a:lnSpc>
+              <a:spcBef>
+                <a:spcPts val="500"/>
+              </a:spcBef>
+              <a:buFont typeface="Arial" panose="020B0604020202020204" pitchFamily="34" charset="0"/>
+              <a:buChar char="•"/>
+              <a:defRPr sz="2000" kern="1200">
+                <a:solidFill>
+                  <a:schemeClr val="tx1"/>
+                </a:solidFill>
+                <a:latin typeface="+mn-lt"/>
+                <a:ea typeface="+mn-ea"/>
+                <a:cs typeface="+mn-cs"/>
+              </a:defRPr>
+            </a:lvl3pPr>
+            <a:lvl4pPr marL="1600200" indent="-228600" algn="l" defTabSz="914400" rtl="0" eaLnBrk="1" latinLnBrk="0" hangingPunct="1">
+              <a:lnSpc>
+                <a:spcPct val="90000"/>
+              </a:lnSpc>
+              <a:spcBef>
+                <a:spcPts val="500"/>
+              </a:spcBef>
+              <a:buFont typeface="Arial" panose="020B0604020202020204" pitchFamily="34" charset="0"/>
+              <a:buChar char="•"/>
+              <a:defRPr sz="1800" kern="1200">
+                <a:solidFill>
+                  <a:schemeClr val="tx1"/>
+                </a:solidFill>
+                <a:latin typeface="+mn-lt"/>
+                <a:ea typeface="+mn-ea"/>
+                <a:cs typeface="+mn-cs"/>
+              </a:defRPr>
+            </a:lvl4pPr>
+            <a:lvl5pPr marL="2057400" indent="-228600" algn="l" defTabSz="914400" rtl="0" eaLnBrk="1" latinLnBrk="0" hangingPunct="1">
+              <a:lnSpc>
+                <a:spcPct val="90000"/>
+              </a:lnSpc>
+              <a:spcBef>
+                <a:spcPts val="500"/>
+              </a:spcBef>
+              <a:buFont typeface="Arial" panose="020B0604020202020204" pitchFamily="34" charset="0"/>
+              <a:buChar char="•"/>
+              <a:defRPr sz="1800" kern="1200">
+                <a:solidFill>
+                  <a:schemeClr val="tx1"/>
+                </a:solidFill>
+                <a:latin typeface="+mn-lt"/>
+                <a:ea typeface="+mn-ea"/>
+                <a:cs typeface="+mn-cs"/>
+              </a:defRPr>
+            </a:lvl5pPr>
+            <a:lvl6pPr marL="2514600" indent="-228600" algn="l" defTabSz="914400" rtl="0" eaLnBrk="1" latinLnBrk="0" hangingPunct="1">
+              <a:lnSpc>
+                <a:spcPct val="90000"/>
+              </a:lnSpc>
+              <a:spcBef>
+                <a:spcPts val="500"/>
+              </a:spcBef>
+              <a:buFont typeface="Arial" panose="020B0604020202020204" pitchFamily="34" charset="0"/>
+              <a:buChar char="•"/>
+              <a:defRPr sz="1800" kern="1200">
+                <a:solidFill>
+                  <a:schemeClr val="tx1"/>
+                </a:solidFill>
+                <a:latin typeface="+mn-lt"/>
+                <a:ea typeface="+mn-ea"/>
+                <a:cs typeface="+mn-cs"/>
+              </a:defRPr>
+            </a:lvl6pPr>
+            <a:lvl7pPr marL="2971800" indent="-228600" algn="l" defTabSz="914400" rtl="0" eaLnBrk="1" latinLnBrk="0" hangingPunct="1">
+              <a:lnSpc>
+                <a:spcPct val="90000"/>
+              </a:lnSpc>
+              <a:spcBef>
+                <a:spcPts val="500"/>
+              </a:spcBef>
+              <a:buFont typeface="Arial" panose="020B0604020202020204" pitchFamily="34" charset="0"/>
+              <a:buChar char="•"/>
+              <a:defRPr sz="1800" kern="1200">
+                <a:solidFill>
+                  <a:schemeClr val="tx1"/>
+                </a:solidFill>
+                <a:latin typeface="+mn-lt"/>
+                <a:ea typeface="+mn-ea"/>
+                <a:cs typeface="+mn-cs"/>
+              </a:defRPr>
+            </a:lvl7pPr>
+            <a:lvl8pPr marL="3429000" indent="-228600" algn="l" defTabSz="914400" rtl="0" eaLnBrk="1" latinLnBrk="0" hangingPunct="1">
+              <a:lnSpc>
+                <a:spcPct val="90000"/>
+              </a:lnSpc>
+              <a:spcBef>
+                <a:spcPts val="500"/>
+              </a:spcBef>
+              <a:buFont typeface="Arial" panose="020B0604020202020204" pitchFamily="34" charset="0"/>
+              <a:buChar char="•"/>
+              <a:defRPr sz="1800" kern="1200">
+                <a:solidFill>
+                  <a:schemeClr val="tx1"/>
+                </a:solidFill>
+                <a:latin typeface="+mn-lt"/>
+                <a:ea typeface="+mn-ea"/>
+                <a:cs typeface="+mn-cs"/>
+              </a:defRPr>
+            </a:lvl8pPr>
+            <a:lvl9pPr marL="3886200" indent="-228600" algn="l" defTabSz="914400" rtl="0" eaLnBrk="1" latinLnBrk="0" hangingPunct="1">
+              <a:lnSpc>
+                <a:spcPct val="90000"/>
+              </a:lnSpc>
+              <a:spcBef>
+                <a:spcPts val="500"/>
+              </a:spcBef>
+              <a:buFont typeface="Arial" panose="020B0604020202020204" pitchFamily="34" charset="0"/>
+              <a:buChar char="•"/>
+              <a:defRPr sz="1800" kern="1200">
+                <a:solidFill>
+                  <a:schemeClr val="tx1"/>
+                </a:solidFill>
+                <a:latin typeface="+mn-lt"/>
+                <a:ea typeface="+mn-ea"/>
+                <a:cs typeface="+mn-cs"/>
+              </a:defRPr>
+            </a:lvl9pPr>
+          </a:lstStyle>
+          <a:p>
+            <a:pPr marL="0" indent="0">
+              <a:buNone/>
+            </a:pPr>
             <a:r>
               <a:rPr lang="en-US" dirty="0">
                 <a:cs typeface="Calibri"/>
               </a:rPr>
-              <a:t>Dynamic and fast is challenging at first but like all things you get used to it. Our first priority for improvements is providing players with more unique challenges and approaches.</a:t>
+              <a:t>Dynamic and fast is challenging at first but like all things you get used to it. Our priority for improvements is providing players with more unique challenges and approaches for instance:</a:t>
+            </a:r>
+            <a:endParaRPr lang="en-US" dirty="0">
+              <a:ea typeface="Calibri"/>
+              <a:cs typeface="Calibri"/>
+            </a:endParaRPr>
+          </a:p>
+          <a:p>
+            <a:r>
+              <a:rPr lang="en-US" dirty="0">
+                <a:ea typeface="Calibri"/>
+                <a:cs typeface="Calibri"/>
+              </a:rPr>
+              <a:t>enemy variety – different looks, weapons/equipment, </a:t>
+            </a:r>
+            <a:r>
+              <a:rPr lang="en-US" dirty="0" err="1">
+                <a:ea typeface="Calibri"/>
+                <a:cs typeface="Calibri"/>
+              </a:rPr>
+              <a:t>etc</a:t>
+            </a:r>
+            <a:endParaRPr lang="en-US" dirty="0">
+              <a:ea typeface="Calibri"/>
+              <a:cs typeface="Calibri"/>
+            </a:endParaRPr>
+          </a:p>
+          <a:p>
+            <a:r>
+              <a:rPr lang="en-US" dirty="0">
+                <a:ea typeface="Calibri"/>
+                <a:cs typeface="Calibri"/>
+              </a:rPr>
+              <a:t>friendly fire – helps add variety when melee enemies' gang up on the player, and entertaining</a:t>
+            </a:r>
+          </a:p>
+          <a:p>
+            <a:r>
+              <a:rPr lang="en-US" dirty="0"/>
+              <a:t>Items – for the player and enemies to use (e.g., Trolly, Taser, Glass)</a:t>
+            </a:r>
+          </a:p>
+          <a:p>
+            <a:r>
+              <a:rPr lang="en-US" dirty="0">
+                <a:ea typeface="Calibri"/>
+                <a:cs typeface="Calibri"/>
+              </a:rPr>
+              <a:t>Zeus – AI boss enemy – more health – lighting stun attacks – gives taser on defeat</a:t>
+            </a:r>
+          </a:p>
+          <a:p>
+            <a:r>
+              <a:rPr lang="en-US" dirty="0">
+                <a:ea typeface="Calibri"/>
+                <a:cs typeface="Calibri"/>
+              </a:rPr>
+              <a:t>Boss variety</a:t>
             </a:r>
           </a:p>
         </p:txBody>
@@ -8651,7 +8878,7 @@
           <p:cNvPr id="2" name="Title 1">
             <a:extLst>
               <a:ext uri="{FF2B5EF4-FFF2-40B4-BE49-F238E27FC236}">
-                <a16:creationId xmlns:a16="http://schemas.microsoft.com/office/drawing/2014/main" id="{739CC088-5730-6A40-542B-19A924F066DA}"/>
+                <a16:creationId xmlns:a16="http://schemas.microsoft.com/office/drawing/2014/main" id="{5062687C-677B-942A-9161-3269826DDD4E}"/>
               </a:ext>
             </a:extLst>
           </p:cNvPr>
@@ -8669,10 +8896,12 @@
           <a:p>
             <a:r>
               <a:rPr lang="en-US" dirty="0">
+                <a:ea typeface="Calibri Light"/>
                 <a:cs typeface="Calibri Light"/>
               </a:rPr>
-              <a:t>Area Claiming</a:t>
-            </a:r>
+              <a:t>Equipment Mechanic</a:t>
+            </a:r>
+            <a:endParaRPr lang="en-US" dirty="0"/>
           </a:p>
         </p:txBody>
       </p:sp>
@@ -8681,7 +8910,7 @@
           <p:cNvPr id="3" name="Content Placeholder 2">
             <a:extLst>
               <a:ext uri="{FF2B5EF4-FFF2-40B4-BE49-F238E27FC236}">
-                <a16:creationId xmlns:a16="http://schemas.microsoft.com/office/drawing/2014/main" id="{2FF61C8D-E54D-EC4C-219F-08FD66290642}"/>
+                <a16:creationId xmlns:a16="http://schemas.microsoft.com/office/drawing/2014/main" id="{13076D57-4FD0-3765-E109-74F461A8F626}"/>
               </a:ext>
             </a:extLst>
           </p:cNvPr>
@@ -8694,73 +8923,29 @@
         </p:nvSpPr>
         <p:spPr/>
         <p:txBody>
-          <a:bodyPr vert="horz" lIns="91440" tIns="45720" rIns="91440" bIns="45720" rtlCol="0" anchor="t">
-            <a:normAutofit/>
-          </a:bodyPr>
+          <a:bodyPr/>
           <a:lstStyle/>
           <a:p>
-            <a:r>
-              <a:rPr lang="en-US" dirty="0">
-                <a:cs typeface="Calibri"/>
-              </a:rPr>
-              <a:t>Story wise the player is a new contestant fighting veteran contestants that were given their own areas, it stands to reason the player should get their own as well.</a:t>
-            </a:r>
-          </a:p>
-          <a:p>
-            <a:r>
-              <a:rPr lang="en-US" dirty="0">
-                <a:cs typeface="Calibri"/>
-              </a:rPr>
-              <a:t>Two ways I see it working (maybe do both) allows players to either make a level for other players to challenge, or let each stage be used as communal areas after completion that the players can use as hubs to talk to NPC's with</a:t>
-            </a:r>
-          </a:p>
-        </p:txBody>
-      </p:sp>
-      <p:sp>
-        <p:nvSpPr>
-          <p:cNvPr id="4" name="TextBox 3">
-            <a:extLst>
-              <a:ext uri="{FF2B5EF4-FFF2-40B4-BE49-F238E27FC236}">
-                <a16:creationId xmlns:a16="http://schemas.microsoft.com/office/drawing/2014/main" id="{5B3DEFA4-046C-B6CB-9A08-ED07BFEC8068}"/>
-              </a:ext>
-            </a:extLst>
-          </p:cNvPr>
-          <p:cNvSpPr txBox="1"/>
-          <p:nvPr/>
-        </p:nvSpPr>
-        <p:spPr>
-          <a:xfrm>
-            <a:off x="1726162" y="5295122"/>
-            <a:ext cx="4237653" cy="646331"/>
-          </a:xfrm>
-          <a:prstGeom prst="rect">
-            <a:avLst/>
-          </a:prstGeom>
-          <a:noFill/>
-        </p:spPr>
-        <p:txBody>
-          <a:bodyPr rot="0" spcFirstLastPara="0" vertOverflow="overflow" horzOverflow="overflow" vert="horz" wrap="square" lIns="91440" tIns="45720" rIns="91440" bIns="45720" numCol="1" spcCol="0" rtlCol="0" fromWordArt="0" anchor="t" anchorCtr="0" forceAA="0" compatLnSpc="1">
-            <a:prstTxWarp prst="textNoShape">
-              <a:avLst/>
-            </a:prstTxWarp>
-            <a:spAutoFit/>
-          </a:bodyPr>
-          <a:lstStyle/>
-          <a:p>
-            <a:r>
-              <a:rPr lang="en-US" dirty="0">
-                <a:cs typeface="Calibri"/>
-              </a:rPr>
-              <a:t>Note – page too wordy, Summaries this page &amp; add images</a:t>
-            </a:r>
-            <a:endParaRPr lang="en-US" dirty="0"/>
+            <a:pPr marL="0" indent="0">
+              <a:buNone/>
+            </a:pPr>
+            <a:r>
+              <a:rPr lang="en-US" dirty="0"/>
+              <a:t>With varies items to use we would need to implement an equipment mechanic for </a:t>
+            </a:r>
+          </a:p>
+          <a:p>
+            <a:r>
+              <a:rPr lang="en-US" dirty="0"/>
+              <a:t>We wouldn’t need many buttons, so we could bind each equip key to corelating socket</a:t>
+            </a:r>
           </a:p>
         </p:txBody>
       </p:sp>
     </p:spTree>
     <p:extLst>
       <p:ext uri="{BB962C8B-B14F-4D97-AF65-F5344CB8AC3E}">
-        <p14:creationId xmlns:p14="http://schemas.microsoft.com/office/powerpoint/2010/main" val="3248092553"/>
+        <p14:creationId xmlns:p14="http://schemas.microsoft.com/office/powerpoint/2010/main" val="3340763177"/>
       </p:ext>
     </p:extLst>
   </p:cSld>
@@ -8812,9 +8997,18 @@
               <a:rPr lang="en-US" dirty="0">
                 <a:cs typeface="Calibri Light"/>
               </a:rPr>
-              <a:t>Costumes</a:t>
-            </a:r>
-            <a:endParaRPr lang="en-US" dirty="0"/>
+              <a:t>Area Claiming </a:t>
+            </a:r>
+            <a:r>
+              <a:rPr lang="en-US" dirty="0">
+                <a:ea typeface="Calibri Light"/>
+                <a:cs typeface="Calibri Light"/>
+              </a:rPr>
+              <a:t>Mechanic</a:t>
+            </a:r>
+            <a:endParaRPr lang="en-US" dirty="0">
+              <a:cs typeface="Calibri Light"/>
+            </a:endParaRPr>
           </a:p>
         </p:txBody>
       </p:sp>
@@ -8845,7 +9039,7 @@
               <a:rPr lang="en-US" dirty="0">
                 <a:cs typeface="Calibri"/>
               </a:rPr>
-              <a:t>The enemies are in costume, why not the player too (the only reason is lack of time and resources)</a:t>
+              <a:t>Story wise the player is a new contestant fighting veteran contestants that were given their own areas, it stands to reason the player should get their own as well.</a:t>
             </a:r>
           </a:p>
           <a:p>
@@ -8853,15 +9047,56 @@
               <a:rPr lang="en-US" dirty="0">
                 <a:cs typeface="Calibri"/>
               </a:rPr>
-              <a:t>Could even unlock costume pieces from enemies the player defeats</a:t>
-            </a:r>
+              <a:t>Two ways I see it working (maybe do both) allows players to either make a level for other players to challenge, or let each stage be used as communal areas after completion that the players can use as hubs to talk to NPC's with</a:t>
+            </a:r>
+          </a:p>
+        </p:txBody>
+      </p:sp>
+      <p:sp>
+        <p:nvSpPr>
+          <p:cNvPr id="4" name="TextBox 3">
+            <a:extLst>
+              <a:ext uri="{FF2B5EF4-FFF2-40B4-BE49-F238E27FC236}">
+                <a16:creationId xmlns:a16="http://schemas.microsoft.com/office/drawing/2014/main" id="{5B3DEFA4-046C-B6CB-9A08-ED07BFEC8068}"/>
+              </a:ext>
+            </a:extLst>
+          </p:cNvPr>
+          <p:cNvSpPr txBox="1"/>
+          <p:nvPr/>
+        </p:nvSpPr>
+        <p:spPr>
+          <a:xfrm>
+            <a:off x="1726162" y="5295122"/>
+            <a:ext cx="4237653" cy="646331"/>
+          </a:xfrm>
+          <a:prstGeom prst="rect">
+            <a:avLst/>
+          </a:prstGeom>
+          <a:noFill/>
+        </p:spPr>
+        <p:txBody>
+          <a:bodyPr rot="0" spcFirstLastPara="0" vertOverflow="overflow" horzOverflow="overflow" vert="horz" wrap="square" lIns="91440" tIns="45720" rIns="91440" bIns="45720" numCol="1" spcCol="0" rtlCol="0" fromWordArt="0" anchor="t" anchorCtr="0" forceAA="0" compatLnSpc="1">
+            <a:prstTxWarp prst="textNoShape">
+              <a:avLst/>
+            </a:prstTxWarp>
+            <a:spAutoFit/>
+          </a:bodyPr>
+          <a:lstStyle/>
+          <a:p>
+            <a:r>
+              <a:rPr lang="en-US" dirty="0">
+                <a:cs typeface="Calibri"/>
+              </a:rPr>
+              <a:t>Note – page too wordy, Summaries this page &amp; add images</a:t>
+            </a:r>
+            <a:endParaRPr lang="en-US" dirty="0"/>
           </a:p>
         </p:txBody>
       </p:sp>
     </p:spTree>
     <p:extLst>
       <p:ext uri="{BB962C8B-B14F-4D97-AF65-F5344CB8AC3E}">
-        <p14:creationId xmlns:p14="http://schemas.microsoft.com/office/powerpoint/2010/main" val="227973062"/>
+        <p14:creationId xmlns:p14="http://schemas.microsoft.com/office/powerpoint/2010/main" val="3248092553"/>
       </p:ext>
     </p:extLst>
   </p:cSld>
@@ -8913,7 +9148,7 @@
               <a:rPr lang="en-US" dirty="0">
                 <a:cs typeface="Calibri Light"/>
               </a:rPr>
-              <a:t>Implementation that requires Polish</a:t>
+              <a:t>Costumes</a:t>
             </a:r>
             <a:endParaRPr lang="en-US" dirty="0"/>
           </a:p>
@@ -8946,7 +9181,15 @@
               <a:rPr lang="en-US" dirty="0">
                 <a:cs typeface="Calibri"/>
               </a:rPr>
-              <a:t>These are in game, but could use refining to meet our intention</a:t>
+              <a:t>The enemies are in costume, why not the player too (the only reason is lack of time and resources)</a:t>
+            </a:r>
+          </a:p>
+          <a:p>
+            <a:r>
+              <a:rPr lang="en-US" dirty="0">
+                <a:cs typeface="Calibri"/>
+              </a:rPr>
+              <a:t>Could even unlock costume pieces from enemies the player defeats</a:t>
             </a:r>
           </a:p>
         </p:txBody>
@@ -8954,7 +9197,7 @@
     </p:spTree>
     <p:extLst>
       <p:ext uri="{BB962C8B-B14F-4D97-AF65-F5344CB8AC3E}">
-        <p14:creationId xmlns:p14="http://schemas.microsoft.com/office/powerpoint/2010/main" val="1322337264"/>
+        <p14:creationId xmlns:p14="http://schemas.microsoft.com/office/powerpoint/2010/main" val="227973062"/>
       </p:ext>
     </p:extLst>
   </p:cSld>
@@ -9006,7 +9249,7 @@
               <a:rPr lang="en-US" dirty="0">
                 <a:cs typeface="Calibri Light"/>
               </a:rPr>
-              <a:t>How our teamwork could improve</a:t>
+              <a:t>Implementation that requires Polish</a:t>
             </a:r>
             <a:endParaRPr lang="en-US" dirty="0"/>
           </a:p>
@@ -9039,39 +9282,7 @@
               <a:rPr lang="en-US" dirty="0">
                 <a:cs typeface="Calibri"/>
               </a:rPr>
-              <a:t>Process improvements:</a:t>
-            </a:r>
-          </a:p>
-          <a:p>
-            <a:r>
-              <a:rPr lang="en-US" dirty="0">
-                <a:cs typeface="Calibri"/>
-              </a:rPr>
-              <a:t>Luke probably could have checked in less often, should have given </a:t>
-            </a:r>
-            <a:r>
-              <a:rPr lang="en-US" dirty="0" err="1">
-                <a:cs typeface="Calibri"/>
-              </a:rPr>
-              <a:t>Sujai</a:t>
-            </a:r>
-            <a:r>
-              <a:rPr lang="en-US" dirty="0">
-                <a:cs typeface="Calibri"/>
-              </a:rPr>
-              <a:t> more to do, could have updated the design documents more during the 3rd-5</a:t>
-            </a:r>
-            <a:r>
-              <a:rPr lang="en-US" baseline="30000" dirty="0">
-                <a:cs typeface="Calibri"/>
-              </a:rPr>
-              <a:t>th</a:t>
-            </a:r>
-            <a:r>
-              <a:rPr lang="en-US" dirty="0">
-                <a:cs typeface="Calibri"/>
-              </a:rPr>
-              <a:t> weeks, and should have focused less on the group pitch.</a:t>
+              <a:t>These are in game, but could use refining to meet our intention</a:t>
             </a:r>
           </a:p>
         </p:txBody>
@@ -9079,7 +9290,7 @@
     </p:spTree>
     <p:extLst>
       <p:ext uri="{BB962C8B-B14F-4D97-AF65-F5344CB8AC3E}">
-        <p14:creationId xmlns:p14="http://schemas.microsoft.com/office/powerpoint/2010/main" val="3700671194"/>
+        <p14:creationId xmlns:p14="http://schemas.microsoft.com/office/powerpoint/2010/main" val="1322337264"/>
       </p:ext>
     </p:extLst>
   </p:cSld>
@@ -9111,7 +9322,7 @@
           <p:cNvPr id="2" name="Title 1">
             <a:extLst>
               <a:ext uri="{FF2B5EF4-FFF2-40B4-BE49-F238E27FC236}">
-                <a16:creationId xmlns:a16="http://schemas.microsoft.com/office/drawing/2014/main" id="{F74824CB-C71E-86C0-6E64-408ECAB51A0F}"/>
+                <a16:creationId xmlns:a16="http://schemas.microsoft.com/office/drawing/2014/main" id="{739CC088-5730-6A40-542B-19A924F066DA}"/>
               </a:ext>
             </a:extLst>
           </p:cNvPr>
@@ -9129,10 +9340,9 @@
           <a:p>
             <a:r>
               <a:rPr lang="en-US" dirty="0">
-                <a:ea typeface="Calibri Light"/>
                 <a:cs typeface="Calibri Light"/>
               </a:rPr>
-              <a:t>Interaction</a:t>
+              <a:t>How our teamwork could improve</a:t>
             </a:r>
             <a:endParaRPr lang="en-US" dirty="0"/>
           </a:p>
@@ -9143,7 +9353,7 @@
           <p:cNvPr id="3" name="Content Placeholder 2">
             <a:extLst>
               <a:ext uri="{FF2B5EF4-FFF2-40B4-BE49-F238E27FC236}">
-                <a16:creationId xmlns:a16="http://schemas.microsoft.com/office/drawing/2014/main" id="{72DEA321-32E2-440C-635F-BBC9E0E1A05F}"/>
+                <a16:creationId xmlns:a16="http://schemas.microsoft.com/office/drawing/2014/main" id="{2FF61C8D-E54D-EC4C-219F-08FD66290642}"/>
               </a:ext>
             </a:extLst>
           </p:cNvPr>
@@ -9163,19 +9373,49 @@
           <a:p>
             <a:r>
               <a:rPr lang="en-US" dirty="0">
-                <a:ea typeface="Calibri"/>
                 <a:cs typeface="Calibri"/>
               </a:rPr>
-              <a:t>[Controls layout]</a:t>
-            </a:r>
-            <a:endParaRPr lang="en-US" dirty="0"/>
+              <a:t>Process improvements:</a:t>
+            </a:r>
+          </a:p>
+          <a:p>
+            <a:r>
+              <a:rPr lang="en-US" dirty="0">
+                <a:cs typeface="Calibri"/>
+              </a:rPr>
+              <a:t>Luke probably could have checked in less often, should have given </a:t>
+            </a:r>
+            <a:r>
+              <a:rPr lang="en-US" dirty="0" err="1">
+                <a:cs typeface="Calibri"/>
+              </a:rPr>
+              <a:t>Sujai</a:t>
+            </a:r>
+            <a:r>
+              <a:rPr lang="en-US" dirty="0">
+                <a:cs typeface="Calibri"/>
+              </a:rPr>
+              <a:t> more to do, could have updated the design documents more during the 3rd-5</a:t>
+            </a:r>
+            <a:r>
+              <a:rPr lang="en-US" baseline="30000" dirty="0">
+                <a:cs typeface="Calibri"/>
+              </a:rPr>
+              <a:t>th</a:t>
+            </a:r>
+            <a:r>
+              <a:rPr lang="en-US" dirty="0">
+                <a:cs typeface="Calibri"/>
+              </a:rPr>
+              <a:t> weeks, and should have focused less on the group pitch slides.</a:t>
+            </a:r>
           </a:p>
         </p:txBody>
       </p:sp>
     </p:spTree>
     <p:extLst>
       <p:ext uri="{BB962C8B-B14F-4D97-AF65-F5344CB8AC3E}">
-        <p14:creationId xmlns:p14="http://schemas.microsoft.com/office/powerpoint/2010/main" val="1229603757"/>
+        <p14:creationId xmlns:p14="http://schemas.microsoft.com/office/powerpoint/2010/main" val="3700671194"/>
       </p:ext>
     </p:extLst>
   </p:cSld>
@@ -9207,7 +9447,7 @@
           <p:cNvPr id="2" name="Title 1">
             <a:extLst>
               <a:ext uri="{FF2B5EF4-FFF2-40B4-BE49-F238E27FC236}">
-                <a16:creationId xmlns:a16="http://schemas.microsoft.com/office/drawing/2014/main" id="{5062687C-677B-942A-9161-3269826DDD4E}"/>
+                <a16:creationId xmlns:a16="http://schemas.microsoft.com/office/drawing/2014/main" id="{F74824CB-C71E-86C0-6E64-408ECAB51A0F}"/>
               </a:ext>
             </a:extLst>
           </p:cNvPr>
@@ -9228,7 +9468,7 @@
                 <a:ea typeface="Calibri Light"/>
                 <a:cs typeface="Calibri Light"/>
               </a:rPr>
-              <a:t>Equipment</a:t>
+              <a:t>Interaction</a:t>
             </a:r>
             <a:endParaRPr lang="en-US" dirty="0"/>
           </a:p>
@@ -9239,7 +9479,7 @@
           <p:cNvPr id="3" name="Content Placeholder 2">
             <a:extLst>
               <a:ext uri="{FF2B5EF4-FFF2-40B4-BE49-F238E27FC236}">
-                <a16:creationId xmlns:a16="http://schemas.microsoft.com/office/drawing/2014/main" id="{13076D57-4FD0-3765-E109-74F461A8F626}"/>
+                <a16:creationId xmlns:a16="http://schemas.microsoft.com/office/drawing/2014/main" id="{72DEA321-32E2-440C-635F-BBC9E0E1A05F}"/>
               </a:ext>
             </a:extLst>
           </p:cNvPr>
@@ -9252,20 +9492,40 @@
         </p:nvSpPr>
         <p:spPr/>
         <p:txBody>
-          <a:bodyPr/>
+          <a:bodyPr vert="horz" lIns="91440" tIns="45720" rIns="91440" bIns="45720" rtlCol="0" anchor="t">
+            <a:normAutofit/>
+          </a:bodyPr>
           <a:lstStyle/>
           <a:p>
             <a:r>
-              <a:rPr lang="en-US" dirty="0"/>
-              <a:t>We don’t need many buttons, so we could bind each equip key to corelating socket</a:t>
-            </a:r>
+              <a:rPr lang="en-US" dirty="0">
+                <a:ea typeface="Calibri"/>
+                <a:cs typeface="Calibri"/>
+              </a:rPr>
+              <a:t>[Controls layout]</a:t>
+            </a:r>
+          </a:p>
+          <a:p>
+            <a:r>
+              <a:rPr lang="en-US" dirty="0">
+                <a:cs typeface="Calibri"/>
+              </a:rPr>
+              <a:t>We want to include various Environment interactions, so the player has more unique options throughout the levels: scattered items, moveable objects, obstacles, </a:t>
+            </a:r>
+            <a:r>
+              <a:rPr lang="en-US" dirty="0" err="1">
+                <a:cs typeface="Calibri"/>
+              </a:rPr>
+              <a:t>etc</a:t>
+            </a:r>
+            <a:endParaRPr lang="en-US" dirty="0"/>
           </a:p>
         </p:txBody>
       </p:sp>
     </p:spTree>
     <p:extLst>
       <p:ext uri="{BB962C8B-B14F-4D97-AF65-F5344CB8AC3E}">
-        <p14:creationId xmlns:p14="http://schemas.microsoft.com/office/powerpoint/2010/main" val="3340763177"/>
+        <p14:creationId xmlns:p14="http://schemas.microsoft.com/office/powerpoint/2010/main" val="1229603757"/>
       </p:ext>
     </p:extLst>
   </p:cSld>
@@ -9297,7 +9557,7 @@
           <p:cNvPr id="2" name="Title 1">
             <a:extLst>
               <a:ext uri="{FF2B5EF4-FFF2-40B4-BE49-F238E27FC236}">
-                <a16:creationId xmlns:a16="http://schemas.microsoft.com/office/drawing/2014/main" id="{C7C39EA6-9679-3FF5-4D31-191BA74CF9BC}"/>
+                <a16:creationId xmlns:a16="http://schemas.microsoft.com/office/drawing/2014/main" id="{0EA2C688-3E4E-CD7E-94EC-2E1D4A29E39E}"/>
               </a:ext>
             </a:extLst>
           </p:cNvPr>
@@ -9318,7 +9578,7 @@
                 <a:ea typeface="Calibri Light"/>
                 <a:cs typeface="Calibri Light"/>
               </a:rPr>
-              <a:t>Item Improvements</a:t>
+              <a:t>Game to Player Feedback</a:t>
             </a:r>
             <a:endParaRPr lang="en-US" dirty="0"/>
           </a:p>
@@ -9329,7 +9589,7 @@
           <p:cNvPr id="3" name="Content Placeholder 2">
             <a:extLst>
               <a:ext uri="{FF2B5EF4-FFF2-40B4-BE49-F238E27FC236}">
-                <a16:creationId xmlns:a16="http://schemas.microsoft.com/office/drawing/2014/main" id="{34E60BDF-A173-9646-2EFB-CE447E9404EB}"/>
+                <a16:creationId xmlns:a16="http://schemas.microsoft.com/office/drawing/2014/main" id="{ED8FEACF-803D-4DB3-B670-9564FC82C211}"/>
               </a:ext>
             </a:extLst>
           </p:cNvPr>
@@ -9342,25 +9602,88 @@
         </p:nvSpPr>
         <p:spPr/>
         <p:txBody>
-          <a:bodyPr/>
+          <a:bodyPr vert="horz" lIns="91440" tIns="45720" rIns="91440" bIns="45720" rtlCol="0" anchor="t">
+            <a:normAutofit/>
+          </a:bodyPr>
           <a:lstStyle/>
           <a:p>
-            <a:r>
-              <a:rPr lang="en-US" dirty="0"/>
-              <a:t>Trolly</a:t>
-            </a:r>
-          </a:p>
-          <a:p>
-            <a:r>
-              <a:rPr lang="en-US" dirty="0" err="1"/>
-              <a:t>Taeser</a:t>
-            </a:r>
-            <a:endParaRPr lang="en-US" dirty="0"/>
-          </a:p>
-          <a:p>
-            <a:r>
-              <a:rPr lang="en-US" dirty="0"/>
-              <a:t>Glass</a:t>
+            <a:pPr marL="0" indent="0">
+              <a:buNone/>
+            </a:pPr>
+            <a:r>
+              <a:rPr lang="en-US" dirty="0">
+                <a:ea typeface="Calibri" panose="020F0502020204030204"/>
+                <a:cs typeface="Calibri" panose="020F0502020204030204"/>
+              </a:rPr>
+              <a:t>Ways the game will convey information to the player</a:t>
+            </a:r>
+          </a:p>
+          <a:p>
+            <a:r>
+              <a:rPr lang="en-US" dirty="0">
+                <a:ea typeface="Calibri" panose="020F0502020204030204"/>
+                <a:cs typeface="Calibri" panose="020F0502020204030204"/>
+              </a:rPr>
+              <a:t>Combat</a:t>
+            </a:r>
+          </a:p>
+          <a:p>
+            <a:pPr lvl="1"/>
+            <a:r>
+              <a:rPr lang="en-US" dirty="0">
+                <a:ea typeface="Calibri" panose="020F0502020204030204"/>
+                <a:cs typeface="Calibri" panose="020F0502020204030204"/>
+              </a:rPr>
+              <a:t>Ragdolls need to be Obvious</a:t>
+            </a:r>
+          </a:p>
+          <a:p>
+            <a:pPr lvl="1"/>
+            <a:r>
+              <a:rPr lang="en-US" dirty="0">
+                <a:ea typeface="Calibri" panose="020F0502020204030204"/>
+                <a:cs typeface="Calibri" panose="020F0502020204030204"/>
+              </a:rPr>
+              <a:t>Ideally sound effect indicate impact/damage</a:t>
+            </a:r>
+          </a:p>
+          <a:p>
+            <a:r>
+              <a:rPr lang="en-US" dirty="0">
+                <a:ea typeface="Calibri" panose="020F0502020204030204"/>
+                <a:cs typeface="Calibri" panose="020F0502020204030204"/>
+              </a:rPr>
+              <a:t>Progress indicators</a:t>
+            </a:r>
+          </a:p>
+          <a:p>
+            <a:pPr lvl="1"/>
+            <a:r>
+              <a:rPr lang="en-US" dirty="0">
+                <a:ea typeface="Calibri" panose="020F0502020204030204"/>
+                <a:cs typeface="Calibri" panose="020F0502020204030204"/>
+              </a:rPr>
+              <a:t>An enemy count could work</a:t>
+            </a:r>
+          </a:p>
+          <a:p>
+            <a:pPr lvl="1"/>
+            <a:r>
+              <a:rPr lang="en-US" dirty="0">
+                <a:ea typeface="Calibri" panose="020F0502020204030204"/>
+                <a:cs typeface="Calibri" panose="020F0502020204030204"/>
+              </a:rPr>
+              <a:t>Announcer comments</a:t>
+            </a:r>
+          </a:p>
+          <a:p>
+            <a:pPr lvl="1"/>
+            <a:r>
+              <a:rPr lang="en-US" dirty="0">
+                <a:ea typeface="Calibri" panose="020F0502020204030204"/>
+                <a:cs typeface="Calibri" panose="020F0502020204030204"/>
+              </a:rPr>
+              <a:t>Boss Talks</a:t>
             </a:r>
           </a:p>
         </p:txBody>
@@ -9368,7 +9691,7 @@
     </p:spTree>
     <p:extLst>
       <p:ext uri="{BB962C8B-B14F-4D97-AF65-F5344CB8AC3E}">
-        <p14:creationId xmlns:p14="http://schemas.microsoft.com/office/powerpoint/2010/main" val="1365072798"/>
+        <p14:creationId xmlns:p14="http://schemas.microsoft.com/office/powerpoint/2010/main" val="1242209069"/>
       </p:ext>
     </p:extLst>
   </p:cSld>
@@ -9381,6 +9704,14 @@
 <file path=ppt/slides/slide28.xml><?xml version="1.0" encoding="utf-8"?>
 <p:sld xmlns:a="http://schemas.openxmlformats.org/drawingml/2006/main" xmlns:r="http://schemas.openxmlformats.org/officeDocument/2006/relationships" xmlns:p="http://schemas.openxmlformats.org/presentationml/2006/main">
   <p:cSld>
+    <p:bg>
+      <p:bgPr>
+        <a:solidFill>
+          <a:srgbClr val="AB0C3F"/>
+        </a:solidFill>
+        <a:effectLst/>
+      </p:bgPr>
+    </p:bg>
     <p:spTree>
       <p:nvGrpSpPr>
         <p:cNvPr id="1" name=""/>
@@ -9400,7 +9731,7 @@
           <p:cNvPr id="2" name="Title 1">
             <a:extLst>
               <a:ext uri="{FF2B5EF4-FFF2-40B4-BE49-F238E27FC236}">
-                <a16:creationId xmlns:a16="http://schemas.microsoft.com/office/drawing/2014/main" id="{2F510B3C-B5D3-672A-E50D-68FC8DEC6E94}"/>
+                <a16:creationId xmlns:a16="http://schemas.microsoft.com/office/drawing/2014/main" id="{6BA261AC-462A-1895-C5DF-A3CFDD6BC5A4}"/>
               </a:ext>
             </a:extLst>
           </p:cNvPr>
@@ -9417,22 +9748,18 @@
           <a:lstStyle/>
           <a:p>
             <a:r>
-              <a:rPr lang="en-US" dirty="0">
-                <a:ea typeface="Calibri Light"/>
-                <a:cs typeface="Calibri Light"/>
-              </a:rPr>
-              <a:t>Threats</a:t>
-            </a:r>
-            <a:endParaRPr lang="en-US" dirty="0"/>
-          </a:p>
-        </p:txBody>
-      </p:sp>
-      <p:sp>
-        <p:nvSpPr>
-          <p:cNvPr id="3" name="Content Placeholder 2">
-            <a:extLst>
-              <a:ext uri="{FF2B5EF4-FFF2-40B4-BE49-F238E27FC236}">
-                <a16:creationId xmlns:a16="http://schemas.microsoft.com/office/drawing/2014/main" id="{34213A9F-A72E-C85A-E6F3-A17B97972F15}"/>
+              <a:rPr lang="en-GB" dirty="0"/>
+              <a:t>Questions</a:t>
+            </a:r>
+          </a:p>
+        </p:txBody>
+      </p:sp>
+      <p:sp>
+        <p:nvSpPr>
+          <p:cNvPr id="3" name="Text Placeholder 2">
+            <a:extLst>
+              <a:ext uri="{FF2B5EF4-FFF2-40B4-BE49-F238E27FC236}">
+                <a16:creationId xmlns:a16="http://schemas.microsoft.com/office/drawing/2014/main" id="{A1BC00C2-100F-EEB9-625B-95058B8CF55B}"/>
               </a:ext>
             </a:extLst>
           </p:cNvPr>
@@ -9440,57 +9767,22 @@
             <a:spLocks noGrp="1"/>
           </p:cNvSpPr>
           <p:nvPr>
-            <p:ph idx="1"/>
+            <p:ph type="body" idx="1"/>
           </p:nvPr>
         </p:nvSpPr>
         <p:spPr/>
         <p:txBody>
-          <a:bodyPr vert="horz" lIns="91440" tIns="45720" rIns="91440" bIns="45720" rtlCol="0" anchor="t">
-            <a:normAutofit/>
-          </a:bodyPr>
+          <a:bodyPr/>
           <a:lstStyle/>
           <a:p>
-            <a:r>
-              <a:rPr lang="en-US" dirty="0">
-                <a:ea typeface="Calibri"/>
-                <a:cs typeface="Calibri"/>
-              </a:rPr>
-              <a:t>enemy variety with different weapons/equipment</a:t>
-            </a:r>
-          </a:p>
-          <a:p>
-            <a:r>
-              <a:rPr lang="en-US" dirty="0">
-                <a:ea typeface="Calibri"/>
-                <a:cs typeface="Calibri"/>
-              </a:rPr>
-              <a:t>Boss variety</a:t>
-            </a:r>
-          </a:p>
-          <a:p>
-            <a:r>
-              <a:rPr lang="en-US" dirty="0">
-                <a:ea typeface="Calibri"/>
-                <a:cs typeface="Calibri"/>
-              </a:rPr>
-              <a:t>{maybe we allow friendly fire – helps with the repetitive nature of melee enemies ganging up on the player, and also entertaining}</a:t>
-            </a:r>
-          </a:p>
-          <a:p>
-            <a:r>
-              <a:rPr lang="en-US" dirty="0">
-                <a:ea typeface="Calibri"/>
-                <a:cs typeface="Calibri"/>
-              </a:rPr>
-              <a:t>Zeus – AI boss enemy – more health – lighting stun attacks – gives item on defeat</a:t>
-            </a:r>
+            <a:endParaRPr lang="en-GB"/>
           </a:p>
         </p:txBody>
       </p:sp>
     </p:spTree>
     <p:extLst>
       <p:ext uri="{BB962C8B-B14F-4D97-AF65-F5344CB8AC3E}">
-        <p14:creationId xmlns:p14="http://schemas.microsoft.com/office/powerpoint/2010/main" val="1839603197"/>
+        <p14:creationId xmlns:p14="http://schemas.microsoft.com/office/powerpoint/2010/main" val="4078218223"/>
       </p:ext>
     </p:extLst>
   </p:cSld>
@@ -9522,7 +9814,7 @@
           <p:cNvPr id="2" name="Title 1">
             <a:extLst>
               <a:ext uri="{FF2B5EF4-FFF2-40B4-BE49-F238E27FC236}">
-                <a16:creationId xmlns:a16="http://schemas.microsoft.com/office/drawing/2014/main" id="{0EA2C688-3E4E-CD7E-94EC-2E1D4A29E39E}"/>
+                <a16:creationId xmlns:a16="http://schemas.microsoft.com/office/drawing/2014/main" id="{FA7C05E7-A9B8-F2BD-E262-4B557C50E013}"/>
               </a:ext>
             </a:extLst>
           </p:cNvPr>
@@ -9543,7 +9835,7 @@
                 <a:ea typeface="Calibri Light"/>
                 <a:cs typeface="Calibri Light"/>
               </a:rPr>
-              <a:t>Game to Player Feedback</a:t>
+              <a:t>Posible Questions</a:t>
             </a:r>
             <a:endParaRPr lang="en-US" dirty="0"/>
           </a:p>
@@ -9554,7 +9846,7 @@
           <p:cNvPr id="3" name="Content Placeholder 2">
             <a:extLst>
               <a:ext uri="{FF2B5EF4-FFF2-40B4-BE49-F238E27FC236}">
-                <a16:creationId xmlns:a16="http://schemas.microsoft.com/office/drawing/2014/main" id="{ED8FEACF-803D-4DB3-B670-9564FC82C211}"/>
+                <a16:creationId xmlns:a16="http://schemas.microsoft.com/office/drawing/2014/main" id="{F212CEC1-CF87-87D1-0DC9-0D67F69E3BE9}"/>
               </a:ext>
             </a:extLst>
           </p:cNvPr>
@@ -9572,83 +9864,71 @@
           </a:bodyPr>
           <a:lstStyle/>
           <a:p>
-            <a:pPr marL="0" indent="0">
-              <a:buNone/>
-            </a:pPr>
             <a:r>
               <a:rPr lang="en-US" dirty="0">
-                <a:ea typeface="Calibri" panose="020F0502020204030204"/>
-                <a:cs typeface="Calibri" panose="020F0502020204030204"/>
+                <a:ea typeface="Calibri"/>
+                <a:cs typeface="Calibri"/>
               </a:rPr>
-              <a:t>Ways the game will convey information to the player</a:t>
+              <a:t>How is this different from other top-downs</a:t>
             </a:r>
           </a:p>
           <a:p>
             <a:r>
               <a:rPr lang="en-US" dirty="0">
-                <a:ea typeface="Calibri" panose="020F0502020204030204"/>
-                <a:cs typeface="Calibri" panose="020F0502020204030204"/>
+                <a:ea typeface="Calibri"/>
+                <a:cs typeface="Calibri"/>
               </a:rPr>
-              <a:t>Combat</a:t>
-            </a:r>
-          </a:p>
-          <a:p>
-            <a:pPr lvl="1"/>
+              <a:t>How would you sell/</a:t>
+            </a:r>
+            <a:r>
+              <a:rPr lang="en-US" dirty="0" err="1">
+                <a:ea typeface="Calibri"/>
+                <a:cs typeface="Calibri"/>
+              </a:rPr>
+              <a:t>monatise</a:t>
+            </a:r>
             <a:r>
               <a:rPr lang="en-US" dirty="0">
-                <a:ea typeface="Calibri" panose="020F0502020204030204"/>
-                <a:cs typeface="Calibri" panose="020F0502020204030204"/>
+                <a:ea typeface="Calibri"/>
+                <a:cs typeface="Calibri"/>
               </a:rPr>
-              <a:t>Ragdolls need to be Obvious</a:t>
-            </a:r>
-          </a:p>
-          <a:p>
-            <a:pPr lvl="1"/>
+              <a:t> this</a:t>
+            </a:r>
+          </a:p>
+          <a:p>
             <a:r>
               <a:rPr lang="en-US" dirty="0">
-                <a:ea typeface="Calibri" panose="020F0502020204030204"/>
-                <a:cs typeface="Calibri" panose="020F0502020204030204"/>
+                <a:ea typeface="Calibri"/>
+                <a:cs typeface="Calibri"/>
               </a:rPr>
-              <a:t>Ideally sound effect indicate impact/damage</a:t>
+              <a:t>What's your unique selling point</a:t>
             </a:r>
           </a:p>
           <a:p>
             <a:r>
               <a:rPr lang="en-US" dirty="0">
-                <a:ea typeface="Calibri" panose="020F0502020204030204"/>
-                <a:cs typeface="Calibri" panose="020F0502020204030204"/>
+                <a:ea typeface="Calibri"/>
+                <a:cs typeface="Calibri"/>
               </a:rPr>
-              <a:t>Progress indicators</a:t>
-            </a:r>
-          </a:p>
-          <a:p>
-            <a:pPr lvl="1"/>
+              <a:t>What problems did you encounter/deal with</a:t>
+            </a:r>
+          </a:p>
+          <a:p>
             <a:r>
               <a:rPr lang="en-US" dirty="0">
-                <a:ea typeface="Calibri" panose="020F0502020204030204"/>
-                <a:cs typeface="Calibri" panose="020F0502020204030204"/>
+                <a:ea typeface="Calibri"/>
+                <a:cs typeface="Calibri"/>
               </a:rPr>
-              <a:t>An enemy count could work</a:t>
-            </a:r>
-          </a:p>
-          <a:p>
-            <a:pPr lvl="1"/>
+              <a:t>Why this mechanic</a:t>
+            </a:r>
+          </a:p>
+          <a:p>
             <a:r>
               <a:rPr lang="en-US" dirty="0">
-                <a:ea typeface="Calibri" panose="020F0502020204030204"/>
-                <a:cs typeface="Calibri" panose="020F0502020204030204"/>
+                <a:ea typeface="Calibri"/>
+                <a:cs typeface="Calibri"/>
               </a:rPr>
-              <a:t>Announcer comments</a:t>
-            </a:r>
-          </a:p>
-          <a:p>
-            <a:pPr lvl="1"/>
-            <a:r>
-              <a:rPr lang="en-US" dirty="0">
-                <a:ea typeface="Calibri" panose="020F0502020204030204"/>
-                <a:cs typeface="Calibri" panose="020F0502020204030204"/>
-              </a:rPr>
-              <a:t>Boss Talks</a:t>
+              <a:t>How would you improve it</a:t>
             </a:r>
           </a:p>
         </p:txBody>
@@ -9656,7 +9936,7 @@
     </p:spTree>
     <p:extLst>
       <p:ext uri="{BB962C8B-B14F-4D97-AF65-F5344CB8AC3E}">
-        <p14:creationId xmlns:p14="http://schemas.microsoft.com/office/powerpoint/2010/main" val="1242209069"/>
+        <p14:creationId xmlns:p14="http://schemas.microsoft.com/office/powerpoint/2010/main" val="1467298326"/>
       </p:ext>
     </p:extLst>
   </p:cSld>
@@ -9760,242 +10040,6 @@
 </p:sld>
 </file>
 
-<file path=ppt/slides/slide30.xml><?xml version="1.0" encoding="utf-8"?>
-<p:sld xmlns:a="http://schemas.openxmlformats.org/drawingml/2006/main" xmlns:r="http://schemas.openxmlformats.org/officeDocument/2006/relationships" xmlns:p="http://schemas.openxmlformats.org/presentationml/2006/main">
-  <p:cSld>
-    <p:bg>
-      <p:bgPr>
-        <a:solidFill>
-          <a:srgbClr val="AB0C3F"/>
-        </a:solidFill>
-        <a:effectLst/>
-      </p:bgPr>
-    </p:bg>
-    <p:spTree>
-      <p:nvGrpSpPr>
-        <p:cNvPr id="1" name=""/>
-        <p:cNvGrpSpPr/>
-        <p:nvPr/>
-      </p:nvGrpSpPr>
-      <p:grpSpPr>
-        <a:xfrm>
-          <a:off x="0" y="0"/>
-          <a:ext cx="0" cy="0"/>
-          <a:chOff x="0" y="0"/>
-          <a:chExt cx="0" cy="0"/>
-        </a:xfrm>
-      </p:grpSpPr>
-      <p:sp>
-        <p:nvSpPr>
-          <p:cNvPr id="2" name="Title 1">
-            <a:extLst>
-              <a:ext uri="{FF2B5EF4-FFF2-40B4-BE49-F238E27FC236}">
-                <a16:creationId xmlns:a16="http://schemas.microsoft.com/office/drawing/2014/main" id="{6BA261AC-462A-1895-C5DF-A3CFDD6BC5A4}"/>
-              </a:ext>
-            </a:extLst>
-          </p:cNvPr>
-          <p:cNvSpPr>
-            <a:spLocks noGrp="1"/>
-          </p:cNvSpPr>
-          <p:nvPr>
-            <p:ph type="title"/>
-          </p:nvPr>
-        </p:nvSpPr>
-        <p:spPr/>
-        <p:txBody>
-          <a:bodyPr/>
-          <a:lstStyle/>
-          <a:p>
-            <a:r>
-              <a:rPr lang="en-GB" dirty="0"/>
-              <a:t>Questions</a:t>
-            </a:r>
-          </a:p>
-        </p:txBody>
-      </p:sp>
-      <p:sp>
-        <p:nvSpPr>
-          <p:cNvPr id="3" name="Text Placeholder 2">
-            <a:extLst>
-              <a:ext uri="{FF2B5EF4-FFF2-40B4-BE49-F238E27FC236}">
-                <a16:creationId xmlns:a16="http://schemas.microsoft.com/office/drawing/2014/main" id="{A1BC00C2-100F-EEB9-625B-95058B8CF55B}"/>
-              </a:ext>
-            </a:extLst>
-          </p:cNvPr>
-          <p:cNvSpPr>
-            <a:spLocks noGrp="1"/>
-          </p:cNvSpPr>
-          <p:nvPr>
-            <p:ph type="body" idx="1"/>
-          </p:nvPr>
-        </p:nvSpPr>
-        <p:spPr/>
-        <p:txBody>
-          <a:bodyPr/>
-          <a:lstStyle/>
-          <a:p>
-            <a:endParaRPr lang="en-GB"/>
-          </a:p>
-        </p:txBody>
-      </p:sp>
-    </p:spTree>
-    <p:extLst>
-      <p:ext uri="{BB962C8B-B14F-4D97-AF65-F5344CB8AC3E}">
-        <p14:creationId xmlns:p14="http://schemas.microsoft.com/office/powerpoint/2010/main" val="4078218223"/>
-      </p:ext>
-    </p:extLst>
-  </p:cSld>
-  <p:clrMapOvr>
-    <a:masterClrMapping/>
-  </p:clrMapOvr>
-</p:sld>
-</file>
-
-<file path=ppt/slides/slide31.xml><?xml version="1.0" encoding="utf-8"?>
-<p:sld xmlns:a="http://schemas.openxmlformats.org/drawingml/2006/main" xmlns:r="http://schemas.openxmlformats.org/officeDocument/2006/relationships" xmlns:p="http://schemas.openxmlformats.org/presentationml/2006/main">
-  <p:cSld>
-    <p:spTree>
-      <p:nvGrpSpPr>
-        <p:cNvPr id="1" name=""/>
-        <p:cNvGrpSpPr/>
-        <p:nvPr/>
-      </p:nvGrpSpPr>
-      <p:grpSpPr>
-        <a:xfrm>
-          <a:off x="0" y="0"/>
-          <a:ext cx="0" cy="0"/>
-          <a:chOff x="0" y="0"/>
-          <a:chExt cx="0" cy="0"/>
-        </a:xfrm>
-      </p:grpSpPr>
-      <p:sp>
-        <p:nvSpPr>
-          <p:cNvPr id="2" name="Title 1">
-            <a:extLst>
-              <a:ext uri="{FF2B5EF4-FFF2-40B4-BE49-F238E27FC236}">
-                <a16:creationId xmlns:a16="http://schemas.microsoft.com/office/drawing/2014/main" id="{FA7C05E7-A9B8-F2BD-E262-4B557C50E013}"/>
-              </a:ext>
-            </a:extLst>
-          </p:cNvPr>
-          <p:cNvSpPr>
-            <a:spLocks noGrp="1"/>
-          </p:cNvSpPr>
-          <p:nvPr>
-            <p:ph type="title"/>
-          </p:nvPr>
-        </p:nvSpPr>
-        <p:spPr/>
-        <p:txBody>
-          <a:bodyPr/>
-          <a:lstStyle/>
-          <a:p>
-            <a:r>
-              <a:rPr lang="en-US" dirty="0">
-                <a:ea typeface="Calibri Light"/>
-                <a:cs typeface="Calibri Light"/>
-              </a:rPr>
-              <a:t>Posible Questions</a:t>
-            </a:r>
-            <a:endParaRPr lang="en-US" dirty="0"/>
-          </a:p>
-        </p:txBody>
-      </p:sp>
-      <p:sp>
-        <p:nvSpPr>
-          <p:cNvPr id="3" name="Content Placeholder 2">
-            <a:extLst>
-              <a:ext uri="{FF2B5EF4-FFF2-40B4-BE49-F238E27FC236}">
-                <a16:creationId xmlns:a16="http://schemas.microsoft.com/office/drawing/2014/main" id="{F212CEC1-CF87-87D1-0DC9-0D67F69E3BE9}"/>
-              </a:ext>
-            </a:extLst>
-          </p:cNvPr>
-          <p:cNvSpPr>
-            <a:spLocks noGrp="1"/>
-          </p:cNvSpPr>
-          <p:nvPr>
-            <p:ph idx="1"/>
-          </p:nvPr>
-        </p:nvSpPr>
-        <p:spPr/>
-        <p:txBody>
-          <a:bodyPr vert="horz" lIns="91440" tIns="45720" rIns="91440" bIns="45720" rtlCol="0" anchor="t">
-            <a:normAutofit/>
-          </a:bodyPr>
-          <a:lstStyle/>
-          <a:p>
-            <a:r>
-              <a:rPr lang="en-US" dirty="0">
-                <a:ea typeface="Calibri"/>
-                <a:cs typeface="Calibri"/>
-              </a:rPr>
-              <a:t>How is this different from other top-downs</a:t>
-            </a:r>
-          </a:p>
-          <a:p>
-            <a:r>
-              <a:rPr lang="en-US" dirty="0">
-                <a:ea typeface="Calibri"/>
-                <a:cs typeface="Calibri"/>
-              </a:rPr>
-              <a:t>How would you sell/</a:t>
-            </a:r>
-            <a:r>
-              <a:rPr lang="en-US" dirty="0" err="1">
-                <a:ea typeface="Calibri"/>
-                <a:cs typeface="Calibri"/>
-              </a:rPr>
-              <a:t>monatise</a:t>
-            </a:r>
-            <a:r>
-              <a:rPr lang="en-US" dirty="0">
-                <a:ea typeface="Calibri"/>
-                <a:cs typeface="Calibri"/>
-              </a:rPr>
-              <a:t> this</a:t>
-            </a:r>
-          </a:p>
-          <a:p>
-            <a:r>
-              <a:rPr lang="en-US" dirty="0">
-                <a:ea typeface="Calibri"/>
-                <a:cs typeface="Calibri"/>
-              </a:rPr>
-              <a:t>What problems did you encounter/deal with</a:t>
-            </a:r>
-          </a:p>
-          <a:p>
-            <a:r>
-              <a:rPr lang="en-US">
-                <a:ea typeface="Calibri"/>
-                <a:cs typeface="Calibri"/>
-              </a:rPr>
-              <a:t>Why this mechanic</a:t>
-            </a:r>
-          </a:p>
-          <a:p>
-            <a:r>
-              <a:rPr lang="en-US" dirty="0">
-                <a:ea typeface="Calibri"/>
-                <a:cs typeface="Calibri"/>
-              </a:rPr>
-              <a:t>How would you improve it</a:t>
-            </a:r>
-          </a:p>
-        </p:txBody>
-      </p:sp>
-    </p:spTree>
-    <p:extLst>
-      <p:ext uri="{BB962C8B-B14F-4D97-AF65-F5344CB8AC3E}">
-        <p14:creationId xmlns:p14="http://schemas.microsoft.com/office/powerpoint/2010/main" val="1467298326"/>
-      </p:ext>
-    </p:extLst>
-  </p:cSld>
-  <p:clrMapOvr>
-    <a:masterClrMapping/>
-  </p:clrMapOvr>
-</p:sld>
-</file>
-
 <file path=ppt/slides/slide4.xml><?xml version="1.0" encoding="utf-8"?>
 <p:sld xmlns:a="http://schemas.openxmlformats.org/drawingml/2006/main" xmlns:r="http://schemas.openxmlformats.org/officeDocument/2006/relationships" xmlns:p="http://schemas.openxmlformats.org/presentationml/2006/main">
   <p:cSld>
@@ -10060,10 +10104,15 @@
             <p:ph idx="1"/>
           </p:nvPr>
         </p:nvSpPr>
-        <p:spPr/>
+        <p:spPr>
+          <a:xfrm>
+            <a:off x="838200" y="1825625"/>
+            <a:ext cx="6427573" cy="4351338"/>
+          </a:xfrm>
+        </p:spPr>
         <p:txBody>
           <a:bodyPr vert="horz" lIns="91440" tIns="45720" rIns="91440" bIns="45720" rtlCol="0" anchor="t">
-            <a:normAutofit/>
+            <a:normAutofit fontScale="92500" lnSpcReduction="10000"/>
           </a:bodyPr>
           <a:lstStyle/>
           <a:p>
@@ -10071,47 +10120,15 @@
               <a:rPr lang="en-US" dirty="0">
                 <a:cs typeface="Calibri"/>
               </a:rPr>
-              <a:t>Fast top-down action game – hotline </a:t>
-            </a:r>
-            <a:r>
-              <a:rPr lang="en-US" dirty="0" err="1">
-                <a:cs typeface="Calibri"/>
-              </a:rPr>
-              <a:t>miami</a:t>
-            </a:r>
+              <a:t>Fast top-down action game – Hotline Miami (we wanted to combine the balls to wall action of Hotline with the wacky physics of games like Gang Beasts)</a:t>
+            </a:r>
+          </a:p>
+          <a:p>
             <a:r>
               <a:rPr lang="en-US" dirty="0">
                 <a:cs typeface="Calibri"/>
               </a:rPr>
-              <a:t> (we wanted to combine the balls to wall action of Hotline with the wacky physics of games like </a:t>
-            </a:r>
-            <a:r>
-              <a:rPr lang="en-US" dirty="0" err="1">
-                <a:cs typeface="Calibri"/>
-              </a:rPr>
-              <a:t>gangbeasts</a:t>
-            </a:r>
-            <a:r>
-              <a:rPr lang="en-US" dirty="0">
-                <a:cs typeface="Calibri"/>
-              </a:rPr>
-              <a:t>)</a:t>
-            </a:r>
-          </a:p>
-          <a:p>
-            <a:r>
-              <a:rPr lang="en-US" dirty="0">
-                <a:cs typeface="Calibri"/>
-              </a:rPr>
-              <a:t>Gang beasts (the most popular of physics fighters made it the easiest to draw inspiration from)</a:t>
-            </a:r>
-          </a:p>
-          <a:p>
-            <a:r>
-              <a:rPr lang="en-US" dirty="0">
-                <a:cs typeface="Calibri"/>
-              </a:rPr>
-              <a:t>While hades &amp; Isaac hang out in the backrooms of potential</a:t>
+              <a:t>Gang Beasts (the most popular of physics fighters made it the easiest to draw inspiration from)</a:t>
             </a:r>
           </a:p>
           <a:p>

</xml_diff>

<commit_message>
copied over chaz's notes into main pitch
</commit_message>
<xml_diff>
--- a/Shared Documentation/Luke's Documents/Clash of Cos Team Pitch.pptx
+++ b/Shared Documentation/Luke's Documents/Clash of Cos Team Pitch.pptx
@@ -5,7 +5,7 @@
     <p:sldMasterId id="2147483660" r:id="rId1"/>
   </p:sldMasterIdLst>
   <p:notesMasterIdLst>
-    <p:notesMasterId r:id="rId31"/>
+    <p:notesMasterId r:id="rId30"/>
   </p:notesMasterIdLst>
   <p:sldIdLst>
     <p:sldId id="256" r:id="rId2"/>
@@ -19,24 +19,23 @@
     <p:sldId id="280" r:id="rId10"/>
     <p:sldId id="261" r:id="rId11"/>
     <p:sldId id="262" r:id="rId12"/>
-    <p:sldId id="263" r:id="rId13"/>
-    <p:sldId id="296" r:id="rId14"/>
-    <p:sldId id="299" r:id="rId15"/>
-    <p:sldId id="284" r:id="rId16"/>
-    <p:sldId id="282" r:id="rId17"/>
-    <p:sldId id="300" r:id="rId18"/>
-    <p:sldId id="301" r:id="rId19"/>
-    <p:sldId id="289" r:id="rId20"/>
-    <p:sldId id="295" r:id="rId21"/>
-    <p:sldId id="265" r:id="rId22"/>
-    <p:sldId id="294" r:id="rId23"/>
-    <p:sldId id="297" r:id="rId24"/>
-    <p:sldId id="290" r:id="rId25"/>
-    <p:sldId id="298" r:id="rId26"/>
-    <p:sldId id="264" r:id="rId27"/>
-    <p:sldId id="278" r:id="rId28"/>
-    <p:sldId id="285" r:id="rId29"/>
-    <p:sldId id="286" r:id="rId30"/>
+    <p:sldId id="296" r:id="rId13"/>
+    <p:sldId id="299" r:id="rId14"/>
+    <p:sldId id="284" r:id="rId15"/>
+    <p:sldId id="282" r:id="rId16"/>
+    <p:sldId id="300" r:id="rId17"/>
+    <p:sldId id="301" r:id="rId18"/>
+    <p:sldId id="289" r:id="rId19"/>
+    <p:sldId id="295" r:id="rId20"/>
+    <p:sldId id="265" r:id="rId21"/>
+    <p:sldId id="294" r:id="rId22"/>
+    <p:sldId id="297" r:id="rId23"/>
+    <p:sldId id="290" r:id="rId24"/>
+    <p:sldId id="298" r:id="rId25"/>
+    <p:sldId id="264" r:id="rId26"/>
+    <p:sldId id="278" r:id="rId27"/>
+    <p:sldId id="285" r:id="rId28"/>
+    <p:sldId id="286" r:id="rId29"/>
   </p:sldIdLst>
   <p:sldSz cx="12192000" cy="6858000"/>
   <p:notesSz cx="6858000" cy="9144000"/>
@@ -1527,6 +1526,55 @@
               <a:t>Could talk about the potential knock back gameplay improvement we didn’t have time</a:t>
             </a:r>
           </a:p>
+          <a:p>
+            <a:endParaRPr lang="en-GB" dirty="0"/>
+          </a:p>
+          <a:p>
+            <a:pPr marL="0" marR="0" lvl="0" indent="0" algn="l" defTabSz="914400" rtl="0" eaLnBrk="1" fontAlgn="auto" latinLnBrk="0" hangingPunct="1">
+              <a:lnSpc>
+                <a:spcPct val="100000"/>
+              </a:lnSpc>
+              <a:spcBef>
+                <a:spcPts val="0"/>
+              </a:spcBef>
+              <a:spcAft>
+                <a:spcPts val="0"/>
+              </a:spcAft>
+              <a:buClrTx/>
+              <a:buSzTx/>
+              <a:buFontTx/>
+              <a:buNone/>
+              <a:tabLst/>
+              <a:defRPr/>
+            </a:pPr>
+            <a:r>
+              <a:rPr lang="en-GB" dirty="0"/>
+              <a:t>We wanted a better knockback system in place for hitting enemies, but due to time we couldn’t improve on that as we wanted to focus on gameplay and game feel more, so it was an overall more enjoying experience. We also wanted to add it so the player could be knocked out/knocked down in ragdoll before being able to get back up and try adjust to the enemies again in a panic like state as o make the player think on their feet.</a:t>
+            </a:r>
+          </a:p>
+          <a:p>
+            <a:endParaRPr lang="en-GB" dirty="0"/>
+          </a:p>
+          <a:p>
+            <a:r>
+              <a:rPr lang="en-GB" dirty="0"/>
+              <a:t>The knock back element was a simple implement to add as it worked as a Collison. For example, in gang beasts when players hit each other, they get knocked back based on the force/momentum of the attack. As our main mechanic worked with the player needing to swing their arm around to attack enemies, the Collison between their arm and the enemy was enough force to cause a comedic knockback on enemies when they go into ragdoll. The same was also true if an enemy was hit with a punch with little force, so they wouldn't fly back a large distance, making a good physics and Collison system. </a:t>
+            </a:r>
+          </a:p>
+          <a:p>
+            <a:endParaRPr lang="en-GB" dirty="0"/>
+          </a:p>
+          <a:p>
+            <a:r>
+              <a:rPr lang="en-GB" dirty="0"/>
+              <a:t>However, we did have issues such as enemies being stuck on the player when hitting them. This was an easy fix as we just needed to arrange the ragdolls a little so they wouldn’t become stuck on the player character and would instead be knocked down or knockback by the punch</a:t>
+            </a:r>
+            <a:r>
+              <a:rPr lang="en-GB"/>
+              <a:t>. </a:t>
+            </a:r>
+            <a:endParaRPr lang="en-GB" dirty="0"/>
+          </a:p>
         </p:txBody>
       </p:sp>
       <p:sp>
@@ -1546,7 +1594,7 @@
           <a:p>
             <a:fld id="{D836FB3E-CF55-4E45-A9DF-53B34A9308C8}" type="slidenum">
               <a:rPr lang="en-GB" smtClean="0"/>
-              <a:t>15</a:t>
+              <a:t>14</a:t>
             </a:fld>
             <a:endParaRPr lang="en-GB"/>
           </a:p>
@@ -6760,42 +6808,10 @@
       </p:grpSpPr>
       <p:sp>
         <p:nvSpPr>
-          <p:cNvPr id="2" name="Title 1">
+          <p:cNvPr id="3" name="TextBox 2">
             <a:extLst>
               <a:ext uri="{FF2B5EF4-FFF2-40B4-BE49-F238E27FC236}">
-                <a16:creationId xmlns:a16="http://schemas.microsoft.com/office/drawing/2014/main" id="{7257D8F3-71EB-9C38-7E7E-F39A8DE33A52}"/>
-              </a:ext>
-            </a:extLst>
-          </p:cNvPr>
-          <p:cNvSpPr>
-            <a:spLocks noGrp="1"/>
-          </p:cNvSpPr>
-          <p:nvPr>
-            <p:ph type="title"/>
-          </p:nvPr>
-        </p:nvSpPr>
-        <p:spPr/>
-        <p:txBody>
-          <a:bodyPr/>
-          <a:lstStyle/>
-          <a:p>
-            <a:r>
-              <a:rPr lang="en-US" dirty="0">
-                <a:ea typeface="Calibri Light"/>
-                <a:cs typeface="Calibri Light"/>
-              </a:rPr>
-              <a:t>Core Gameplay</a:t>
-            </a:r>
-            <a:endParaRPr lang="en-US" dirty="0"/>
-          </a:p>
-        </p:txBody>
-      </p:sp>
-      <p:sp>
-        <p:nvSpPr>
-          <p:cNvPr id="4" name="TextBox 3">
-            <a:extLst>
-              <a:ext uri="{FF2B5EF4-FFF2-40B4-BE49-F238E27FC236}">
-                <a16:creationId xmlns:a16="http://schemas.microsoft.com/office/drawing/2014/main" id="{1BFDDFEA-3DAE-7AF1-6B0E-39D74E633ADD}"/>
+                <a16:creationId xmlns:a16="http://schemas.microsoft.com/office/drawing/2014/main" id="{301E72D1-EC55-83CD-AAFB-2B33CF0F4633}"/>
               </a:ext>
             </a:extLst>
           </p:cNvPr>
@@ -6804,8 +6820,8 @@
         </p:nvSpPr>
         <p:spPr>
           <a:xfrm>
-            <a:off x="612843" y="1848255"/>
-            <a:ext cx="10603148" cy="369332"/>
+            <a:off x="3381915" y="1848255"/>
+            <a:ext cx="8306870" cy="369332"/>
           </a:xfrm>
           <a:prstGeom prst="rect">
             <a:avLst/>
@@ -6827,10 +6843,10 @@
       </p:sp>
       <p:pic>
         <p:nvPicPr>
-          <p:cNvPr id="1026" name="Picture 2">
+          <p:cNvPr id="8" name="Picture 2">
             <a:extLst>
               <a:ext uri="{FF2B5EF4-FFF2-40B4-BE49-F238E27FC236}">
-                <a16:creationId xmlns:a16="http://schemas.microsoft.com/office/drawing/2014/main" id="{4AEA6883-D57F-12B2-67B6-D0C7616E4080}"/>
+                <a16:creationId xmlns:a16="http://schemas.microsoft.com/office/drawing/2014/main" id="{3F58A48E-B415-B77D-31D6-192F821C0DE1}"/>
               </a:ext>
             </a:extLst>
           </p:cNvPr>
@@ -6852,7 +6868,7 @@
         </p:blipFill>
         <p:spPr bwMode="auto">
           <a:xfrm rot="5400000">
-            <a:off x="3002300" y="-92128"/>
+            <a:off x="5771372" y="-92128"/>
             <a:ext cx="3540865" cy="8475429"/>
           </a:xfrm>
           <a:prstGeom prst="rect">
@@ -6872,10 +6888,83 @@
       </p:pic>
       <p:sp>
         <p:nvSpPr>
-          <p:cNvPr id="3" name="TextBox 2">
+          <p:cNvPr id="2" name="Title 1">
             <a:extLst>
               <a:ext uri="{FF2B5EF4-FFF2-40B4-BE49-F238E27FC236}">
-                <a16:creationId xmlns:a16="http://schemas.microsoft.com/office/drawing/2014/main" id="{A5D5FF03-11D7-4E32-6C31-4F77B45817AD}"/>
+                <a16:creationId xmlns:a16="http://schemas.microsoft.com/office/drawing/2014/main" id="{5C4132F1-9311-30FF-7FD5-6039FF1A4A1C}"/>
+              </a:ext>
+            </a:extLst>
+          </p:cNvPr>
+          <p:cNvSpPr>
+            <a:spLocks noGrp="1"/>
+          </p:cNvSpPr>
+          <p:nvPr>
+            <p:ph type="title"/>
+          </p:nvPr>
+        </p:nvSpPr>
+        <p:spPr/>
+        <p:txBody>
+          <a:bodyPr/>
+          <a:lstStyle/>
+          <a:p>
+            <a:r>
+              <a:rPr lang="en-GB" dirty="0"/>
+              <a:t>Core Gameplay Inspiration and Design</a:t>
+            </a:r>
+          </a:p>
+        </p:txBody>
+      </p:sp>
+      <p:pic>
+        <p:nvPicPr>
+          <p:cNvPr id="4" name="Picture 2" descr="Image result for gang beasts punch force mod">
+            <a:extLst>
+              <a:ext uri="{FF2B5EF4-FFF2-40B4-BE49-F238E27FC236}">
+                <a16:creationId xmlns:a16="http://schemas.microsoft.com/office/drawing/2014/main" id="{350C4873-1747-F449-B241-13AED5B2450E}"/>
+              </a:ext>
+            </a:extLst>
+          </p:cNvPr>
+          <p:cNvPicPr>
+            <a:picLocks noChangeAspect="1" noChangeArrowheads="1"/>
+          </p:cNvPicPr>
+          <p:nvPr/>
+        </p:nvPicPr>
+        <p:blipFill rotWithShape="1">
+          <a:blip r:embed="rId3">
+            <a:extLst>
+              <a:ext uri="{28A0092B-C50C-407E-A947-70E740481C1C}">
+                <a14:useLocalDpi xmlns:a14="http://schemas.microsoft.com/office/drawing/2010/main" val="0"/>
+              </a:ext>
+            </a:extLst>
+          </a:blip>
+          <a:srcRect r="23112" b="21217"/>
+          <a:stretch/>
+        </p:blipFill>
+        <p:spPr bwMode="auto">
+          <a:xfrm>
+            <a:off x="511607" y="2607870"/>
+            <a:ext cx="2571059" cy="1559854"/>
+          </a:xfrm>
+          <a:prstGeom prst="rect">
+            <a:avLst/>
+          </a:prstGeom>
+          <a:noFill/>
+          <a:extLst>
+            <a:ext uri="{909E8E84-426E-40DD-AFC4-6F175D3DCCD1}">
+              <a14:hiddenFill xmlns:a14="http://schemas.microsoft.com/office/drawing/2010/main">
+                <a:solidFill>
+                  <a:srgbClr val="FFFFFF"/>
+                </a:solidFill>
+              </a14:hiddenFill>
+            </a:ext>
+          </a:extLst>
+        </p:spPr>
+      </p:pic>
+      <p:sp>
+        <p:nvSpPr>
+          <p:cNvPr id="5" name="TextBox 4">
+            <a:extLst>
+              <a:ext uri="{FF2B5EF4-FFF2-40B4-BE49-F238E27FC236}">
+                <a16:creationId xmlns:a16="http://schemas.microsoft.com/office/drawing/2014/main" id="{B064BEE8-BC07-75E8-2F93-A0F9A109A6E5}"/>
               </a:ext>
             </a:extLst>
           </p:cNvPr>
@@ -6884,8 +6973,8 @@
         </p:nvSpPr>
         <p:spPr>
           <a:xfrm>
-            <a:off x="2830048" y="5855858"/>
-            <a:ext cx="7640244" cy="923330"/>
+            <a:off x="440129" y="1920565"/>
+            <a:ext cx="2714017" cy="646331"/>
           </a:xfrm>
           <a:prstGeom prst="rect">
             <a:avLst/>
@@ -6900,7 +6989,77 @@
           <a:p>
             <a:r>
               <a:rPr lang="en-GB" dirty="0"/>
-              <a:t>This game hopes to combine that with high speeds and the corresponding dynamic decision-making. Hopefully resulting in wacky game with the most unexpectedly high technical skill ceiling</a:t>
+              <a:t>We modelled our attacks and dodges on Gang beast</a:t>
+            </a:r>
+          </a:p>
+        </p:txBody>
+      </p:sp>
+      <p:sp>
+        <p:nvSpPr>
+          <p:cNvPr id="6" name="TextBox 5">
+            <a:extLst>
+              <a:ext uri="{FF2B5EF4-FFF2-40B4-BE49-F238E27FC236}">
+                <a16:creationId xmlns:a16="http://schemas.microsoft.com/office/drawing/2014/main" id="{D853958E-3261-981B-8D4F-973C9C4F0918}"/>
+              </a:ext>
+            </a:extLst>
+          </p:cNvPr>
+          <p:cNvSpPr txBox="1"/>
+          <p:nvPr/>
+        </p:nvSpPr>
+        <p:spPr>
+          <a:xfrm>
+            <a:off x="508496" y="4438692"/>
+            <a:ext cx="2714017" cy="1477328"/>
+          </a:xfrm>
+          <a:prstGeom prst="rect">
+            <a:avLst/>
+          </a:prstGeom>
+          <a:noFill/>
+        </p:spPr>
+        <p:txBody>
+          <a:bodyPr wrap="square" rtlCol="0">
+            <a:spAutoFit/>
+          </a:bodyPr>
+          <a:lstStyle/>
+          <a:p>
+            <a:r>
+              <a:rPr lang="en-GB" dirty="0"/>
+              <a:t>Physics can be surprisingly technical, dodging then using that momentum to attack. That is what we wanted for ourselves.</a:t>
+            </a:r>
+          </a:p>
+        </p:txBody>
+      </p:sp>
+      <p:sp>
+        <p:nvSpPr>
+          <p:cNvPr id="7" name="TextBox 6">
+            <a:extLst>
+              <a:ext uri="{FF2B5EF4-FFF2-40B4-BE49-F238E27FC236}">
+                <a16:creationId xmlns:a16="http://schemas.microsoft.com/office/drawing/2014/main" id="{27F7B866-F21B-6157-B97D-A81E19114312}"/>
+              </a:ext>
+            </a:extLst>
+          </p:cNvPr>
+          <p:cNvSpPr txBox="1"/>
+          <p:nvPr/>
+        </p:nvSpPr>
+        <p:spPr>
+          <a:xfrm>
+            <a:off x="966157" y="6039520"/>
+            <a:ext cx="9558067" cy="646331"/>
+          </a:xfrm>
+          <a:prstGeom prst="rect">
+            <a:avLst/>
+          </a:prstGeom>
+          <a:noFill/>
+        </p:spPr>
+        <p:txBody>
+          <a:bodyPr wrap="square" rtlCol="0">
+            <a:spAutoFit/>
+          </a:bodyPr>
+          <a:lstStyle/>
+          <a:p>
+            <a:r>
+              <a:rPr lang="en-GB" dirty="0"/>
+              <a:t>This game hopes to combine that with high speeds and the corresponding dynamic decision-making. Resulting in a wacky game with the most unexpectedly high technical skill ceiling</a:t>
             </a:r>
           </a:p>
         </p:txBody>
@@ -6908,7 +7067,7 @@
     </p:spTree>
     <p:extLst>
       <p:ext uri="{BB962C8B-B14F-4D97-AF65-F5344CB8AC3E}">
-        <p14:creationId xmlns:p14="http://schemas.microsoft.com/office/powerpoint/2010/main" val="1160747505"/>
+        <p14:creationId xmlns:p14="http://schemas.microsoft.com/office/powerpoint/2010/main" val="2874293980"/>
       </p:ext>
     </p:extLst>
   </p:cSld>
@@ -6937,86 +7096,6 @@
       </p:grpSpPr>
       <p:sp>
         <p:nvSpPr>
-          <p:cNvPr id="3" name="TextBox 2">
-            <a:extLst>
-              <a:ext uri="{FF2B5EF4-FFF2-40B4-BE49-F238E27FC236}">
-                <a16:creationId xmlns:a16="http://schemas.microsoft.com/office/drawing/2014/main" id="{301E72D1-EC55-83CD-AAFB-2B33CF0F4633}"/>
-              </a:ext>
-            </a:extLst>
-          </p:cNvPr>
-          <p:cNvSpPr txBox="1"/>
-          <p:nvPr/>
-        </p:nvSpPr>
-        <p:spPr>
-          <a:xfrm>
-            <a:off x="3381915" y="1848255"/>
-            <a:ext cx="8306870" cy="369332"/>
-          </a:xfrm>
-          <a:prstGeom prst="rect">
-            <a:avLst/>
-          </a:prstGeom>
-          <a:noFill/>
-        </p:spPr>
-        <p:txBody>
-          <a:bodyPr wrap="square" rtlCol="0">
-            <a:spAutoFit/>
-          </a:bodyPr>
-          <a:lstStyle/>
-          <a:p>
-            <a:r>
-              <a:rPr lang="en-GB" dirty="0"/>
-              <a:t>Weave/dodge		swing/attack	 ragdoll/knockback/damage</a:t>
-            </a:r>
-          </a:p>
-        </p:txBody>
-      </p:sp>
-      <p:pic>
-        <p:nvPicPr>
-          <p:cNvPr id="8" name="Picture 2">
-            <a:extLst>
-              <a:ext uri="{FF2B5EF4-FFF2-40B4-BE49-F238E27FC236}">
-                <a16:creationId xmlns:a16="http://schemas.microsoft.com/office/drawing/2014/main" id="{3F58A48E-B415-B77D-31D6-192F821C0DE1}"/>
-              </a:ext>
-            </a:extLst>
-          </p:cNvPr>
-          <p:cNvPicPr>
-            <a:picLocks noChangeAspect="1" noChangeArrowheads="1"/>
-          </p:cNvPicPr>
-          <p:nvPr/>
-        </p:nvPicPr>
-        <p:blipFill rotWithShape="1">
-          <a:blip r:embed="rId2">
-            <a:extLst>
-              <a:ext uri="{28A0092B-C50C-407E-A947-70E740481C1C}">
-                <a14:useLocalDpi xmlns:a14="http://schemas.microsoft.com/office/drawing/2010/main" val="0"/>
-              </a:ext>
-            </a:extLst>
-          </a:blip>
-          <a:srcRect l="17941" r="42907" b="29716"/>
-          <a:stretch/>
-        </p:blipFill>
-        <p:spPr bwMode="auto">
-          <a:xfrm rot="5400000">
-            <a:off x="5771372" y="-92128"/>
-            <a:ext cx="3540865" cy="8475429"/>
-          </a:xfrm>
-          <a:prstGeom prst="rect">
-            <a:avLst/>
-          </a:prstGeom>
-          <a:noFill/>
-          <a:extLst>
-            <a:ext uri="{909E8E84-426E-40DD-AFC4-6F175D3DCCD1}">
-              <a14:hiddenFill xmlns:a14="http://schemas.microsoft.com/office/drawing/2010/main">
-                <a:solidFill>
-                  <a:srgbClr val="FFFFFF"/>
-                </a:solidFill>
-              </a14:hiddenFill>
-            </a:ext>
-          </a:extLst>
-        </p:spPr>
-      </p:pic>
-      <p:sp>
-        <p:nvSpPr>
           <p:cNvPr id="2" name="Title 1">
             <a:extLst>
               <a:ext uri="{FF2B5EF4-FFF2-40B4-BE49-F238E27FC236}">
@@ -7038,56 +7117,11 @@
           <a:p>
             <a:r>
               <a:rPr lang="en-GB" dirty="0"/>
-              <a:t>Core Gameplay Inspiration and Design</a:t>
-            </a:r>
-          </a:p>
-        </p:txBody>
-      </p:sp>
-      <p:pic>
-        <p:nvPicPr>
-          <p:cNvPr id="4" name="Picture 2" descr="Image result for gang beasts punch force mod">
-            <a:extLst>
-              <a:ext uri="{FF2B5EF4-FFF2-40B4-BE49-F238E27FC236}">
-                <a16:creationId xmlns:a16="http://schemas.microsoft.com/office/drawing/2014/main" id="{350C4873-1747-F449-B241-13AED5B2450E}"/>
-              </a:ext>
-            </a:extLst>
-          </p:cNvPr>
-          <p:cNvPicPr>
-            <a:picLocks noChangeAspect="1" noChangeArrowheads="1"/>
-          </p:cNvPicPr>
-          <p:nvPr/>
-        </p:nvPicPr>
-        <p:blipFill rotWithShape="1">
-          <a:blip r:embed="rId3">
-            <a:extLst>
-              <a:ext uri="{28A0092B-C50C-407E-A947-70E740481C1C}">
-                <a14:useLocalDpi xmlns:a14="http://schemas.microsoft.com/office/drawing/2010/main" val="0"/>
-              </a:ext>
-            </a:extLst>
-          </a:blip>
-          <a:srcRect r="23112" b="21217"/>
-          <a:stretch/>
-        </p:blipFill>
-        <p:spPr bwMode="auto">
-          <a:xfrm>
-            <a:off x="511607" y="2607870"/>
-            <a:ext cx="2571059" cy="1559854"/>
-          </a:xfrm>
-          <a:prstGeom prst="rect">
-            <a:avLst/>
-          </a:prstGeom>
-          <a:noFill/>
-          <a:extLst>
-            <a:ext uri="{909E8E84-426E-40DD-AFC4-6F175D3DCCD1}">
-              <a14:hiddenFill xmlns:a14="http://schemas.microsoft.com/office/drawing/2010/main">
-                <a:solidFill>
-                  <a:srgbClr val="FFFFFF"/>
-                </a:solidFill>
-              </a14:hiddenFill>
-            </a:ext>
-          </a:extLst>
-        </p:spPr>
-      </p:pic>
+              <a:t>Core Gameplay Implementation &amp; Research</a:t>
+            </a:r>
+          </a:p>
+        </p:txBody>
+      </p:sp>
       <p:sp>
         <p:nvSpPr>
           <p:cNvPr id="5" name="TextBox 4">
@@ -7102,8 +7136,8 @@
         </p:nvSpPr>
         <p:spPr>
           <a:xfrm>
-            <a:off x="440129" y="1920565"/>
-            <a:ext cx="2714017" cy="646331"/>
+            <a:off x="155643" y="1877438"/>
+            <a:ext cx="2714017" cy="369332"/>
           </a:xfrm>
           <a:prstGeom prst="rect">
             <a:avLst/>
@@ -7118,17 +7152,17 @@
           <a:p>
             <a:r>
               <a:rPr lang="en-GB" dirty="0"/>
-              <a:t>We modelled our attacks and dodges on Gang beast</a:t>
-            </a:r>
-          </a:p>
-        </p:txBody>
-      </p:sp>
-      <p:sp>
-        <p:nvSpPr>
-          <p:cNvPr id="6" name="TextBox 5">
+              <a:t>Let Charlie talk about this</a:t>
+            </a:r>
+          </a:p>
+        </p:txBody>
+      </p:sp>
+      <p:sp>
+        <p:nvSpPr>
+          <p:cNvPr id="7" name="TextBox 6">
             <a:extLst>
               <a:ext uri="{FF2B5EF4-FFF2-40B4-BE49-F238E27FC236}">
-                <a16:creationId xmlns:a16="http://schemas.microsoft.com/office/drawing/2014/main" id="{D853958E-3261-981B-8D4F-973C9C4F0918}"/>
+                <a16:creationId xmlns:a16="http://schemas.microsoft.com/office/drawing/2014/main" id="{27F7B866-F21B-6157-B97D-A81E19114312}"/>
               </a:ext>
             </a:extLst>
           </p:cNvPr>
@@ -7137,8 +7171,8 @@
         </p:nvSpPr>
         <p:spPr>
           <a:xfrm>
-            <a:off x="508496" y="4438692"/>
-            <a:ext cx="2714017" cy="1477328"/>
+            <a:off x="3381983" y="5140537"/>
+            <a:ext cx="4320395" cy="646331"/>
           </a:xfrm>
           <a:prstGeom prst="rect">
             <a:avLst/>
@@ -7153,17 +7187,17 @@
           <a:p>
             <a:r>
               <a:rPr lang="en-GB" dirty="0"/>
-              <a:t>Physics can be surprisingly technical, dodging then using that momentum to attack. That is what we wanted for ourselves.</a:t>
-            </a:r>
-          </a:p>
-        </p:txBody>
-      </p:sp>
-      <p:sp>
-        <p:nvSpPr>
-          <p:cNvPr id="7" name="TextBox 6">
+              <a:t>Maybe talk about the guides researched + get some research examples</a:t>
+            </a:r>
+          </a:p>
+        </p:txBody>
+      </p:sp>
+      <p:sp>
+        <p:nvSpPr>
+          <p:cNvPr id="3" name="TextBox 2">
             <a:extLst>
               <a:ext uri="{FF2B5EF4-FFF2-40B4-BE49-F238E27FC236}">
-                <a16:creationId xmlns:a16="http://schemas.microsoft.com/office/drawing/2014/main" id="{27F7B866-F21B-6157-B97D-A81E19114312}"/>
+                <a16:creationId xmlns:a16="http://schemas.microsoft.com/office/drawing/2014/main" id="{7F9BB987-D7FE-76AB-1D87-C2F498F1B724}"/>
               </a:ext>
             </a:extLst>
           </p:cNvPr>
@@ -7172,8 +7206,8 @@
         </p:nvSpPr>
         <p:spPr>
           <a:xfrm>
-            <a:off x="966157" y="6039520"/>
-            <a:ext cx="9558067" cy="646331"/>
+            <a:off x="3655092" y="3201267"/>
+            <a:ext cx="2714017" cy="923330"/>
           </a:xfrm>
           <a:prstGeom prst="rect">
             <a:avLst/>
@@ -7188,7 +7222,7 @@
           <a:p>
             <a:r>
               <a:rPr lang="en-GB" dirty="0"/>
-              <a:t>This game hopes to combine that with high speeds and the corresponding dynamic decision-making. Resulting in a wacky game with the most unexpectedly high technical skill ceiling</a:t>
+              <a:t>Get images for Charlie to talk about regarding this level’s research</a:t>
             </a:r>
           </a:p>
         </p:txBody>
@@ -7196,7 +7230,7 @@
     </p:spTree>
     <p:extLst>
       <p:ext uri="{BB962C8B-B14F-4D97-AF65-F5344CB8AC3E}">
-        <p14:creationId xmlns:p14="http://schemas.microsoft.com/office/powerpoint/2010/main" val="2874293980"/>
+        <p14:creationId xmlns:p14="http://schemas.microsoft.com/office/powerpoint/2010/main" val="414728885"/>
       </p:ext>
     </p:extLst>
   </p:cSld>
@@ -7228,169 +7262,6 @@
           <p:cNvPr id="2" name="Title 1">
             <a:extLst>
               <a:ext uri="{FF2B5EF4-FFF2-40B4-BE49-F238E27FC236}">
-                <a16:creationId xmlns:a16="http://schemas.microsoft.com/office/drawing/2014/main" id="{5C4132F1-9311-30FF-7FD5-6039FF1A4A1C}"/>
-              </a:ext>
-            </a:extLst>
-          </p:cNvPr>
-          <p:cNvSpPr>
-            <a:spLocks noGrp="1"/>
-          </p:cNvSpPr>
-          <p:nvPr>
-            <p:ph type="title"/>
-          </p:nvPr>
-        </p:nvSpPr>
-        <p:spPr/>
-        <p:txBody>
-          <a:bodyPr/>
-          <a:lstStyle/>
-          <a:p>
-            <a:r>
-              <a:rPr lang="en-GB" dirty="0"/>
-              <a:t>Core Gameplay Implementation &amp; Research</a:t>
-            </a:r>
-          </a:p>
-        </p:txBody>
-      </p:sp>
-      <p:sp>
-        <p:nvSpPr>
-          <p:cNvPr id="5" name="TextBox 4">
-            <a:extLst>
-              <a:ext uri="{FF2B5EF4-FFF2-40B4-BE49-F238E27FC236}">
-                <a16:creationId xmlns:a16="http://schemas.microsoft.com/office/drawing/2014/main" id="{B064BEE8-BC07-75E8-2F93-A0F9A109A6E5}"/>
-              </a:ext>
-            </a:extLst>
-          </p:cNvPr>
-          <p:cNvSpPr txBox="1"/>
-          <p:nvPr/>
-        </p:nvSpPr>
-        <p:spPr>
-          <a:xfrm>
-            <a:off x="155643" y="1877438"/>
-            <a:ext cx="2714017" cy="369332"/>
-          </a:xfrm>
-          <a:prstGeom prst="rect">
-            <a:avLst/>
-          </a:prstGeom>
-          <a:noFill/>
-        </p:spPr>
-        <p:txBody>
-          <a:bodyPr wrap="square" rtlCol="0">
-            <a:spAutoFit/>
-          </a:bodyPr>
-          <a:lstStyle/>
-          <a:p>
-            <a:r>
-              <a:rPr lang="en-GB" dirty="0"/>
-              <a:t>Let Charlie talk about this</a:t>
-            </a:r>
-          </a:p>
-        </p:txBody>
-      </p:sp>
-      <p:sp>
-        <p:nvSpPr>
-          <p:cNvPr id="7" name="TextBox 6">
-            <a:extLst>
-              <a:ext uri="{FF2B5EF4-FFF2-40B4-BE49-F238E27FC236}">
-                <a16:creationId xmlns:a16="http://schemas.microsoft.com/office/drawing/2014/main" id="{27F7B866-F21B-6157-B97D-A81E19114312}"/>
-              </a:ext>
-            </a:extLst>
-          </p:cNvPr>
-          <p:cNvSpPr txBox="1"/>
-          <p:nvPr/>
-        </p:nvSpPr>
-        <p:spPr>
-          <a:xfrm>
-            <a:off x="3381983" y="5140537"/>
-            <a:ext cx="4320395" cy="646331"/>
-          </a:xfrm>
-          <a:prstGeom prst="rect">
-            <a:avLst/>
-          </a:prstGeom>
-          <a:noFill/>
-        </p:spPr>
-        <p:txBody>
-          <a:bodyPr wrap="square" rtlCol="0">
-            <a:spAutoFit/>
-          </a:bodyPr>
-          <a:lstStyle/>
-          <a:p>
-            <a:r>
-              <a:rPr lang="en-GB" dirty="0"/>
-              <a:t>Maybe talk about the guides researched + get some research examples</a:t>
-            </a:r>
-          </a:p>
-        </p:txBody>
-      </p:sp>
-      <p:sp>
-        <p:nvSpPr>
-          <p:cNvPr id="3" name="TextBox 2">
-            <a:extLst>
-              <a:ext uri="{FF2B5EF4-FFF2-40B4-BE49-F238E27FC236}">
-                <a16:creationId xmlns:a16="http://schemas.microsoft.com/office/drawing/2014/main" id="{7F9BB987-D7FE-76AB-1D87-C2F498F1B724}"/>
-              </a:ext>
-            </a:extLst>
-          </p:cNvPr>
-          <p:cNvSpPr txBox="1"/>
-          <p:nvPr/>
-        </p:nvSpPr>
-        <p:spPr>
-          <a:xfrm>
-            <a:off x="3655092" y="3201267"/>
-            <a:ext cx="2714017" cy="923330"/>
-          </a:xfrm>
-          <a:prstGeom prst="rect">
-            <a:avLst/>
-          </a:prstGeom>
-          <a:noFill/>
-        </p:spPr>
-        <p:txBody>
-          <a:bodyPr wrap="square" rtlCol="0">
-            <a:spAutoFit/>
-          </a:bodyPr>
-          <a:lstStyle/>
-          <a:p>
-            <a:r>
-              <a:rPr lang="en-GB" dirty="0"/>
-              <a:t>Get images for Charlie to talk about regarding this level’s research</a:t>
-            </a:r>
-          </a:p>
-        </p:txBody>
-      </p:sp>
-    </p:spTree>
-    <p:extLst>
-      <p:ext uri="{BB962C8B-B14F-4D97-AF65-F5344CB8AC3E}">
-        <p14:creationId xmlns:p14="http://schemas.microsoft.com/office/powerpoint/2010/main" val="414728885"/>
-      </p:ext>
-    </p:extLst>
-  </p:cSld>
-  <p:clrMapOvr>
-    <a:masterClrMapping/>
-  </p:clrMapOvr>
-</p:sld>
-</file>
-
-<file path=ppt/slides/slide15.xml><?xml version="1.0" encoding="utf-8"?>
-<p:sld xmlns:a="http://schemas.openxmlformats.org/drawingml/2006/main" xmlns:r="http://schemas.openxmlformats.org/officeDocument/2006/relationships" xmlns:p="http://schemas.openxmlformats.org/presentationml/2006/main">
-  <p:cSld>
-    <p:spTree>
-      <p:nvGrpSpPr>
-        <p:cNvPr id="1" name=""/>
-        <p:cNvGrpSpPr/>
-        <p:nvPr/>
-      </p:nvGrpSpPr>
-      <p:grpSpPr>
-        <a:xfrm>
-          <a:off x="0" y="0"/>
-          <a:ext cx="0" cy="0"/>
-          <a:chOff x="0" y="0"/>
-          <a:chExt cx="0" cy="0"/>
-        </a:xfrm>
-      </p:grpSpPr>
-      <p:sp>
-        <p:nvSpPr>
-          <p:cNvPr id="2" name="Title 1">
-            <a:extLst>
-              <a:ext uri="{FF2B5EF4-FFF2-40B4-BE49-F238E27FC236}">
                 <a16:creationId xmlns:a16="http://schemas.microsoft.com/office/drawing/2014/main" id="{0965B83C-0DDB-09BD-44E1-DF7B40F1D084}"/>
               </a:ext>
             </a:extLst>
@@ -7659,7 +7530,7 @@
 </p:sld>
 </file>
 
-<file path=ppt/slides/slide16.xml><?xml version="1.0" encoding="utf-8"?>
+<file path=ppt/slides/slide15.xml><?xml version="1.0" encoding="utf-8"?>
 <p:sld xmlns:a="http://schemas.openxmlformats.org/drawingml/2006/main" xmlns:r="http://schemas.openxmlformats.org/officeDocument/2006/relationships" xmlns:p="http://schemas.openxmlformats.org/presentationml/2006/main">
   <p:cSld>
     <p:bg>
@@ -7750,7 +7621,7 @@
 </p:sld>
 </file>
 
-<file path=ppt/slides/slide17.xml><?xml version="1.0" encoding="utf-8"?>
+<file path=ppt/slides/slide16.xml><?xml version="1.0" encoding="utf-8"?>
 <p:sld xmlns:a="http://schemas.openxmlformats.org/drawingml/2006/main" xmlns:r="http://schemas.openxmlformats.org/officeDocument/2006/relationships" xmlns:p="http://schemas.openxmlformats.org/presentationml/2006/main">
   <p:cSld>
     <p:spTree>
@@ -7942,7 +7813,7 @@
 </p:sld>
 </file>
 
-<file path=ppt/slides/slide18.xml><?xml version="1.0" encoding="utf-8"?>
+<file path=ppt/slides/slide17.xml><?xml version="1.0" encoding="utf-8"?>
 <p:sld xmlns:a="http://schemas.openxmlformats.org/drawingml/2006/main" xmlns:r="http://schemas.openxmlformats.org/officeDocument/2006/relationships" xmlns:p="http://schemas.openxmlformats.org/presentationml/2006/main">
   <p:cSld>
     <p:spTree>
@@ -8184,7 +8055,7 @@
 </p:sld>
 </file>
 
-<file path=ppt/slides/slide19.xml><?xml version="1.0" encoding="utf-8"?>
+<file path=ppt/slides/slide18.xml><?xml version="1.0" encoding="utf-8"?>
 <p:sld xmlns:a="http://schemas.openxmlformats.org/drawingml/2006/main" xmlns:r="http://schemas.openxmlformats.org/officeDocument/2006/relationships" xmlns:p="http://schemas.openxmlformats.org/presentationml/2006/main">
   <p:cSld>
     <p:bg>
@@ -8278,7 +8149,7 @@
 </p:sld>
 </file>
 
-<file path=ppt/slides/slide2.xml><?xml version="1.0" encoding="utf-8"?>
+<file path=ppt/slides/slide19.xml><?xml version="1.0" encoding="utf-8"?>
 <p:sld xmlns:a="http://schemas.openxmlformats.org/drawingml/2006/main" xmlns:r="http://schemas.openxmlformats.org/officeDocument/2006/relationships" xmlns:p="http://schemas.openxmlformats.org/presentationml/2006/main">
   <p:cSld>
     <p:spTree>
@@ -8300,7 +8171,7 @@
           <p:cNvPr id="2" name="Title 1">
             <a:extLst>
               <a:ext uri="{FF2B5EF4-FFF2-40B4-BE49-F238E27FC236}">
-                <a16:creationId xmlns:a16="http://schemas.microsoft.com/office/drawing/2014/main" id="{C983B5B6-80E0-F932-8707-5AF4B9855846}"/>
+                <a16:creationId xmlns:a16="http://schemas.microsoft.com/office/drawing/2014/main" id="{739CC088-5730-6A40-542B-19A924F066DA}"/>
               </a:ext>
             </a:extLst>
           </p:cNvPr>
@@ -8318,10 +8189,9 @@
           <a:p>
             <a:r>
               <a:rPr lang="en-US" dirty="0">
-                <a:ea typeface="Calibri Light"/>
                 <a:cs typeface="Calibri Light"/>
               </a:rPr>
-              <a:t>Team Introduction</a:t>
+              <a:t>Variety</a:t>
             </a:r>
             <a:endParaRPr lang="en-US" dirty="0"/>
           </a:p>
@@ -8329,94 +8199,10 @@
       </p:sp>
       <p:sp>
         <p:nvSpPr>
-          <p:cNvPr id="3" name="Content Placeholder 2">
+          <p:cNvPr id="4" name="Content Placeholder 2">
             <a:extLst>
               <a:ext uri="{FF2B5EF4-FFF2-40B4-BE49-F238E27FC236}">
-                <a16:creationId xmlns:a16="http://schemas.microsoft.com/office/drawing/2014/main" id="{90B854EC-9565-91F6-41BA-CA80A9BD4D0E}"/>
-              </a:ext>
-            </a:extLst>
-          </p:cNvPr>
-          <p:cNvSpPr>
-            <a:spLocks noGrp="1"/>
-          </p:cNvSpPr>
-          <p:nvPr>
-            <p:ph idx="1"/>
-          </p:nvPr>
-        </p:nvSpPr>
-        <p:spPr>
-          <a:xfrm>
-            <a:off x="369278" y="1825625"/>
-            <a:ext cx="2903973" cy="2127543"/>
-          </a:xfrm>
-        </p:spPr>
-        <p:txBody>
-          <a:bodyPr vert="horz" lIns="91440" tIns="45720" rIns="91440" bIns="45720" rtlCol="0" anchor="t">
-            <a:normAutofit/>
-          </a:bodyPr>
-          <a:lstStyle/>
-          <a:p>
-            <a:pPr marL="0" indent="0" algn="ctr">
-              <a:buNone/>
-            </a:pPr>
-            <a:r>
-              <a:rPr lang="en-US" dirty="0">
-                <a:ea typeface="Calibri"/>
-                <a:cs typeface="Calibri"/>
-              </a:rPr>
-              <a:t>Luke Bell on</a:t>
-            </a:r>
-            <a:endParaRPr lang="en-US" dirty="0"/>
-          </a:p>
-        </p:txBody>
-      </p:sp>
-      <p:sp>
-        <p:nvSpPr>
-          <p:cNvPr id="5" name="TextBox 4">
-            <a:extLst>
-              <a:ext uri="{FF2B5EF4-FFF2-40B4-BE49-F238E27FC236}">
-                <a16:creationId xmlns:a16="http://schemas.microsoft.com/office/drawing/2014/main" id="{57254791-77DF-EEDA-2ABE-6B01D918B973}"/>
-              </a:ext>
-            </a:extLst>
-          </p:cNvPr>
-          <p:cNvSpPr txBox="1"/>
-          <p:nvPr/>
-        </p:nvSpPr>
-        <p:spPr>
-          <a:xfrm>
-            <a:off x="208184" y="6293257"/>
-            <a:ext cx="5760409" cy="646331"/>
-          </a:xfrm>
-          <a:prstGeom prst="rect">
-            <a:avLst/>
-          </a:prstGeom>
-          <a:noFill/>
-        </p:spPr>
-        <p:txBody>
-          <a:bodyPr rot="0" spcFirstLastPara="0" vertOverflow="overflow" horzOverflow="overflow" vert="horz" wrap="square" lIns="91440" tIns="45720" rIns="91440" bIns="45720" numCol="1" spcCol="0" rtlCol="0" fromWordArt="0" anchor="t" anchorCtr="0" forceAA="0" compatLnSpc="1">
-            <a:prstTxWarp prst="textNoShape">
-              <a:avLst/>
-            </a:prstTxWarp>
-            <a:spAutoFit/>
-          </a:bodyPr>
-          <a:lstStyle/>
-          <a:p>
-            <a:r>
-              <a:rPr lang="en-US" dirty="0">
-                <a:ea typeface="Calibri"/>
-                <a:cs typeface="Calibri"/>
-              </a:rPr>
-              <a:t>by Luke Bell, Sam Bagshaw, Sujai Bhuiyan, and Charlie Ashall</a:t>
-            </a:r>
-            <a:endParaRPr lang="en-US" dirty="0"/>
-          </a:p>
-        </p:txBody>
-      </p:sp>
-      <p:sp>
-        <p:nvSpPr>
-          <p:cNvPr id="7" name="Content Placeholder 2">
-            <a:extLst>
-              <a:ext uri="{FF2B5EF4-FFF2-40B4-BE49-F238E27FC236}">
-                <a16:creationId xmlns:a16="http://schemas.microsoft.com/office/drawing/2014/main" id="{161A8B6B-5C08-B41E-5B3A-6EE043510441}"/>
+                <a16:creationId xmlns:a16="http://schemas.microsoft.com/office/drawing/2014/main" id="{8E81FAF9-E994-2176-5D54-301EEB334758}"/>
               </a:ext>
             </a:extLst>
           </p:cNvPr>
@@ -8427,8 +8213,8 @@
         </p:nvSpPr>
         <p:spPr>
           <a:xfrm>
-            <a:off x="3274206" y="1822315"/>
-            <a:ext cx="2898791" cy="1606583"/>
+            <a:off x="838200" y="1690687"/>
+            <a:ext cx="10515600" cy="4981961"/>
           </a:xfrm>
           <a:prstGeom prst="rect">
             <a:avLst/>
@@ -8603,33 +8389,227 @@
             </a:lvl9pPr>
           </a:lstStyle>
           <a:p>
-            <a:pPr marL="0" indent="0" algn="ctr">
+            <a:pPr marL="0" indent="0">
               <a:buNone/>
             </a:pPr>
             <a:r>
               <a:rPr lang="en-US" dirty="0">
-                <a:ea typeface="+mn-lt"/>
-                <a:cs typeface="+mn-lt"/>
+                <a:cs typeface="Calibri"/>
               </a:rPr>
-              <a:t>Sam Bagshaw</a:t>
-            </a:r>
+              <a:t>Dynamic and fast is challenging at first but like all things you get used to it. Our priority for improvements is providing players with more unique challenges and approaches for instance:</a:t>
+            </a:r>
+            <a:endParaRPr lang="en-US" dirty="0">
+              <a:ea typeface="Calibri"/>
+              <a:cs typeface="Calibri"/>
+            </a:endParaRPr>
+          </a:p>
+          <a:p>
             <a:r>
               <a:rPr lang="en-US" dirty="0">
                 <a:ea typeface="Calibri"/>
                 <a:cs typeface="Calibri"/>
               </a:rPr>
-              <a:t> on Level Design</a:t>
-            </a:r>
-            <a:endParaRPr lang="en-US"/>
-          </a:p>
-        </p:txBody>
-      </p:sp>
-      <p:sp>
-        <p:nvSpPr>
-          <p:cNvPr id="8" name="Content Placeholder 2">
+              <a:t>enemy variety – different looks, weapons/equipment, </a:t>
+            </a:r>
+            <a:r>
+              <a:rPr lang="en-US" dirty="0" err="1">
+                <a:ea typeface="Calibri"/>
+                <a:cs typeface="Calibri"/>
+              </a:rPr>
+              <a:t>etc</a:t>
+            </a:r>
+            <a:endParaRPr lang="en-US" dirty="0">
+              <a:ea typeface="Calibri"/>
+              <a:cs typeface="Calibri"/>
+            </a:endParaRPr>
+          </a:p>
+          <a:p>
+            <a:r>
+              <a:rPr lang="en-US" dirty="0">
+                <a:ea typeface="Calibri"/>
+                <a:cs typeface="Calibri"/>
+              </a:rPr>
+              <a:t>friendly fire – helps add variety when melee enemies' gang up on the player, and entertaining</a:t>
+            </a:r>
+          </a:p>
+          <a:p>
+            <a:r>
+              <a:rPr lang="en-US" dirty="0"/>
+              <a:t>Items – for the player and enemies to use (e.g., Trolly, Taser, Glass)</a:t>
+            </a:r>
+          </a:p>
+          <a:p>
+            <a:r>
+              <a:rPr lang="en-US" dirty="0">
+                <a:ea typeface="Calibri"/>
+                <a:cs typeface="Calibri"/>
+              </a:rPr>
+              <a:t>Zeus – AI boss enemy – more health – lighting stun attacks – gives taser on defeat</a:t>
+            </a:r>
+          </a:p>
+          <a:p>
+            <a:r>
+              <a:rPr lang="en-US" dirty="0">
+                <a:ea typeface="Calibri"/>
+                <a:cs typeface="Calibri"/>
+              </a:rPr>
+              <a:t>Boss variety</a:t>
+            </a:r>
+          </a:p>
+        </p:txBody>
+      </p:sp>
+    </p:spTree>
+    <p:extLst>
+      <p:ext uri="{BB962C8B-B14F-4D97-AF65-F5344CB8AC3E}">
+        <p14:creationId xmlns:p14="http://schemas.microsoft.com/office/powerpoint/2010/main" val="2923504476"/>
+      </p:ext>
+    </p:extLst>
+  </p:cSld>
+  <p:clrMapOvr>
+    <a:masterClrMapping/>
+  </p:clrMapOvr>
+</p:sld>
+</file>
+
+<file path=ppt/slides/slide2.xml><?xml version="1.0" encoding="utf-8"?>
+<p:sld xmlns:a="http://schemas.openxmlformats.org/drawingml/2006/main" xmlns:r="http://schemas.openxmlformats.org/officeDocument/2006/relationships" xmlns:p="http://schemas.openxmlformats.org/presentationml/2006/main">
+  <p:cSld>
+    <p:spTree>
+      <p:nvGrpSpPr>
+        <p:cNvPr id="1" name=""/>
+        <p:cNvGrpSpPr/>
+        <p:nvPr/>
+      </p:nvGrpSpPr>
+      <p:grpSpPr>
+        <a:xfrm>
+          <a:off x="0" y="0"/>
+          <a:ext cx="0" cy="0"/>
+          <a:chOff x="0" y="0"/>
+          <a:chExt cx="0" cy="0"/>
+        </a:xfrm>
+      </p:grpSpPr>
+      <p:sp>
+        <p:nvSpPr>
+          <p:cNvPr id="2" name="Title 1">
             <a:extLst>
               <a:ext uri="{FF2B5EF4-FFF2-40B4-BE49-F238E27FC236}">
-                <a16:creationId xmlns:a16="http://schemas.microsoft.com/office/drawing/2014/main" id="{EEB9FB21-90D4-6516-27CC-D103B33F21D2}"/>
+                <a16:creationId xmlns:a16="http://schemas.microsoft.com/office/drawing/2014/main" id="{C983B5B6-80E0-F932-8707-5AF4B9855846}"/>
+              </a:ext>
+            </a:extLst>
+          </p:cNvPr>
+          <p:cNvSpPr>
+            <a:spLocks noGrp="1"/>
+          </p:cNvSpPr>
+          <p:nvPr>
+            <p:ph type="title"/>
+          </p:nvPr>
+        </p:nvSpPr>
+        <p:spPr/>
+        <p:txBody>
+          <a:bodyPr/>
+          <a:lstStyle/>
+          <a:p>
+            <a:r>
+              <a:rPr lang="en-US" dirty="0">
+                <a:ea typeface="Calibri Light"/>
+                <a:cs typeface="Calibri Light"/>
+              </a:rPr>
+              <a:t>Team Introduction</a:t>
+            </a:r>
+            <a:endParaRPr lang="en-US" dirty="0"/>
+          </a:p>
+        </p:txBody>
+      </p:sp>
+      <p:sp>
+        <p:nvSpPr>
+          <p:cNvPr id="3" name="Content Placeholder 2">
+            <a:extLst>
+              <a:ext uri="{FF2B5EF4-FFF2-40B4-BE49-F238E27FC236}">
+                <a16:creationId xmlns:a16="http://schemas.microsoft.com/office/drawing/2014/main" id="{90B854EC-9565-91F6-41BA-CA80A9BD4D0E}"/>
+              </a:ext>
+            </a:extLst>
+          </p:cNvPr>
+          <p:cNvSpPr>
+            <a:spLocks noGrp="1"/>
+          </p:cNvSpPr>
+          <p:nvPr>
+            <p:ph idx="1"/>
+          </p:nvPr>
+        </p:nvSpPr>
+        <p:spPr>
+          <a:xfrm>
+            <a:off x="369278" y="1825625"/>
+            <a:ext cx="2903973" cy="2127543"/>
+          </a:xfrm>
+        </p:spPr>
+        <p:txBody>
+          <a:bodyPr vert="horz" lIns="91440" tIns="45720" rIns="91440" bIns="45720" rtlCol="0" anchor="t">
+            <a:normAutofit/>
+          </a:bodyPr>
+          <a:lstStyle/>
+          <a:p>
+            <a:pPr marL="0" indent="0" algn="ctr">
+              <a:buNone/>
+            </a:pPr>
+            <a:r>
+              <a:rPr lang="en-US" dirty="0">
+                <a:ea typeface="Calibri"/>
+                <a:cs typeface="Calibri"/>
+              </a:rPr>
+              <a:t>Luke Bell on</a:t>
+            </a:r>
+            <a:endParaRPr lang="en-US" dirty="0"/>
+          </a:p>
+        </p:txBody>
+      </p:sp>
+      <p:sp>
+        <p:nvSpPr>
+          <p:cNvPr id="5" name="TextBox 4">
+            <a:extLst>
+              <a:ext uri="{FF2B5EF4-FFF2-40B4-BE49-F238E27FC236}">
+                <a16:creationId xmlns:a16="http://schemas.microsoft.com/office/drawing/2014/main" id="{57254791-77DF-EEDA-2ABE-6B01D918B973}"/>
+              </a:ext>
+            </a:extLst>
+          </p:cNvPr>
+          <p:cNvSpPr txBox="1"/>
+          <p:nvPr/>
+        </p:nvSpPr>
+        <p:spPr>
+          <a:xfrm>
+            <a:off x="208184" y="6293257"/>
+            <a:ext cx="5760409" cy="646331"/>
+          </a:xfrm>
+          <a:prstGeom prst="rect">
+            <a:avLst/>
+          </a:prstGeom>
+          <a:noFill/>
+        </p:spPr>
+        <p:txBody>
+          <a:bodyPr rot="0" spcFirstLastPara="0" vertOverflow="overflow" horzOverflow="overflow" vert="horz" wrap="square" lIns="91440" tIns="45720" rIns="91440" bIns="45720" numCol="1" spcCol="0" rtlCol="0" fromWordArt="0" anchor="t" anchorCtr="0" forceAA="0" compatLnSpc="1">
+            <a:prstTxWarp prst="textNoShape">
+              <a:avLst/>
+            </a:prstTxWarp>
+            <a:spAutoFit/>
+          </a:bodyPr>
+          <a:lstStyle/>
+          <a:p>
+            <a:r>
+              <a:rPr lang="en-US" dirty="0">
+                <a:ea typeface="Calibri"/>
+                <a:cs typeface="Calibri"/>
+              </a:rPr>
+              <a:t>by Luke Bell, Sam Bagshaw, Sujai Bhuiyan, and Charlie Ashall</a:t>
+            </a:r>
+            <a:endParaRPr lang="en-US" dirty="0"/>
+          </a:p>
+        </p:txBody>
+      </p:sp>
+      <p:sp>
+        <p:nvSpPr>
+          <p:cNvPr id="7" name="Content Placeholder 2">
+            <a:extLst>
+              <a:ext uri="{FF2B5EF4-FFF2-40B4-BE49-F238E27FC236}">
+                <a16:creationId xmlns:a16="http://schemas.microsoft.com/office/drawing/2014/main" id="{161A8B6B-5C08-B41E-5B3A-6EE043510441}"/>
               </a:ext>
             </a:extLst>
           </p:cNvPr>
@@ -8640,8 +8620,8 @@
         </p:nvSpPr>
         <p:spPr>
           <a:xfrm>
-            <a:off x="6179056" y="1827698"/>
-            <a:ext cx="2904972" cy="1596814"/>
+            <a:off x="3274206" y="1822315"/>
+            <a:ext cx="2898791" cy="1606583"/>
           </a:xfrm>
           <a:prstGeom prst="rect">
             <a:avLst/>
@@ -8824,14 +8804,14 @@
                 <a:ea typeface="+mn-lt"/>
                 <a:cs typeface="+mn-lt"/>
               </a:rPr>
-              <a:t>Sujai Bhuiyan </a:t>
+              <a:t>Sam Bagshaw</a:t>
             </a:r>
             <a:r>
               <a:rPr lang="en-US" dirty="0">
                 <a:ea typeface="Calibri"/>
                 <a:cs typeface="Calibri"/>
               </a:rPr>
-              <a:t>on Research &amp; asset acquisition</a:t>
+              <a:t> on Level Design</a:t>
             </a:r>
             <a:endParaRPr lang="en-US"/>
           </a:p>
@@ -8839,10 +8819,10 @@
       </p:sp>
       <p:sp>
         <p:nvSpPr>
-          <p:cNvPr id="11" name="Content Placeholder 2">
+          <p:cNvPr id="8" name="Content Placeholder 2">
             <a:extLst>
               <a:ext uri="{FF2B5EF4-FFF2-40B4-BE49-F238E27FC236}">
-                <a16:creationId xmlns:a16="http://schemas.microsoft.com/office/drawing/2014/main" id="{1748DBDE-88AA-1812-BE75-6F4C21D02C9A}"/>
+                <a16:creationId xmlns:a16="http://schemas.microsoft.com/office/drawing/2014/main" id="{EEB9FB21-90D4-6516-27CC-D103B33F21D2}"/>
               </a:ext>
             </a:extLst>
           </p:cNvPr>
@@ -8853,8 +8833,8 @@
         </p:nvSpPr>
         <p:spPr>
           <a:xfrm>
-            <a:off x="8920823" y="1822314"/>
-            <a:ext cx="2898791" cy="1606583"/>
+            <a:off x="6179056" y="1827698"/>
+            <a:ext cx="2904972" cy="1596814"/>
           </a:xfrm>
           <a:prstGeom prst="rect">
             <a:avLst/>
@@ -9037,14 +9017,14 @@
                 <a:ea typeface="+mn-lt"/>
                 <a:cs typeface="+mn-lt"/>
               </a:rPr>
-              <a:t>Charlie Ashall</a:t>
+              <a:t>Sujai Bhuiyan </a:t>
             </a:r>
             <a:r>
               <a:rPr lang="en-US" dirty="0">
                 <a:ea typeface="Calibri"/>
                 <a:cs typeface="Calibri"/>
               </a:rPr>
-              <a:t> on Mechanic Creation</a:t>
+              <a:t>on Research &amp; asset acquisition</a:t>
             </a:r>
             <a:endParaRPr lang="en-US"/>
           </a:p>
@@ -9052,114 +9032,10 @@
       </p:sp>
       <p:sp>
         <p:nvSpPr>
-          <p:cNvPr id="4" name="TextBox 3">
+          <p:cNvPr id="11" name="Content Placeholder 2">
             <a:extLst>
               <a:ext uri="{FF2B5EF4-FFF2-40B4-BE49-F238E27FC236}">
-                <a16:creationId xmlns:a16="http://schemas.microsoft.com/office/drawing/2014/main" id="{C09EA941-6DF4-CB6F-C7B5-1780E63AE144}"/>
-              </a:ext>
-            </a:extLst>
-          </p:cNvPr>
-          <p:cNvSpPr txBox="1"/>
-          <p:nvPr/>
-        </p:nvSpPr>
-        <p:spPr>
-          <a:xfrm>
-            <a:off x="704461" y="4864359"/>
-            <a:ext cx="7742853" cy="523220"/>
-          </a:xfrm>
-          <a:prstGeom prst="rect">
-            <a:avLst/>
-          </a:prstGeom>
-          <a:noFill/>
-        </p:spPr>
-        <p:txBody>
-          <a:bodyPr rot="0" spcFirstLastPara="0" vertOverflow="overflow" horzOverflow="overflow" vert="horz" wrap="square" lIns="91440" tIns="45720" rIns="91440" bIns="45720" numCol="1" spcCol="0" rtlCol="0" fromWordArt="0" anchor="t" anchorCtr="0" forceAA="0" compatLnSpc="1">
-            <a:prstTxWarp prst="textNoShape">
-              <a:avLst/>
-            </a:prstTxWarp>
-            <a:spAutoFit/>
-          </a:bodyPr>
-          <a:lstStyle/>
-          <a:p>
-            <a:pPr marL="228600" indent="-228600">
-              <a:buChar char="•"/>
-            </a:pPr>
-            <a:r>
-              <a:rPr lang="en-US" sz="2800" dirty="0">
-                <a:cs typeface="Arial"/>
-              </a:rPr>
-              <a:t>[add images to slides]​</a:t>
-            </a:r>
-          </a:p>
-        </p:txBody>
-      </p:sp>
-    </p:spTree>
-    <p:extLst>
-      <p:ext uri="{BB962C8B-B14F-4D97-AF65-F5344CB8AC3E}">
-        <p14:creationId xmlns:p14="http://schemas.microsoft.com/office/powerpoint/2010/main" val="3070171396"/>
-      </p:ext>
-    </p:extLst>
-  </p:cSld>
-  <p:clrMapOvr>
-    <a:masterClrMapping/>
-  </p:clrMapOvr>
-</p:sld>
-</file>
-
-<file path=ppt/slides/slide20.xml><?xml version="1.0" encoding="utf-8"?>
-<p:sld xmlns:a="http://schemas.openxmlformats.org/drawingml/2006/main" xmlns:r="http://schemas.openxmlformats.org/officeDocument/2006/relationships" xmlns:p="http://schemas.openxmlformats.org/presentationml/2006/main">
-  <p:cSld>
-    <p:spTree>
-      <p:nvGrpSpPr>
-        <p:cNvPr id="1" name=""/>
-        <p:cNvGrpSpPr/>
-        <p:nvPr/>
-      </p:nvGrpSpPr>
-      <p:grpSpPr>
-        <a:xfrm>
-          <a:off x="0" y="0"/>
-          <a:ext cx="0" cy="0"/>
-          <a:chOff x="0" y="0"/>
-          <a:chExt cx="0" cy="0"/>
-        </a:xfrm>
-      </p:grpSpPr>
-      <p:sp>
-        <p:nvSpPr>
-          <p:cNvPr id="2" name="Title 1">
-            <a:extLst>
-              <a:ext uri="{FF2B5EF4-FFF2-40B4-BE49-F238E27FC236}">
-                <a16:creationId xmlns:a16="http://schemas.microsoft.com/office/drawing/2014/main" id="{739CC088-5730-6A40-542B-19A924F066DA}"/>
-              </a:ext>
-            </a:extLst>
-          </p:cNvPr>
-          <p:cNvSpPr>
-            <a:spLocks noGrp="1"/>
-          </p:cNvSpPr>
-          <p:nvPr>
-            <p:ph type="title"/>
-          </p:nvPr>
-        </p:nvSpPr>
-        <p:spPr/>
-        <p:txBody>
-          <a:bodyPr/>
-          <a:lstStyle/>
-          <a:p>
-            <a:r>
-              <a:rPr lang="en-US" dirty="0">
-                <a:cs typeface="Calibri Light"/>
-              </a:rPr>
-              <a:t>Variety</a:t>
-            </a:r>
-            <a:endParaRPr lang="en-US" dirty="0"/>
-          </a:p>
-        </p:txBody>
-      </p:sp>
-      <p:sp>
-        <p:nvSpPr>
-          <p:cNvPr id="4" name="Content Placeholder 2">
-            <a:extLst>
-              <a:ext uri="{FF2B5EF4-FFF2-40B4-BE49-F238E27FC236}">
-                <a16:creationId xmlns:a16="http://schemas.microsoft.com/office/drawing/2014/main" id="{8E81FAF9-E994-2176-5D54-301EEB334758}"/>
+                <a16:creationId xmlns:a16="http://schemas.microsoft.com/office/drawing/2014/main" id="{1748DBDE-88AA-1812-BE75-6F4C21D02C9A}"/>
               </a:ext>
             </a:extLst>
           </p:cNvPr>
@@ -9170,8 +9046,8 @@
         </p:nvSpPr>
         <p:spPr>
           <a:xfrm>
-            <a:off x="838200" y="1690687"/>
-            <a:ext cx="10515600" cy="4981961"/>
+            <a:off x="8920823" y="1822314"/>
+            <a:ext cx="2898791" cy="1606583"/>
           </a:xfrm>
           <a:prstGeom prst="rect">
             <a:avLst/>
@@ -9346,71 +9222,66 @@
             </a:lvl9pPr>
           </a:lstStyle>
           <a:p>
-            <a:pPr marL="0" indent="0">
+            <a:pPr marL="0" indent="0" algn="ctr">
               <a:buNone/>
             </a:pPr>
             <a:r>
               <a:rPr lang="en-US" dirty="0">
-                <a:cs typeface="Calibri"/>
+                <a:ea typeface="+mn-lt"/>
+                <a:cs typeface="+mn-lt"/>
               </a:rPr>
-              <a:t>Dynamic and fast is challenging at first but like all things you get used to it. Our priority for improvements is providing players with more unique challenges and approaches for instance:</a:t>
-            </a:r>
-            <a:endParaRPr lang="en-US" dirty="0">
-              <a:ea typeface="Calibri"/>
-              <a:cs typeface="Calibri"/>
-            </a:endParaRPr>
-          </a:p>
-          <a:p>
+              <a:t>Charlie Ashall</a:t>
+            </a:r>
             <a:r>
               <a:rPr lang="en-US" dirty="0">
                 <a:ea typeface="Calibri"/>
                 <a:cs typeface="Calibri"/>
               </a:rPr>
-              <a:t>enemy variety – different looks, weapons/equipment, </a:t>
-            </a:r>
-            <a:r>
-              <a:rPr lang="en-US" dirty="0" err="1">
-                <a:ea typeface="Calibri"/>
-                <a:cs typeface="Calibri"/>
+              <a:t> on Mechanic Creation</a:t>
+            </a:r>
+            <a:endParaRPr lang="en-US"/>
+          </a:p>
+        </p:txBody>
+      </p:sp>
+      <p:sp>
+        <p:nvSpPr>
+          <p:cNvPr id="4" name="TextBox 3">
+            <a:extLst>
+              <a:ext uri="{FF2B5EF4-FFF2-40B4-BE49-F238E27FC236}">
+                <a16:creationId xmlns:a16="http://schemas.microsoft.com/office/drawing/2014/main" id="{C09EA941-6DF4-CB6F-C7B5-1780E63AE144}"/>
+              </a:ext>
+            </a:extLst>
+          </p:cNvPr>
+          <p:cNvSpPr txBox="1"/>
+          <p:nvPr/>
+        </p:nvSpPr>
+        <p:spPr>
+          <a:xfrm>
+            <a:off x="704461" y="4864359"/>
+            <a:ext cx="7742853" cy="523220"/>
+          </a:xfrm>
+          <a:prstGeom prst="rect">
+            <a:avLst/>
+          </a:prstGeom>
+          <a:noFill/>
+        </p:spPr>
+        <p:txBody>
+          <a:bodyPr rot="0" spcFirstLastPara="0" vertOverflow="overflow" horzOverflow="overflow" vert="horz" wrap="square" lIns="91440" tIns="45720" rIns="91440" bIns="45720" numCol="1" spcCol="0" rtlCol="0" fromWordArt="0" anchor="t" anchorCtr="0" forceAA="0" compatLnSpc="1">
+            <a:prstTxWarp prst="textNoShape">
+              <a:avLst/>
+            </a:prstTxWarp>
+            <a:spAutoFit/>
+          </a:bodyPr>
+          <a:lstStyle/>
+          <a:p>
+            <a:pPr marL="228600" indent="-228600">
+              <a:buChar char="•"/>
+            </a:pPr>
+            <a:r>
+              <a:rPr lang="en-US" sz="2800" dirty="0">
+                <a:cs typeface="Arial"/>
               </a:rPr>
-              <a:t>etc</a:t>
-            </a:r>
-            <a:endParaRPr lang="en-US" dirty="0">
-              <a:ea typeface="Calibri"/>
-              <a:cs typeface="Calibri"/>
-            </a:endParaRPr>
-          </a:p>
-          <a:p>
-            <a:r>
-              <a:rPr lang="en-US" dirty="0">
-                <a:ea typeface="Calibri"/>
-                <a:cs typeface="Calibri"/>
-              </a:rPr>
-              <a:t>friendly fire – helps add variety when melee enemies' gang up on the player, and entertaining</a:t>
-            </a:r>
-          </a:p>
-          <a:p>
-            <a:r>
-              <a:rPr lang="en-US" dirty="0"/>
-              <a:t>Items – for the player and enemies to use (e.g., Trolly, Taser, Glass)</a:t>
-            </a:r>
-          </a:p>
-          <a:p>
-            <a:r>
-              <a:rPr lang="en-US" dirty="0">
-                <a:ea typeface="Calibri"/>
-                <a:cs typeface="Calibri"/>
-              </a:rPr>
-              <a:t>Zeus – AI boss enemy – more health – lighting stun attacks – gives taser on defeat</a:t>
-            </a:r>
-          </a:p>
-          <a:p>
-            <a:r>
-              <a:rPr lang="en-US" dirty="0">
-                <a:ea typeface="Calibri"/>
-                <a:cs typeface="Calibri"/>
-              </a:rPr>
-              <a:t>Boss variety</a:t>
+              <a:t>[add images to slides]​</a:t>
             </a:r>
           </a:p>
         </p:txBody>
@@ -9418,7 +9289,118 @@
     </p:spTree>
     <p:extLst>
       <p:ext uri="{BB962C8B-B14F-4D97-AF65-F5344CB8AC3E}">
-        <p14:creationId xmlns:p14="http://schemas.microsoft.com/office/powerpoint/2010/main" val="2923504476"/>
+        <p14:creationId xmlns:p14="http://schemas.microsoft.com/office/powerpoint/2010/main" val="3070171396"/>
+      </p:ext>
+    </p:extLst>
+  </p:cSld>
+  <p:clrMapOvr>
+    <a:masterClrMapping/>
+  </p:clrMapOvr>
+</p:sld>
+</file>
+
+<file path=ppt/slides/slide20.xml><?xml version="1.0" encoding="utf-8"?>
+<p:sld xmlns:a="http://schemas.openxmlformats.org/drawingml/2006/main" xmlns:r="http://schemas.openxmlformats.org/officeDocument/2006/relationships" xmlns:p="http://schemas.openxmlformats.org/presentationml/2006/main">
+  <p:cSld>
+    <p:spTree>
+      <p:nvGrpSpPr>
+        <p:cNvPr id="1" name=""/>
+        <p:cNvGrpSpPr/>
+        <p:nvPr/>
+      </p:nvGrpSpPr>
+      <p:grpSpPr>
+        <a:xfrm>
+          <a:off x="0" y="0"/>
+          <a:ext cx="0" cy="0"/>
+          <a:chOff x="0" y="0"/>
+          <a:chExt cx="0" cy="0"/>
+        </a:xfrm>
+      </p:grpSpPr>
+      <p:sp>
+        <p:nvSpPr>
+          <p:cNvPr id="2" name="Title 1">
+            <a:extLst>
+              <a:ext uri="{FF2B5EF4-FFF2-40B4-BE49-F238E27FC236}">
+                <a16:creationId xmlns:a16="http://schemas.microsoft.com/office/drawing/2014/main" id="{5062687C-677B-942A-9161-3269826DDD4E}"/>
+              </a:ext>
+            </a:extLst>
+          </p:cNvPr>
+          <p:cNvSpPr>
+            <a:spLocks noGrp="1"/>
+          </p:cNvSpPr>
+          <p:nvPr>
+            <p:ph type="title"/>
+          </p:nvPr>
+        </p:nvSpPr>
+        <p:spPr/>
+        <p:txBody>
+          <a:bodyPr/>
+          <a:lstStyle/>
+          <a:p>
+            <a:r>
+              <a:rPr lang="en-US" dirty="0">
+                <a:ea typeface="Calibri Light"/>
+                <a:cs typeface="Calibri Light"/>
+              </a:rPr>
+              <a:t>Equipment Mechanic</a:t>
+            </a:r>
+            <a:endParaRPr lang="en-US" dirty="0"/>
+          </a:p>
+        </p:txBody>
+      </p:sp>
+      <p:sp>
+        <p:nvSpPr>
+          <p:cNvPr id="3" name="Content Placeholder 2">
+            <a:extLst>
+              <a:ext uri="{FF2B5EF4-FFF2-40B4-BE49-F238E27FC236}">
+                <a16:creationId xmlns:a16="http://schemas.microsoft.com/office/drawing/2014/main" id="{13076D57-4FD0-3765-E109-74F461A8F626}"/>
+              </a:ext>
+            </a:extLst>
+          </p:cNvPr>
+          <p:cNvSpPr>
+            <a:spLocks noGrp="1"/>
+          </p:cNvSpPr>
+          <p:nvPr>
+            <p:ph idx="1"/>
+          </p:nvPr>
+        </p:nvSpPr>
+        <p:spPr/>
+        <p:txBody>
+          <a:bodyPr/>
+          <a:lstStyle/>
+          <a:p>
+            <a:pPr marL="0" indent="0">
+              <a:buNone/>
+            </a:pPr>
+            <a:r>
+              <a:rPr lang="en-US" dirty="0"/>
+              <a:t>With varies items to use we would need to implement an equipment mechanic for </a:t>
+            </a:r>
+          </a:p>
+          <a:p>
+            <a:r>
+              <a:rPr lang="en-US" dirty="0"/>
+              <a:t>We wouldn’t need many buttons, so we could bind each equip key to corelating socket</a:t>
+            </a:r>
+          </a:p>
+          <a:p>
+            <a:r>
+              <a:rPr lang="en-US" dirty="0"/>
+              <a:t>We would also use this to implement the ability to pickup enemy corpses</a:t>
+            </a:r>
+          </a:p>
+          <a:p>
+            <a:r>
+              <a:rPr lang="en-US" dirty="0"/>
+              <a:t>Then give enemies this mechanic as well but change the players loss condition to the trashcan condition</a:t>
+            </a:r>
+          </a:p>
+        </p:txBody>
+      </p:sp>
+    </p:spTree>
+    <p:extLst>
+      <p:ext uri="{BB962C8B-B14F-4D97-AF65-F5344CB8AC3E}">
+        <p14:creationId xmlns:p14="http://schemas.microsoft.com/office/powerpoint/2010/main" val="3340763177"/>
       </p:ext>
     </p:extLst>
   </p:cSld>
@@ -9450,7 +9432,7 @@
           <p:cNvPr id="2" name="Title 1">
             <a:extLst>
               <a:ext uri="{FF2B5EF4-FFF2-40B4-BE49-F238E27FC236}">
-                <a16:creationId xmlns:a16="http://schemas.microsoft.com/office/drawing/2014/main" id="{5062687C-677B-942A-9161-3269826DDD4E}"/>
+                <a16:creationId xmlns:a16="http://schemas.microsoft.com/office/drawing/2014/main" id="{739CC088-5730-6A40-542B-19A924F066DA}"/>
               </a:ext>
             </a:extLst>
           </p:cNvPr>
@@ -9468,12 +9450,20 @@
           <a:p>
             <a:r>
               <a:rPr lang="en-US" dirty="0">
+                <a:cs typeface="Calibri Light"/>
+              </a:rPr>
+              <a:t>Area Claiming </a:t>
+            </a:r>
+            <a:r>
+              <a:rPr lang="en-US" dirty="0">
                 <a:ea typeface="Calibri Light"/>
                 <a:cs typeface="Calibri Light"/>
               </a:rPr>
-              <a:t>Equipment Mechanic</a:t>
-            </a:r>
-            <a:endParaRPr lang="en-US" dirty="0"/>
+              <a:t>Mechanic</a:t>
+            </a:r>
+            <a:endParaRPr lang="en-US" dirty="0">
+              <a:cs typeface="Calibri Light"/>
+            </a:endParaRPr>
           </a:p>
         </p:txBody>
       </p:sp>
@@ -9482,7 +9472,7 @@
           <p:cNvPr id="3" name="Content Placeholder 2">
             <a:extLst>
               <a:ext uri="{FF2B5EF4-FFF2-40B4-BE49-F238E27FC236}">
-                <a16:creationId xmlns:a16="http://schemas.microsoft.com/office/drawing/2014/main" id="{13076D57-4FD0-3765-E109-74F461A8F626}"/>
+                <a16:creationId xmlns:a16="http://schemas.microsoft.com/office/drawing/2014/main" id="{2FF61C8D-E54D-EC4C-219F-08FD66290642}"/>
               </a:ext>
             </a:extLst>
           </p:cNvPr>
@@ -9495,41 +9485,73 @@
         </p:nvSpPr>
         <p:spPr/>
         <p:txBody>
-          <a:bodyPr/>
+          <a:bodyPr vert="horz" lIns="91440" tIns="45720" rIns="91440" bIns="45720" rtlCol="0" anchor="t">
+            <a:normAutofit/>
+          </a:bodyPr>
           <a:lstStyle/>
           <a:p>
-            <a:pPr marL="0" indent="0">
-              <a:buNone/>
-            </a:pPr>
-            <a:r>
-              <a:rPr lang="en-US" dirty="0"/>
-              <a:t>With varies items to use we would need to implement an equipment mechanic for </a:t>
-            </a:r>
-          </a:p>
-          <a:p>
-            <a:r>
-              <a:rPr lang="en-US" dirty="0"/>
-              <a:t>We wouldn’t need many buttons, so we could bind each equip key to corelating socket</a:t>
-            </a:r>
-          </a:p>
-          <a:p>
-            <a:r>
-              <a:rPr lang="en-US" dirty="0"/>
-              <a:t>We would also use this to implement the ability to pickup enemy corpses</a:t>
-            </a:r>
-          </a:p>
-          <a:p>
-            <a:r>
-              <a:rPr lang="en-US" dirty="0"/>
-              <a:t>Then give enemies this mechanic as well but change the players loss condition to the trashcan condition</a:t>
-            </a:r>
+            <a:r>
+              <a:rPr lang="en-US" dirty="0">
+                <a:cs typeface="Calibri"/>
+              </a:rPr>
+              <a:t>Story wise the player is a new contestant fighting veteran contestants that were given their own areas, it stands to reason the player should get their own as well.</a:t>
+            </a:r>
+          </a:p>
+          <a:p>
+            <a:r>
+              <a:rPr lang="en-US" dirty="0">
+                <a:cs typeface="Calibri"/>
+              </a:rPr>
+              <a:t>Two ways I see it working (maybe do both) allows players to either make a level for other players to challenge, or let each stage be used as communal areas after completion that the players can use as hubs to talk to NPC's with</a:t>
+            </a:r>
+          </a:p>
+        </p:txBody>
+      </p:sp>
+      <p:sp>
+        <p:nvSpPr>
+          <p:cNvPr id="4" name="TextBox 3">
+            <a:extLst>
+              <a:ext uri="{FF2B5EF4-FFF2-40B4-BE49-F238E27FC236}">
+                <a16:creationId xmlns:a16="http://schemas.microsoft.com/office/drawing/2014/main" id="{5B3DEFA4-046C-B6CB-9A08-ED07BFEC8068}"/>
+              </a:ext>
+            </a:extLst>
+          </p:cNvPr>
+          <p:cNvSpPr txBox="1"/>
+          <p:nvPr/>
+        </p:nvSpPr>
+        <p:spPr>
+          <a:xfrm>
+            <a:off x="1726162" y="5295122"/>
+            <a:ext cx="4237653" cy="646331"/>
+          </a:xfrm>
+          <a:prstGeom prst="rect">
+            <a:avLst/>
+          </a:prstGeom>
+          <a:noFill/>
+        </p:spPr>
+        <p:txBody>
+          <a:bodyPr rot="0" spcFirstLastPara="0" vertOverflow="overflow" horzOverflow="overflow" vert="horz" wrap="square" lIns="91440" tIns="45720" rIns="91440" bIns="45720" numCol="1" spcCol="0" rtlCol="0" fromWordArt="0" anchor="t" anchorCtr="0" forceAA="0" compatLnSpc="1">
+            <a:prstTxWarp prst="textNoShape">
+              <a:avLst/>
+            </a:prstTxWarp>
+            <a:spAutoFit/>
+          </a:bodyPr>
+          <a:lstStyle/>
+          <a:p>
+            <a:r>
+              <a:rPr lang="en-US" dirty="0">
+                <a:cs typeface="Calibri"/>
+              </a:rPr>
+              <a:t>Note – page too wordy, Summaries this page &amp; add images</a:t>
+            </a:r>
+            <a:endParaRPr lang="en-US" dirty="0"/>
           </a:p>
         </p:txBody>
       </p:sp>
     </p:spTree>
     <p:extLst>
       <p:ext uri="{BB962C8B-B14F-4D97-AF65-F5344CB8AC3E}">
-        <p14:creationId xmlns:p14="http://schemas.microsoft.com/office/powerpoint/2010/main" val="3340763177"/>
+        <p14:creationId xmlns:p14="http://schemas.microsoft.com/office/powerpoint/2010/main" val="3248092553"/>
       </p:ext>
     </p:extLst>
   </p:cSld>
@@ -9581,18 +9603,9 @@
               <a:rPr lang="en-US" dirty="0">
                 <a:cs typeface="Calibri Light"/>
               </a:rPr>
-              <a:t>Area Claiming </a:t>
-            </a:r>
-            <a:r>
-              <a:rPr lang="en-US" dirty="0">
-                <a:ea typeface="Calibri Light"/>
-                <a:cs typeface="Calibri Light"/>
-              </a:rPr>
-              <a:t>Mechanic</a:t>
-            </a:r>
-            <a:endParaRPr lang="en-US" dirty="0">
-              <a:cs typeface="Calibri Light"/>
-            </a:endParaRPr>
+              <a:t>Costumes</a:t>
+            </a:r>
+            <a:endParaRPr lang="en-US" dirty="0"/>
           </a:p>
         </p:txBody>
       </p:sp>
@@ -9623,7 +9636,7 @@
               <a:rPr lang="en-US" dirty="0">
                 <a:cs typeface="Calibri"/>
               </a:rPr>
-              <a:t>Story wise the player is a new contestant fighting veteran contestants that were given their own areas, it stands to reason the player should get their own as well.</a:t>
+              <a:t>The enemies are in costume, why not the player too (the only reason is lack of time and resources)</a:t>
             </a:r>
           </a:p>
           <a:p>
@@ -9631,56 +9644,15 @@
               <a:rPr lang="en-US" dirty="0">
                 <a:cs typeface="Calibri"/>
               </a:rPr>
-              <a:t>Two ways I see it working (maybe do both) allows players to either make a level for other players to challenge, or let each stage be used as communal areas after completion that the players can use as hubs to talk to NPC's with</a:t>
-            </a:r>
-          </a:p>
-        </p:txBody>
-      </p:sp>
-      <p:sp>
-        <p:nvSpPr>
-          <p:cNvPr id="4" name="TextBox 3">
-            <a:extLst>
-              <a:ext uri="{FF2B5EF4-FFF2-40B4-BE49-F238E27FC236}">
-                <a16:creationId xmlns:a16="http://schemas.microsoft.com/office/drawing/2014/main" id="{5B3DEFA4-046C-B6CB-9A08-ED07BFEC8068}"/>
-              </a:ext>
-            </a:extLst>
-          </p:cNvPr>
-          <p:cNvSpPr txBox="1"/>
-          <p:nvPr/>
-        </p:nvSpPr>
-        <p:spPr>
-          <a:xfrm>
-            <a:off x="1726162" y="5295122"/>
-            <a:ext cx="4237653" cy="646331"/>
-          </a:xfrm>
-          <a:prstGeom prst="rect">
-            <a:avLst/>
-          </a:prstGeom>
-          <a:noFill/>
-        </p:spPr>
-        <p:txBody>
-          <a:bodyPr rot="0" spcFirstLastPara="0" vertOverflow="overflow" horzOverflow="overflow" vert="horz" wrap="square" lIns="91440" tIns="45720" rIns="91440" bIns="45720" numCol="1" spcCol="0" rtlCol="0" fromWordArt="0" anchor="t" anchorCtr="0" forceAA="0" compatLnSpc="1">
-            <a:prstTxWarp prst="textNoShape">
-              <a:avLst/>
-            </a:prstTxWarp>
-            <a:spAutoFit/>
-          </a:bodyPr>
-          <a:lstStyle/>
-          <a:p>
-            <a:r>
-              <a:rPr lang="en-US" dirty="0">
-                <a:cs typeface="Calibri"/>
-              </a:rPr>
-              <a:t>Note – page too wordy, Summaries this page &amp; add images</a:t>
-            </a:r>
-            <a:endParaRPr lang="en-US" dirty="0"/>
+              <a:t>Could even unlock costume pieces from enemies the player defeats</a:t>
+            </a:r>
           </a:p>
         </p:txBody>
       </p:sp>
     </p:spTree>
     <p:extLst>
       <p:ext uri="{BB962C8B-B14F-4D97-AF65-F5344CB8AC3E}">
-        <p14:creationId xmlns:p14="http://schemas.microsoft.com/office/powerpoint/2010/main" val="3248092553"/>
+        <p14:creationId xmlns:p14="http://schemas.microsoft.com/office/powerpoint/2010/main" val="227973062"/>
       </p:ext>
     </p:extLst>
   </p:cSld>
@@ -9732,7 +9704,7 @@
               <a:rPr lang="en-US" dirty="0">
                 <a:cs typeface="Calibri Light"/>
               </a:rPr>
-              <a:t>Costumes</a:t>
+              <a:t>Implementation that requires Polish</a:t>
             </a:r>
             <a:endParaRPr lang="en-US" dirty="0"/>
           </a:p>
@@ -9765,15 +9737,7 @@
               <a:rPr lang="en-US" dirty="0">
                 <a:cs typeface="Calibri"/>
               </a:rPr>
-              <a:t>The enemies are in costume, why not the player too (the only reason is lack of time and resources)</a:t>
-            </a:r>
-          </a:p>
-          <a:p>
-            <a:r>
-              <a:rPr lang="en-US" dirty="0">
-                <a:cs typeface="Calibri"/>
-              </a:rPr>
-              <a:t>Could even unlock costume pieces from enemies the player defeats</a:t>
+              <a:t>These are in game, but could use refining to meet our intention</a:t>
             </a:r>
           </a:p>
         </p:txBody>
@@ -9781,7 +9745,7 @@
     </p:spTree>
     <p:extLst>
       <p:ext uri="{BB962C8B-B14F-4D97-AF65-F5344CB8AC3E}">
-        <p14:creationId xmlns:p14="http://schemas.microsoft.com/office/powerpoint/2010/main" val="227973062"/>
+        <p14:creationId xmlns:p14="http://schemas.microsoft.com/office/powerpoint/2010/main" val="1322337264"/>
       </p:ext>
     </p:extLst>
   </p:cSld>
@@ -9833,7 +9797,7 @@
               <a:rPr lang="en-US" dirty="0">
                 <a:cs typeface="Calibri Light"/>
               </a:rPr>
-              <a:t>Implementation that requires Polish</a:t>
+              <a:t>How our teamwork could improve</a:t>
             </a:r>
             <a:endParaRPr lang="en-US" dirty="0"/>
           </a:p>
@@ -9866,7 +9830,39 @@
               <a:rPr lang="en-US" dirty="0">
                 <a:cs typeface="Calibri"/>
               </a:rPr>
-              <a:t>These are in game, but could use refining to meet our intention</a:t>
+              <a:t>Process improvements:</a:t>
+            </a:r>
+          </a:p>
+          <a:p>
+            <a:r>
+              <a:rPr lang="en-US" dirty="0">
+                <a:cs typeface="Calibri"/>
+              </a:rPr>
+              <a:t>Luke probably could have checked in less often, should have given </a:t>
+            </a:r>
+            <a:r>
+              <a:rPr lang="en-US" dirty="0" err="1">
+                <a:cs typeface="Calibri"/>
+              </a:rPr>
+              <a:t>Sujai</a:t>
+            </a:r>
+            <a:r>
+              <a:rPr lang="en-US" dirty="0">
+                <a:cs typeface="Calibri"/>
+              </a:rPr>
+              <a:t> more to do, could have updated the design documents more during the 3rd-5</a:t>
+            </a:r>
+            <a:r>
+              <a:rPr lang="en-US" baseline="30000" dirty="0">
+                <a:cs typeface="Calibri"/>
+              </a:rPr>
+              <a:t>th</a:t>
+            </a:r>
+            <a:r>
+              <a:rPr lang="en-US" dirty="0">
+                <a:cs typeface="Calibri"/>
+              </a:rPr>
+              <a:t> weeks, and should have focused less on the group pitch slides.</a:t>
             </a:r>
           </a:p>
         </p:txBody>
@@ -9874,7 +9870,7 @@
     </p:spTree>
     <p:extLst>
       <p:ext uri="{BB962C8B-B14F-4D97-AF65-F5344CB8AC3E}">
-        <p14:creationId xmlns:p14="http://schemas.microsoft.com/office/powerpoint/2010/main" val="1322337264"/>
+        <p14:creationId xmlns:p14="http://schemas.microsoft.com/office/powerpoint/2010/main" val="3700671194"/>
       </p:ext>
     </p:extLst>
   </p:cSld>
@@ -9906,7 +9902,7 @@
           <p:cNvPr id="2" name="Title 1">
             <a:extLst>
               <a:ext uri="{FF2B5EF4-FFF2-40B4-BE49-F238E27FC236}">
-                <a16:creationId xmlns:a16="http://schemas.microsoft.com/office/drawing/2014/main" id="{739CC088-5730-6A40-542B-19A924F066DA}"/>
+                <a16:creationId xmlns:a16="http://schemas.microsoft.com/office/drawing/2014/main" id="{F74824CB-C71E-86C0-6E64-408ECAB51A0F}"/>
               </a:ext>
             </a:extLst>
           </p:cNvPr>
@@ -9924,9 +9920,10 @@
           <a:p>
             <a:r>
               <a:rPr lang="en-US" dirty="0">
+                <a:ea typeface="Calibri Light"/>
                 <a:cs typeface="Calibri Light"/>
               </a:rPr>
-              <a:t>How our teamwork could improve</a:t>
+              <a:t>Interaction</a:t>
             </a:r>
             <a:endParaRPr lang="en-US" dirty="0"/>
           </a:p>
@@ -9937,7 +9934,7 @@
           <p:cNvPr id="3" name="Content Placeholder 2">
             <a:extLst>
               <a:ext uri="{FF2B5EF4-FFF2-40B4-BE49-F238E27FC236}">
-                <a16:creationId xmlns:a16="http://schemas.microsoft.com/office/drawing/2014/main" id="{2FF61C8D-E54D-EC4C-219F-08FD66290642}"/>
+                <a16:creationId xmlns:a16="http://schemas.microsoft.com/office/drawing/2014/main" id="{72DEA321-32E2-440C-635F-BBC9E0E1A05F}"/>
               </a:ext>
             </a:extLst>
           </p:cNvPr>
@@ -9957,9 +9954,10 @@
           <a:p>
             <a:r>
               <a:rPr lang="en-US" dirty="0">
+                <a:ea typeface="Calibri"/>
                 <a:cs typeface="Calibri"/>
               </a:rPr>
-              <a:t>Process improvements:</a:t>
+              <a:t>[Controls layout]</a:t>
             </a:r>
           </a:p>
           <a:p>
@@ -9967,39 +9965,22 @@
               <a:rPr lang="en-US" dirty="0">
                 <a:cs typeface="Calibri"/>
               </a:rPr>
-              <a:t>Luke probably could have checked in less often, should have given </a:t>
+              <a:t>We want to include various Environment interactions, so the player has more unique options throughout the levels: scattered items, moveable objects, obstacles, </a:t>
             </a:r>
             <a:r>
               <a:rPr lang="en-US" dirty="0" err="1">
                 <a:cs typeface="Calibri"/>
               </a:rPr>
-              <a:t>Sujai</a:t>
-            </a:r>
-            <a:r>
-              <a:rPr lang="en-US" dirty="0">
-                <a:cs typeface="Calibri"/>
-              </a:rPr>
-              <a:t> more to do, could have updated the design documents more during the 3rd-5</a:t>
-            </a:r>
-            <a:r>
-              <a:rPr lang="en-US" baseline="30000" dirty="0">
-                <a:cs typeface="Calibri"/>
-              </a:rPr>
-              <a:t>th</a:t>
-            </a:r>
-            <a:r>
-              <a:rPr lang="en-US" dirty="0">
-                <a:cs typeface="Calibri"/>
-              </a:rPr>
-              <a:t> weeks, and should have focused less on the group pitch slides.</a:t>
-            </a:r>
+              <a:t>etc</a:t>
+            </a:r>
+            <a:endParaRPr lang="en-US" dirty="0"/>
           </a:p>
         </p:txBody>
       </p:sp>
     </p:spTree>
     <p:extLst>
       <p:ext uri="{BB962C8B-B14F-4D97-AF65-F5344CB8AC3E}">
-        <p14:creationId xmlns:p14="http://schemas.microsoft.com/office/powerpoint/2010/main" val="3700671194"/>
+        <p14:creationId xmlns:p14="http://schemas.microsoft.com/office/powerpoint/2010/main" val="1229603757"/>
       </p:ext>
     </p:extLst>
   </p:cSld>
@@ -10031,116 +10012,6 @@
           <p:cNvPr id="2" name="Title 1">
             <a:extLst>
               <a:ext uri="{FF2B5EF4-FFF2-40B4-BE49-F238E27FC236}">
-                <a16:creationId xmlns:a16="http://schemas.microsoft.com/office/drawing/2014/main" id="{F74824CB-C71E-86C0-6E64-408ECAB51A0F}"/>
-              </a:ext>
-            </a:extLst>
-          </p:cNvPr>
-          <p:cNvSpPr>
-            <a:spLocks noGrp="1"/>
-          </p:cNvSpPr>
-          <p:nvPr>
-            <p:ph type="title"/>
-          </p:nvPr>
-        </p:nvSpPr>
-        <p:spPr/>
-        <p:txBody>
-          <a:bodyPr/>
-          <a:lstStyle/>
-          <a:p>
-            <a:r>
-              <a:rPr lang="en-US" dirty="0">
-                <a:ea typeface="Calibri Light"/>
-                <a:cs typeface="Calibri Light"/>
-              </a:rPr>
-              <a:t>Interaction</a:t>
-            </a:r>
-            <a:endParaRPr lang="en-US" dirty="0"/>
-          </a:p>
-        </p:txBody>
-      </p:sp>
-      <p:sp>
-        <p:nvSpPr>
-          <p:cNvPr id="3" name="Content Placeholder 2">
-            <a:extLst>
-              <a:ext uri="{FF2B5EF4-FFF2-40B4-BE49-F238E27FC236}">
-                <a16:creationId xmlns:a16="http://schemas.microsoft.com/office/drawing/2014/main" id="{72DEA321-32E2-440C-635F-BBC9E0E1A05F}"/>
-              </a:ext>
-            </a:extLst>
-          </p:cNvPr>
-          <p:cNvSpPr>
-            <a:spLocks noGrp="1"/>
-          </p:cNvSpPr>
-          <p:nvPr>
-            <p:ph idx="1"/>
-          </p:nvPr>
-        </p:nvSpPr>
-        <p:spPr/>
-        <p:txBody>
-          <a:bodyPr vert="horz" lIns="91440" tIns="45720" rIns="91440" bIns="45720" rtlCol="0" anchor="t">
-            <a:normAutofit/>
-          </a:bodyPr>
-          <a:lstStyle/>
-          <a:p>
-            <a:r>
-              <a:rPr lang="en-US" dirty="0">
-                <a:ea typeface="Calibri"/>
-                <a:cs typeface="Calibri"/>
-              </a:rPr>
-              <a:t>[Controls layout]</a:t>
-            </a:r>
-          </a:p>
-          <a:p>
-            <a:r>
-              <a:rPr lang="en-US" dirty="0">
-                <a:cs typeface="Calibri"/>
-              </a:rPr>
-              <a:t>We want to include various Environment interactions, so the player has more unique options throughout the levels: scattered items, moveable objects, obstacles, </a:t>
-            </a:r>
-            <a:r>
-              <a:rPr lang="en-US" dirty="0" err="1">
-                <a:cs typeface="Calibri"/>
-              </a:rPr>
-              <a:t>etc</a:t>
-            </a:r>
-            <a:endParaRPr lang="en-US" dirty="0"/>
-          </a:p>
-        </p:txBody>
-      </p:sp>
-    </p:spTree>
-    <p:extLst>
-      <p:ext uri="{BB962C8B-B14F-4D97-AF65-F5344CB8AC3E}">
-        <p14:creationId xmlns:p14="http://schemas.microsoft.com/office/powerpoint/2010/main" val="1229603757"/>
-      </p:ext>
-    </p:extLst>
-  </p:cSld>
-  <p:clrMapOvr>
-    <a:masterClrMapping/>
-  </p:clrMapOvr>
-</p:sld>
-</file>
-
-<file path=ppt/slides/slide27.xml><?xml version="1.0" encoding="utf-8"?>
-<p:sld xmlns:a="http://schemas.openxmlformats.org/drawingml/2006/main" xmlns:r="http://schemas.openxmlformats.org/officeDocument/2006/relationships" xmlns:p="http://schemas.openxmlformats.org/presentationml/2006/main">
-  <p:cSld>
-    <p:spTree>
-      <p:nvGrpSpPr>
-        <p:cNvPr id="1" name=""/>
-        <p:cNvGrpSpPr/>
-        <p:nvPr/>
-      </p:nvGrpSpPr>
-      <p:grpSpPr>
-        <a:xfrm>
-          <a:off x="0" y="0"/>
-          <a:ext cx="0" cy="0"/>
-          <a:chOff x="0" y="0"/>
-          <a:chExt cx="0" cy="0"/>
-        </a:xfrm>
-      </p:grpSpPr>
-      <p:sp>
-        <p:nvSpPr>
-          <p:cNvPr id="2" name="Title 1">
-            <a:extLst>
-              <a:ext uri="{FF2B5EF4-FFF2-40B4-BE49-F238E27FC236}">
                 <a16:creationId xmlns:a16="http://schemas.microsoft.com/office/drawing/2014/main" id="{0EA2C688-3E4E-CD7E-94EC-2E1D4A29E39E}"/>
               </a:ext>
             </a:extLst>
@@ -10285,7 +10156,7 @@
 </p:sld>
 </file>
 
-<file path=ppt/slides/slide28.xml><?xml version="1.0" encoding="utf-8"?>
+<file path=ppt/slides/slide27.xml><?xml version="1.0" encoding="utf-8"?>
 <p:sld xmlns:a="http://schemas.openxmlformats.org/drawingml/2006/main" xmlns:r="http://schemas.openxmlformats.org/officeDocument/2006/relationships" xmlns:p="http://schemas.openxmlformats.org/presentationml/2006/main">
   <p:cSld>
     <p:bg>
@@ -10376,7 +10247,7 @@
 </p:sld>
 </file>
 
-<file path=ppt/slides/slide29.xml><?xml version="1.0" encoding="utf-8"?>
+<file path=ppt/slides/slide28.xml><?xml version="1.0" encoding="utf-8"?>
 <p:sld xmlns:a="http://schemas.openxmlformats.org/drawingml/2006/main" xmlns:r="http://schemas.openxmlformats.org/officeDocument/2006/relationships" xmlns:p="http://schemas.openxmlformats.org/presentationml/2006/main">
   <p:cSld>
     <p:spTree>

</xml_diff>